<commit_message>
Updating Lesson 14 Slides on web.
</commit_message>
<xml_diff>
--- a/notes/L14/Lsn14.pptx
+++ b/notes/L14/Lsn14.pptx
@@ -5,10 +5,10 @@
     <p:sldMasterId id="2147483648" r:id="rId1"/>
   </p:sldMasterIdLst>
   <p:notesMasterIdLst>
-    <p:notesMasterId r:id="rId22"/>
+    <p:notesMasterId r:id="rId24"/>
   </p:notesMasterIdLst>
   <p:handoutMasterIdLst>
-    <p:handoutMasterId r:id="rId23"/>
+    <p:handoutMasterId r:id="rId25"/>
   </p:handoutMasterIdLst>
   <p:sldIdLst>
     <p:sldId id="282" r:id="rId2"/>
@@ -31,6 +31,8 @@
     <p:sldId id="375" r:id="rId19"/>
     <p:sldId id="376" r:id="rId20"/>
     <p:sldId id="373" r:id="rId21"/>
+    <p:sldId id="377" r:id="rId22"/>
+    <p:sldId id="378" r:id="rId23"/>
   </p:sldIdLst>
   <p:sldSz cx="9144000" cy="6858000" type="screen4x3"/>
   <p:notesSz cx="6985000" cy="9283700"/>
@@ -3939,7 +3941,7 @@
                   <a:srgbClr val="0070C0"/>
                 </a:solidFill>
               </a:rPr>
-              <a:t>Assignment 3b due BOC today</a:t>
+              <a:t>Extra Credit badlec5.asm due today</a:t>
             </a:r>
           </a:p>
           <a:p>
@@ -3950,13 +3952,43 @@
                   <a:srgbClr val="0070C0"/>
                 </a:solidFill>
               </a:rPr>
-              <a:t>Assignment 4 due BOC next class</a:t>
-            </a:r>
-            <a:endParaRPr lang="en-US" sz="2000" dirty="0">
-              <a:solidFill>
-                <a:srgbClr val="0070C0"/>
-              </a:solidFill>
-            </a:endParaRPr>
+              <a:t>Assignment 5 Due Thursday (L15)</a:t>
+            </a:r>
+          </a:p>
+          <a:p>
+            <a:pPr lvl="1" algn="l"/>
+            <a:r>
+              <a:rPr lang="en-US" sz="2000" dirty="0" smtClean="0">
+                <a:solidFill>
+                  <a:srgbClr val="0070C0"/>
+                </a:solidFill>
+              </a:rPr>
+              <a:t>Lab 3 Mega </a:t>
+            </a:r>
+            <a:r>
+              <a:rPr lang="en-US" sz="2000" dirty="0" err="1" smtClean="0">
+                <a:solidFill>
+                  <a:srgbClr val="0070C0"/>
+                </a:solidFill>
+              </a:rPr>
+              <a:t>PreLab</a:t>
+            </a:r>
+            <a:r>
+              <a:rPr lang="en-US" sz="2000" dirty="0">
+                <a:solidFill>
+                  <a:srgbClr val="0070C0"/>
+                </a:solidFill>
+              </a:rPr>
+              <a:t> </a:t>
+            </a:r>
+            <a:r>
+              <a:rPr lang="en-US" sz="2000" dirty="0" smtClean="0">
+                <a:solidFill>
+                  <a:srgbClr val="0070C0"/>
+                </a:solidFill>
+              </a:rPr>
+              <a:t>due Monday (L16)</a:t>
+            </a:r>
           </a:p>
           <a:p>
             <a:pPr algn="l"/>
@@ -4652,6 +4684,13 @@
   <p:clrMapOvr>
     <a:masterClrMapping/>
   </p:clrMapOvr>
+  <p:timing>
+    <p:tnLst>
+      <p:par>
+        <p:cTn id="1" dur="indefinite" restart="never" nodeType="tmRoot"/>
+      </p:par>
+    </p:tnLst>
+  </p:timing>
 </p:sld>
 </file>
 
@@ -5457,10 +5496,45 @@
                 <a:latin typeface="Courier New" pitchFamily="49" charset="0"/>
                 <a:cs typeface="Courier New" pitchFamily="49" charset="0"/>
               </a:rPr>
-              <a:t>                     </a:t>
-            </a:r>
-            <a:r>
-              <a:rPr lang="en-US" sz="1400" b="1" dirty="0" err="1">
+              <a:t>                    </a:t>
+            </a:r>
+            <a:r>
+              <a:rPr lang="en-US" sz="1400" b="1" dirty="0" smtClean="0">
+                <a:solidFill>
+                  <a:schemeClr val="accent2"/>
+                </a:solidFill>
+                <a:latin typeface="Courier New" pitchFamily="49" charset="0"/>
+                <a:cs typeface="Courier New" pitchFamily="49" charset="0"/>
+              </a:rPr>
+              <a:t> </a:t>
+            </a:r>
+          </a:p>
+          <a:p>
+            <a:pPr marL="0" indent="0">
+              <a:buNone/>
+            </a:pPr>
+            <a:r>
+              <a:rPr lang="en-US" sz="1400" b="1" dirty="0">
+                <a:solidFill>
+                  <a:schemeClr val="accent2"/>
+                </a:solidFill>
+                <a:latin typeface="Courier New" pitchFamily="49" charset="0"/>
+                <a:cs typeface="Courier New" pitchFamily="49" charset="0"/>
+              </a:rPr>
+              <a:t>	</a:t>
+            </a:r>
+            <a:r>
+              <a:rPr lang="en-US" sz="1400" b="1" dirty="0" smtClean="0">
+                <a:solidFill>
+                  <a:schemeClr val="accent2"/>
+                </a:solidFill>
+                <a:latin typeface="Courier New" pitchFamily="49" charset="0"/>
+                <a:cs typeface="Courier New" pitchFamily="49" charset="0"/>
+              </a:rPr>
+              <a:t>	    </a:t>
+            </a:r>
+            <a:r>
+              <a:rPr lang="en-US" sz="1400" b="1" dirty="0" err="1" smtClean="0">
                 <a:solidFill>
                   <a:schemeClr val="accent2"/>
                 </a:solidFill>
@@ -5470,16 +5544,6 @@
               <a:t>jnz</a:t>
             </a:r>
             <a:r>
-              <a:rPr lang="en-US" sz="1400" b="1" dirty="0">
-                <a:solidFill>
-                  <a:schemeClr val="accent2"/>
-                </a:solidFill>
-                <a:latin typeface="Courier New" pitchFamily="49" charset="0"/>
-                <a:cs typeface="Courier New" pitchFamily="49" charset="0"/>
-              </a:rPr>
-              <a:t>    </a:t>
-            </a:r>
-            <a:r>
               <a:rPr lang="en-US" sz="1400" b="1" dirty="0" smtClean="0">
                 <a:solidFill>
                   <a:schemeClr val="accent2"/>
@@ -5487,7 +5551,7 @@
                 <a:latin typeface="Courier New" pitchFamily="49" charset="0"/>
                 <a:cs typeface="Courier New" pitchFamily="49" charset="0"/>
               </a:rPr>
-              <a:t>delay</a:t>
+              <a:t>    delay</a:t>
             </a:r>
             <a:endParaRPr lang="en-US" sz="1400" b="1" dirty="0">
               <a:solidFill>
@@ -5580,8 +5644,13 @@
             </a:r>
             <a:r>
               <a:rPr lang="en-US" sz="1400" b="1" dirty="0"/>
-              <a:t>for cycles per instruction</a:t>
-            </a:r>
+              <a:t>for cycles per </a:t>
+            </a:r>
+            <a:r>
+              <a:rPr lang="en-US" sz="1400" b="1" dirty="0" smtClean="0"/>
+              <a:t>instruction (Blue Book pp 18)</a:t>
+            </a:r>
+            <a:endParaRPr lang="en-US" sz="1400" b="1" dirty="0"/>
           </a:p>
         </p:txBody>
       </p:sp>
@@ -5595,6 +5664,13 @@
   <p:clrMapOvr>
     <a:masterClrMapping/>
   </p:clrMapOvr>
+  <p:timing>
+    <p:tnLst>
+      <p:par>
+        <p:cTn id="1" dur="indefinite" restart="never" nodeType="tmRoot"/>
+      </p:par>
+    </p:tnLst>
+  </p:timing>
 </p:sld>
 </file>
 
@@ -6229,17 +6305,7 @@
                 <a:latin typeface="Courier New" pitchFamily="49" charset="0"/>
                 <a:cs typeface="Courier New" pitchFamily="49" charset="0"/>
               </a:rPr>
-              <a:t>3 </a:t>
-            </a:r>
-            <a:r>
-              <a:rPr lang="en-US" sz="1400" b="1" dirty="0" smtClean="0">
-                <a:solidFill>
-                  <a:srgbClr val="FF0000"/>
-                </a:solidFill>
-                <a:latin typeface="Courier New" pitchFamily="49" charset="0"/>
-                <a:cs typeface="Courier New" pitchFamily="49" charset="0"/>
-              </a:rPr>
-              <a:t>cycles !!!</a:t>
+              <a:t>3 cycles !!!</a:t>
             </a:r>
             <a:endParaRPr lang="en-US" sz="1400" b="1" dirty="0" smtClean="0">
               <a:solidFill>
@@ -6342,6 +6408,13 @@
   <p:clrMapOvr>
     <a:masterClrMapping/>
   </p:clrMapOvr>
+  <p:timing>
+    <p:tnLst>
+      <p:par>
+        <p:cTn id="1" dur="indefinite" restart="never" nodeType="tmRoot"/>
+      </p:par>
+    </p:tnLst>
+  </p:timing>
 </p:sld>
 </file>
 
@@ -6558,8 +6631,8 @@
         </p:blipFill>
         <p:spPr bwMode="auto">
           <a:xfrm>
-            <a:off x="1291157" y="3600188"/>
-            <a:ext cx="6543675" cy="2381250"/>
+            <a:off x="122831" y="3502585"/>
+            <a:ext cx="8880328" cy="3231560"/>
           </a:xfrm>
           <a:prstGeom prst="rect">
             <a:avLst/>
@@ -7486,6 +7559,13 @@
   <p:clrMapOvr>
     <a:masterClrMapping/>
   </p:clrMapOvr>
+  <p:timing>
+    <p:tnLst>
+      <p:par>
+        <p:cTn id="1" dur="indefinite" restart="never" nodeType="tmRoot"/>
+      </p:par>
+    </p:tnLst>
+  </p:timing>
 </p:sld>
 </file>
 
@@ -8277,6 +8357,13 @@
   <p:clrMapOvr>
     <a:masterClrMapping/>
   </p:clrMapOvr>
+  <p:timing>
+    <p:tnLst>
+      <p:par>
+        <p:cTn id="1" dur="indefinite" restart="never" nodeType="tmRoot"/>
+      </p:par>
+    </p:tnLst>
+  </p:timing>
 </p:sld>
 </file>
 
@@ -9191,6 +9278,3974 @@
   <p:clrMapOvr>
     <a:masterClrMapping/>
   </p:clrMapOvr>
+  <p:timing>
+    <p:tnLst>
+      <p:par>
+        <p:cTn id="1" dur="indefinite" restart="never" nodeType="tmRoot"/>
+      </p:par>
+    </p:tnLst>
+  </p:timing>
+</p:sld>
+</file>
+
+<file path=ppt/slides/slide21.xml><?xml version="1.0" encoding="utf-8"?>
+<p:sld xmlns:a="http://schemas.openxmlformats.org/drawingml/2006/main" xmlns:r="http://schemas.openxmlformats.org/officeDocument/2006/relationships" xmlns:p="http://schemas.openxmlformats.org/presentationml/2006/main">
+  <p:cSld>
+    <p:spTree>
+      <p:nvGrpSpPr>
+        <p:cNvPr id="1" name=""/>
+        <p:cNvGrpSpPr/>
+        <p:nvPr/>
+      </p:nvGrpSpPr>
+      <p:grpSpPr>
+        <a:xfrm>
+          <a:off x="0" y="0"/>
+          <a:ext cx="0" cy="0"/>
+          <a:chOff x="0" y="0"/>
+          <a:chExt cx="0" cy="0"/>
+        </a:xfrm>
+      </p:grpSpPr>
+      <p:sp>
+        <p:nvSpPr>
+          <p:cNvPr id="2" name="Title 1"/>
+          <p:cNvSpPr>
+            <a:spLocks noGrp="1"/>
+          </p:cNvSpPr>
+          <p:nvPr>
+            <p:ph type="title"/>
+          </p:nvPr>
+        </p:nvSpPr>
+        <p:spPr/>
+        <p:txBody>
+          <a:bodyPr/>
+          <a:lstStyle/>
+          <a:p>
+            <a:r>
+              <a:rPr lang="en-US" b="1" dirty="0"/>
+              <a:t>Emulated Instructions</a:t>
+            </a:r>
+          </a:p>
+        </p:txBody>
+      </p:sp>
+      <p:graphicFrame>
+        <p:nvGraphicFramePr>
+          <p:cNvPr id="4" name="Content Placeholder 3"/>
+          <p:cNvGraphicFramePr>
+            <a:graphicFrameLocks noGrp="1"/>
+          </p:cNvGraphicFramePr>
+          <p:nvPr>
+            <p:ph idx="1"/>
+            <p:extLst>
+              <p:ext uri="{D42A27DB-BD31-4B8C-83A1-F6EECF244321}">
+                <p14:modId xmlns:p14="http://schemas.microsoft.com/office/powerpoint/2010/main" val="712631109"/>
+              </p:ext>
+            </p:extLst>
+          </p:nvPr>
+        </p:nvGraphicFramePr>
+        <p:xfrm>
+          <a:off x="356047" y="655454"/>
+          <a:ext cx="7772400" cy="5639874"/>
+        </p:xfrm>
+        <a:graphic>
+          <a:graphicData uri="http://schemas.openxmlformats.org/drawingml/2006/table">
+            <a:tbl>
+              <a:tblPr/>
+              <a:tblGrid>
+                <a:gridCol w="2590800"/>
+                <a:gridCol w="2590800"/>
+                <a:gridCol w="2590800"/>
+              </a:tblGrid>
+              <a:tr h="211203">
+                <a:tc>
+                  <a:txBody>
+                    <a:bodyPr/>
+                    <a:lstStyle/>
+                    <a:p>
+                      <a:pPr algn="l" fontAlgn="b"/>
+                      <a:r>
+                        <a:rPr lang="en-US" sz="1600" b="1" dirty="0">
+                          <a:effectLst/>
+                        </a:rPr>
+                        <a:t>Emulated Instruction</a:t>
+                      </a:r>
+                    </a:p>
+                  </a:txBody>
+                  <a:tcPr marL="66219" marR="66219" marT="66219" marB="66219" anchor="b">
+                    <a:lnL w="9525" cap="flat" cmpd="sng" algn="ctr">
+                      <a:solidFill>
+                        <a:srgbClr val="DDDDDD"/>
+                      </a:solidFill>
+                      <a:prstDash val="solid"/>
+                      <a:round/>
+                      <a:headEnd type="none" w="med" len="med"/>
+                      <a:tailEnd type="none" w="med" len="med"/>
+                    </a:lnL>
+                    <a:lnR w="9525" cap="flat" cmpd="sng" algn="ctr">
+                      <a:solidFill>
+                        <a:srgbClr val="DDDDDD"/>
+                      </a:solidFill>
+                      <a:prstDash val="solid"/>
+                      <a:round/>
+                      <a:headEnd type="none" w="med" len="med"/>
+                      <a:tailEnd type="none" w="med" len="med"/>
+                    </a:lnR>
+                    <a:lnT w="9525" cap="flat" cmpd="sng" algn="ctr">
+                      <a:solidFill>
+                        <a:srgbClr val="DDDDDD"/>
+                      </a:solidFill>
+                      <a:prstDash val="solid"/>
+                      <a:round/>
+                      <a:headEnd type="none" w="med" len="med"/>
+                      <a:tailEnd type="none" w="med" len="med"/>
+                    </a:lnT>
+                    <a:lnB w="9525" cap="flat" cmpd="sng" algn="ctr">
+                      <a:solidFill>
+                        <a:srgbClr val="DDDDDD"/>
+                      </a:solidFill>
+                      <a:prstDash val="solid"/>
+                      <a:round/>
+                      <a:headEnd type="none" w="med" len="med"/>
+                      <a:tailEnd type="none" w="med" len="med"/>
+                    </a:lnB>
+                    <a:solidFill>
+                      <a:srgbClr val="FFFFFF"/>
+                    </a:solidFill>
+                  </a:tcPr>
+                </a:tc>
+                <a:tc>
+                  <a:txBody>
+                    <a:bodyPr/>
+                    <a:lstStyle/>
+                    <a:p>
+                      <a:pPr algn="l" fontAlgn="b"/>
+                      <a:r>
+                        <a:rPr lang="en-US" sz="1600" b="1">
+                          <a:effectLst/>
+                        </a:rPr>
+                        <a:t>Assembly Instruction</a:t>
+                      </a:r>
+                    </a:p>
+                  </a:txBody>
+                  <a:tcPr marL="66219" marR="66219" marT="66219" marB="66219" anchor="b">
+                    <a:lnL w="9525" cap="flat" cmpd="sng" algn="ctr">
+                      <a:solidFill>
+                        <a:srgbClr val="DDDDDD"/>
+                      </a:solidFill>
+                      <a:prstDash val="solid"/>
+                      <a:round/>
+                      <a:headEnd type="none" w="med" len="med"/>
+                      <a:tailEnd type="none" w="med" len="med"/>
+                    </a:lnL>
+                    <a:lnR w="9525" cap="flat" cmpd="sng" algn="ctr">
+                      <a:solidFill>
+                        <a:srgbClr val="DDDDDD"/>
+                      </a:solidFill>
+                      <a:prstDash val="solid"/>
+                      <a:round/>
+                      <a:headEnd type="none" w="med" len="med"/>
+                      <a:tailEnd type="none" w="med" len="med"/>
+                    </a:lnR>
+                    <a:lnT w="9525" cap="flat" cmpd="sng" algn="ctr">
+                      <a:solidFill>
+                        <a:srgbClr val="DDDDDD"/>
+                      </a:solidFill>
+                      <a:prstDash val="solid"/>
+                      <a:round/>
+                      <a:headEnd type="none" w="med" len="med"/>
+                      <a:tailEnd type="none" w="med" len="med"/>
+                    </a:lnT>
+                    <a:lnB w="9525" cap="flat" cmpd="sng" algn="ctr">
+                      <a:solidFill>
+                        <a:srgbClr val="DDDDDD"/>
+                      </a:solidFill>
+                      <a:prstDash val="solid"/>
+                      <a:round/>
+                      <a:headEnd type="none" w="med" len="med"/>
+                      <a:tailEnd type="none" w="med" len="med"/>
+                    </a:lnB>
+                    <a:solidFill>
+                      <a:srgbClr val="FFFFFF"/>
+                    </a:solidFill>
+                  </a:tcPr>
+                </a:tc>
+                <a:tc>
+                  <a:txBody>
+                    <a:bodyPr/>
+                    <a:lstStyle/>
+                    <a:p>
+                      <a:pPr algn="l" fontAlgn="b"/>
+                      <a:r>
+                        <a:rPr lang="en-US" sz="1600" b="1">
+                          <a:effectLst/>
+                        </a:rPr>
+                        <a:t>Notes</a:t>
+                      </a:r>
+                    </a:p>
+                  </a:txBody>
+                  <a:tcPr marL="66219" marR="66219" marT="66219" marB="66219" anchor="b">
+                    <a:lnL w="9525" cap="flat" cmpd="sng" algn="ctr">
+                      <a:solidFill>
+                        <a:srgbClr val="DDDDDD"/>
+                      </a:solidFill>
+                      <a:prstDash val="solid"/>
+                      <a:round/>
+                      <a:headEnd type="none" w="med" len="med"/>
+                      <a:tailEnd type="none" w="med" len="med"/>
+                    </a:lnL>
+                    <a:lnR w="9525" cap="flat" cmpd="sng" algn="ctr">
+                      <a:solidFill>
+                        <a:srgbClr val="DDDDDD"/>
+                      </a:solidFill>
+                      <a:prstDash val="solid"/>
+                      <a:round/>
+                      <a:headEnd type="none" w="med" len="med"/>
+                      <a:tailEnd type="none" w="med" len="med"/>
+                    </a:lnR>
+                    <a:lnT w="9525" cap="flat" cmpd="sng" algn="ctr">
+                      <a:solidFill>
+                        <a:srgbClr val="DDDDDD"/>
+                      </a:solidFill>
+                      <a:prstDash val="solid"/>
+                      <a:round/>
+                      <a:headEnd type="none" w="med" len="med"/>
+                      <a:tailEnd type="none" w="med" len="med"/>
+                    </a:lnT>
+                    <a:lnB w="9525" cap="flat" cmpd="sng" algn="ctr">
+                      <a:solidFill>
+                        <a:srgbClr val="DDDDDD"/>
+                      </a:solidFill>
+                      <a:prstDash val="solid"/>
+                      <a:round/>
+                      <a:headEnd type="none" w="med" len="med"/>
+                      <a:tailEnd type="none" w="med" len="med"/>
+                    </a:lnB>
+                    <a:solidFill>
+                      <a:srgbClr val="FFFFFF"/>
+                    </a:solidFill>
+                  </a:tcPr>
+                </a:tc>
+              </a:tr>
+              <a:tr h="609210">
+                <a:tc>
+                  <a:txBody>
+                    <a:bodyPr/>
+                    <a:lstStyle/>
+                    <a:p>
+                      <a:pPr algn="l" fontAlgn="t"/>
+                      <a:r>
+                        <a:rPr lang="en-US" sz="1600">
+                          <a:effectLst/>
+                        </a:rPr>
+                        <a:t>NOP</a:t>
+                      </a:r>
+                    </a:p>
+                  </a:txBody>
+                  <a:tcPr marL="66219" marR="66219" marT="66219" marB="66219">
+                    <a:lnL w="9525" cap="flat" cmpd="sng" algn="ctr">
+                      <a:solidFill>
+                        <a:srgbClr val="DDDDDD"/>
+                      </a:solidFill>
+                      <a:prstDash val="solid"/>
+                      <a:round/>
+                      <a:headEnd type="none" w="med" len="med"/>
+                      <a:tailEnd type="none" w="med" len="med"/>
+                    </a:lnL>
+                    <a:lnR w="9525" cap="flat" cmpd="sng" algn="ctr">
+                      <a:solidFill>
+                        <a:srgbClr val="DDDDDD"/>
+                      </a:solidFill>
+                      <a:prstDash val="solid"/>
+                      <a:round/>
+                      <a:headEnd type="none" w="med" len="med"/>
+                      <a:tailEnd type="none" w="med" len="med"/>
+                    </a:lnR>
+                    <a:lnT w="9525" cap="flat" cmpd="sng" algn="ctr">
+                      <a:solidFill>
+                        <a:srgbClr val="DDDDDD"/>
+                      </a:solidFill>
+                      <a:prstDash val="solid"/>
+                      <a:round/>
+                      <a:headEnd type="none" w="med" len="med"/>
+                      <a:tailEnd type="none" w="med" len="med"/>
+                    </a:lnT>
+                    <a:lnB w="9525" cap="flat" cmpd="sng" algn="ctr">
+                      <a:solidFill>
+                        <a:srgbClr val="DDDDDD"/>
+                      </a:solidFill>
+                      <a:prstDash val="solid"/>
+                      <a:round/>
+                      <a:headEnd type="none" w="med" len="med"/>
+                      <a:tailEnd type="none" w="med" len="med"/>
+                    </a:lnB>
+                    <a:solidFill>
+                      <a:srgbClr val="F9F9F9"/>
+                    </a:solidFill>
+                  </a:tcPr>
+                </a:tc>
+                <a:tc>
+                  <a:txBody>
+                    <a:bodyPr/>
+                    <a:lstStyle/>
+                    <a:p>
+                      <a:pPr algn="l" fontAlgn="t"/>
+                      <a:r>
+                        <a:rPr lang="en-US" sz="1600" dirty="0">
+                          <a:effectLst/>
+                        </a:rPr>
+                        <a:t>MOV r3, r3</a:t>
+                      </a:r>
+                    </a:p>
+                  </a:txBody>
+                  <a:tcPr marL="66219" marR="66219" marT="66219" marB="66219">
+                    <a:lnL w="9525" cap="flat" cmpd="sng" algn="ctr">
+                      <a:solidFill>
+                        <a:srgbClr val="DDDDDD"/>
+                      </a:solidFill>
+                      <a:prstDash val="solid"/>
+                      <a:round/>
+                      <a:headEnd type="none" w="med" len="med"/>
+                      <a:tailEnd type="none" w="med" len="med"/>
+                    </a:lnL>
+                    <a:lnR w="9525" cap="flat" cmpd="sng" algn="ctr">
+                      <a:solidFill>
+                        <a:srgbClr val="DDDDDD"/>
+                      </a:solidFill>
+                      <a:prstDash val="solid"/>
+                      <a:round/>
+                      <a:headEnd type="none" w="med" len="med"/>
+                      <a:tailEnd type="none" w="med" len="med"/>
+                    </a:lnR>
+                    <a:lnT w="9525" cap="flat" cmpd="sng" algn="ctr">
+                      <a:solidFill>
+                        <a:srgbClr val="DDDDDD"/>
+                      </a:solidFill>
+                      <a:prstDash val="solid"/>
+                      <a:round/>
+                      <a:headEnd type="none" w="med" len="med"/>
+                      <a:tailEnd type="none" w="med" len="med"/>
+                    </a:lnT>
+                    <a:lnB w="9525" cap="flat" cmpd="sng" algn="ctr">
+                      <a:solidFill>
+                        <a:srgbClr val="DDDDDD"/>
+                      </a:solidFill>
+                      <a:prstDash val="solid"/>
+                      <a:round/>
+                      <a:headEnd type="none" w="med" len="med"/>
+                      <a:tailEnd type="none" w="med" len="med"/>
+                    </a:lnB>
+                    <a:solidFill>
+                      <a:srgbClr val="F9F9F9"/>
+                    </a:solidFill>
+                  </a:tcPr>
+                </a:tc>
+                <a:tc>
+                  <a:txBody>
+                    <a:bodyPr/>
+                    <a:lstStyle/>
+                    <a:p>
+                      <a:pPr algn="l" fontAlgn="t"/>
+                      <a:r>
+                        <a:rPr lang="en-US" sz="1600">
+                          <a:effectLst/>
+                        </a:rPr>
+                        <a:t>Any register from r3 to r15 would do the same thing.</a:t>
+                      </a:r>
+                    </a:p>
+                  </a:txBody>
+                  <a:tcPr marL="66219" marR="66219" marT="66219" marB="66219">
+                    <a:lnL w="9525" cap="flat" cmpd="sng" algn="ctr">
+                      <a:solidFill>
+                        <a:srgbClr val="DDDDDD"/>
+                      </a:solidFill>
+                      <a:prstDash val="solid"/>
+                      <a:round/>
+                      <a:headEnd type="none" w="med" len="med"/>
+                      <a:tailEnd type="none" w="med" len="med"/>
+                    </a:lnL>
+                    <a:lnR w="9525" cap="flat" cmpd="sng" algn="ctr">
+                      <a:solidFill>
+                        <a:srgbClr val="DDDDDD"/>
+                      </a:solidFill>
+                      <a:prstDash val="solid"/>
+                      <a:round/>
+                      <a:headEnd type="none" w="med" len="med"/>
+                      <a:tailEnd type="none" w="med" len="med"/>
+                    </a:lnR>
+                    <a:lnT w="9525" cap="flat" cmpd="sng" algn="ctr">
+                      <a:solidFill>
+                        <a:srgbClr val="DDDDDD"/>
+                      </a:solidFill>
+                      <a:prstDash val="solid"/>
+                      <a:round/>
+                      <a:headEnd type="none" w="med" len="med"/>
+                      <a:tailEnd type="none" w="med" len="med"/>
+                    </a:lnT>
+                    <a:lnB w="9525" cap="flat" cmpd="sng" algn="ctr">
+                      <a:solidFill>
+                        <a:srgbClr val="DDDDDD"/>
+                      </a:solidFill>
+                      <a:prstDash val="solid"/>
+                      <a:round/>
+                      <a:headEnd type="none" w="med" len="med"/>
+                      <a:tailEnd type="none" w="med" len="med"/>
+                    </a:lnB>
+                    <a:solidFill>
+                      <a:srgbClr val="F9F9F9"/>
+                    </a:solidFill>
+                  </a:tcPr>
+                </a:tc>
+              </a:tr>
+              <a:tr h="370824">
+                <a:tc>
+                  <a:txBody>
+                    <a:bodyPr/>
+                    <a:lstStyle/>
+                    <a:p>
+                      <a:pPr algn="l" fontAlgn="t"/>
+                      <a:r>
+                        <a:rPr lang="en-US" sz="1600">
+                          <a:effectLst/>
+                        </a:rPr>
+                        <a:t>POP dst</a:t>
+                      </a:r>
+                    </a:p>
+                  </a:txBody>
+                  <a:tcPr marL="66219" marR="66219" marT="66219" marB="66219">
+                    <a:lnL w="9525" cap="flat" cmpd="sng" algn="ctr">
+                      <a:solidFill>
+                        <a:srgbClr val="DDDDDD"/>
+                      </a:solidFill>
+                      <a:prstDash val="solid"/>
+                      <a:round/>
+                      <a:headEnd type="none" w="med" len="med"/>
+                      <a:tailEnd type="none" w="med" len="med"/>
+                    </a:lnL>
+                    <a:lnR w="9525" cap="flat" cmpd="sng" algn="ctr">
+                      <a:solidFill>
+                        <a:srgbClr val="DDDDDD"/>
+                      </a:solidFill>
+                      <a:prstDash val="solid"/>
+                      <a:round/>
+                      <a:headEnd type="none" w="med" len="med"/>
+                      <a:tailEnd type="none" w="med" len="med"/>
+                    </a:lnR>
+                    <a:lnT w="9525" cap="flat" cmpd="sng" algn="ctr">
+                      <a:solidFill>
+                        <a:srgbClr val="DDDDDD"/>
+                      </a:solidFill>
+                      <a:prstDash val="solid"/>
+                      <a:round/>
+                      <a:headEnd type="none" w="med" len="med"/>
+                      <a:tailEnd type="none" w="med" len="med"/>
+                    </a:lnT>
+                    <a:lnB w="9525" cap="flat" cmpd="sng" algn="ctr">
+                      <a:solidFill>
+                        <a:srgbClr val="DDDDDD"/>
+                      </a:solidFill>
+                      <a:prstDash val="solid"/>
+                      <a:round/>
+                      <a:headEnd type="none" w="med" len="med"/>
+                      <a:tailEnd type="none" w="med" len="med"/>
+                    </a:lnB>
+                    <a:solidFill>
+                      <a:srgbClr val="FFFFFF"/>
+                    </a:solidFill>
+                  </a:tcPr>
+                </a:tc>
+                <a:tc>
+                  <a:txBody>
+                    <a:bodyPr/>
+                    <a:lstStyle/>
+                    <a:p>
+                      <a:pPr algn="l" fontAlgn="t"/>
+                      <a:r>
+                        <a:rPr lang="en-US" sz="1600">
+                          <a:effectLst/>
+                        </a:rPr>
+                        <a:t>MOV @SP+, dst</a:t>
+                      </a:r>
+                    </a:p>
+                  </a:txBody>
+                  <a:tcPr marL="66219" marR="66219" marT="66219" marB="66219">
+                    <a:lnL w="9525" cap="flat" cmpd="sng" algn="ctr">
+                      <a:solidFill>
+                        <a:srgbClr val="DDDDDD"/>
+                      </a:solidFill>
+                      <a:prstDash val="solid"/>
+                      <a:round/>
+                      <a:headEnd type="none" w="med" len="med"/>
+                      <a:tailEnd type="none" w="med" len="med"/>
+                    </a:lnL>
+                    <a:lnR w="9525" cap="flat" cmpd="sng" algn="ctr">
+                      <a:solidFill>
+                        <a:srgbClr val="DDDDDD"/>
+                      </a:solidFill>
+                      <a:prstDash val="solid"/>
+                      <a:round/>
+                      <a:headEnd type="none" w="med" len="med"/>
+                      <a:tailEnd type="none" w="med" len="med"/>
+                    </a:lnR>
+                    <a:lnT w="9525" cap="flat" cmpd="sng" algn="ctr">
+                      <a:solidFill>
+                        <a:srgbClr val="DDDDDD"/>
+                      </a:solidFill>
+                      <a:prstDash val="solid"/>
+                      <a:round/>
+                      <a:headEnd type="none" w="med" len="med"/>
+                      <a:tailEnd type="none" w="med" len="med"/>
+                    </a:lnT>
+                    <a:lnB w="9525" cap="flat" cmpd="sng" algn="ctr">
+                      <a:solidFill>
+                        <a:srgbClr val="DDDDDD"/>
+                      </a:solidFill>
+                      <a:prstDash val="solid"/>
+                      <a:round/>
+                      <a:headEnd type="none" w="med" len="med"/>
+                      <a:tailEnd type="none" w="med" len="med"/>
+                    </a:lnB>
+                    <a:solidFill>
+                      <a:srgbClr val="FFFFFF"/>
+                    </a:solidFill>
+                  </a:tcPr>
+                </a:tc>
+                <a:tc>
+                  <a:txBody>
+                    <a:bodyPr/>
+                    <a:lstStyle/>
+                    <a:p>
+                      <a:endParaRPr lang="en-US" sz="1600" dirty="0"/>
+                    </a:p>
+                  </a:txBody>
+                  <a:tcPr marL="79462" marR="79462" marT="39731" marB="39731">
+                    <a:lnL w="9525" cap="flat" cmpd="sng" algn="ctr">
+                      <a:solidFill>
+                        <a:srgbClr val="DDDDDD"/>
+                      </a:solidFill>
+                      <a:prstDash val="solid"/>
+                      <a:round/>
+                      <a:headEnd type="none" w="med" len="med"/>
+                      <a:tailEnd type="none" w="med" len="med"/>
+                    </a:lnL>
+                    <a:lnT w="9525" cap="flat" cmpd="sng" algn="ctr">
+                      <a:solidFill>
+                        <a:srgbClr val="DDDDDD"/>
+                      </a:solidFill>
+                      <a:prstDash val="solid"/>
+                      <a:round/>
+                      <a:headEnd type="none" w="med" len="med"/>
+                      <a:tailEnd type="none" w="med" len="med"/>
+                    </a:lnT>
+                    <a:lnB w="9525" cap="flat" cmpd="sng" algn="ctr">
+                      <a:solidFill>
+                        <a:srgbClr val="DDDDDD"/>
+                      </a:solidFill>
+                      <a:prstDash val="solid"/>
+                      <a:round/>
+                      <a:headEnd type="none" w="med" len="med"/>
+                      <a:tailEnd type="none" w="med" len="med"/>
+                    </a:lnB>
+                  </a:tcPr>
+                </a:tc>
+              </a:tr>
+              <a:tr h="370824">
+                <a:tc>
+                  <a:txBody>
+                    <a:bodyPr/>
+                    <a:lstStyle/>
+                    <a:p>
+                      <a:pPr algn="l" fontAlgn="t"/>
+                      <a:r>
+                        <a:rPr lang="en-US" dirty="0">
+                          <a:effectLst/>
+                        </a:rPr>
+                        <a:t>BR </a:t>
+                      </a:r>
+                      <a:r>
+                        <a:rPr lang="en-US" dirty="0" err="1">
+                          <a:effectLst/>
+                        </a:rPr>
+                        <a:t>dst</a:t>
+                      </a:r>
+                      <a:endParaRPr lang="en-US" dirty="0">
+                        <a:effectLst/>
+                      </a:endParaRPr>
+                    </a:p>
+                  </a:txBody>
+                  <a:tcPr marL="76200" marR="76200" marT="76200" marB="76200">
+                    <a:lnL w="9525" cap="flat" cmpd="sng" algn="ctr">
+                      <a:solidFill>
+                        <a:srgbClr val="DDDDDD"/>
+                      </a:solidFill>
+                      <a:prstDash val="solid"/>
+                      <a:round/>
+                      <a:headEnd type="none" w="med" len="med"/>
+                      <a:tailEnd type="none" w="med" len="med"/>
+                    </a:lnL>
+                    <a:lnR w="9525" cap="flat" cmpd="sng" algn="ctr">
+                      <a:solidFill>
+                        <a:srgbClr val="DDDDDD"/>
+                      </a:solidFill>
+                      <a:prstDash val="solid"/>
+                      <a:round/>
+                      <a:headEnd type="none" w="med" len="med"/>
+                      <a:tailEnd type="none" w="med" len="med"/>
+                    </a:lnR>
+                    <a:lnT w="9525" cap="flat" cmpd="sng" algn="ctr">
+                      <a:solidFill>
+                        <a:srgbClr val="DDDDDD"/>
+                      </a:solidFill>
+                      <a:prstDash val="solid"/>
+                      <a:round/>
+                      <a:headEnd type="none" w="med" len="med"/>
+                      <a:tailEnd type="none" w="med" len="med"/>
+                    </a:lnT>
+                    <a:lnB w="9525" cap="flat" cmpd="sng" algn="ctr">
+                      <a:solidFill>
+                        <a:srgbClr val="DDDDDD"/>
+                      </a:solidFill>
+                      <a:prstDash val="solid"/>
+                      <a:round/>
+                      <a:headEnd type="none" w="med" len="med"/>
+                      <a:tailEnd type="none" w="med" len="med"/>
+                    </a:lnB>
+                    <a:solidFill>
+                      <a:srgbClr val="FFFFFF"/>
+                    </a:solidFill>
+                  </a:tcPr>
+                </a:tc>
+                <a:tc>
+                  <a:txBody>
+                    <a:bodyPr/>
+                    <a:lstStyle/>
+                    <a:p>
+                      <a:pPr algn="l" fontAlgn="t"/>
+                      <a:r>
+                        <a:rPr lang="en-US" dirty="0">
+                          <a:effectLst/>
+                        </a:rPr>
+                        <a:t>MOV </a:t>
+                      </a:r>
+                      <a:r>
+                        <a:rPr lang="en-US" dirty="0" err="1">
+                          <a:effectLst/>
+                        </a:rPr>
+                        <a:t>dst</a:t>
+                      </a:r>
+                      <a:r>
+                        <a:rPr lang="en-US" dirty="0">
+                          <a:effectLst/>
+                        </a:rPr>
+                        <a:t>, PC</a:t>
+                      </a:r>
+                    </a:p>
+                  </a:txBody>
+                  <a:tcPr marL="76200" marR="76200" marT="76200" marB="76200">
+                    <a:lnL w="9525" cap="flat" cmpd="sng" algn="ctr">
+                      <a:solidFill>
+                        <a:srgbClr val="DDDDDD"/>
+                      </a:solidFill>
+                      <a:prstDash val="solid"/>
+                      <a:round/>
+                      <a:headEnd type="none" w="med" len="med"/>
+                      <a:tailEnd type="none" w="med" len="med"/>
+                    </a:lnL>
+                    <a:lnR w="9525" cap="flat" cmpd="sng" algn="ctr">
+                      <a:solidFill>
+                        <a:srgbClr val="DDDDDD"/>
+                      </a:solidFill>
+                      <a:prstDash val="solid"/>
+                      <a:round/>
+                      <a:headEnd type="none" w="med" len="med"/>
+                      <a:tailEnd type="none" w="med" len="med"/>
+                    </a:lnR>
+                    <a:lnT w="9525" cap="flat" cmpd="sng" algn="ctr">
+                      <a:solidFill>
+                        <a:srgbClr val="DDDDDD"/>
+                      </a:solidFill>
+                      <a:prstDash val="solid"/>
+                      <a:round/>
+                      <a:headEnd type="none" w="med" len="med"/>
+                      <a:tailEnd type="none" w="med" len="med"/>
+                    </a:lnT>
+                    <a:lnB w="9525" cap="flat" cmpd="sng" algn="ctr">
+                      <a:solidFill>
+                        <a:srgbClr val="DDDDDD"/>
+                      </a:solidFill>
+                      <a:prstDash val="solid"/>
+                      <a:round/>
+                      <a:headEnd type="none" w="med" len="med"/>
+                      <a:tailEnd type="none" w="med" len="med"/>
+                    </a:lnB>
+                    <a:solidFill>
+                      <a:srgbClr val="FFFFFF"/>
+                    </a:solidFill>
+                  </a:tcPr>
+                </a:tc>
+                <a:tc>
+                  <a:txBody>
+                    <a:bodyPr/>
+                    <a:lstStyle/>
+                    <a:p>
+                      <a:pPr algn="l" fontAlgn="t"/>
+                      <a:r>
+                        <a:rPr lang="en-US" dirty="0">
+                          <a:effectLst/>
+                        </a:rPr>
+                        <a:t>BR </a:t>
+                      </a:r>
+                      <a:r>
+                        <a:rPr lang="en-US" dirty="0" err="1">
+                          <a:effectLst/>
+                        </a:rPr>
+                        <a:t>dst</a:t>
+                      </a:r>
+                      <a:endParaRPr lang="en-US" dirty="0">
+                        <a:effectLst/>
+                      </a:endParaRPr>
+                    </a:p>
+                  </a:txBody>
+                  <a:tcPr marL="76200" marR="76200" marT="76200" marB="76200">
+                    <a:lnL w="9525" cap="flat" cmpd="sng" algn="ctr">
+                      <a:solidFill>
+                        <a:srgbClr val="DDDDDD"/>
+                      </a:solidFill>
+                      <a:prstDash val="solid"/>
+                      <a:round/>
+                      <a:headEnd type="none" w="med" len="med"/>
+                      <a:tailEnd type="none" w="med" len="med"/>
+                    </a:lnL>
+                    <a:lnT w="9525" cap="flat" cmpd="sng" algn="ctr">
+                      <a:solidFill>
+                        <a:srgbClr val="DDDDDD"/>
+                      </a:solidFill>
+                      <a:prstDash val="solid"/>
+                      <a:round/>
+                      <a:headEnd type="none" w="med" len="med"/>
+                      <a:tailEnd type="none" w="med" len="med"/>
+                    </a:lnT>
+                    <a:lnB w="9525" cap="flat" cmpd="sng" algn="ctr">
+                      <a:solidFill>
+                        <a:srgbClr val="DDDDDD"/>
+                      </a:solidFill>
+                      <a:prstDash val="solid"/>
+                      <a:round/>
+                      <a:headEnd type="none" w="med" len="med"/>
+                      <a:tailEnd type="none" w="med" len="med"/>
+                    </a:lnB>
+                  </a:tcPr>
+                </a:tc>
+              </a:tr>
+              <a:tr h="370824">
+                <a:tc>
+                  <a:txBody>
+                    <a:bodyPr/>
+                    <a:lstStyle/>
+                    <a:p>
+                      <a:pPr algn="l" fontAlgn="t"/>
+                      <a:r>
+                        <a:rPr lang="en-US">
+                          <a:effectLst/>
+                        </a:rPr>
+                        <a:t>RET</a:t>
+                      </a:r>
+                    </a:p>
+                  </a:txBody>
+                  <a:tcPr marL="76200" marR="76200" marT="76200" marB="76200">
+                    <a:lnL w="9525" cap="flat" cmpd="sng" algn="ctr">
+                      <a:solidFill>
+                        <a:srgbClr val="DDDDDD"/>
+                      </a:solidFill>
+                      <a:prstDash val="solid"/>
+                      <a:round/>
+                      <a:headEnd type="none" w="med" len="med"/>
+                      <a:tailEnd type="none" w="med" len="med"/>
+                    </a:lnL>
+                    <a:lnR w="9525" cap="flat" cmpd="sng" algn="ctr">
+                      <a:solidFill>
+                        <a:srgbClr val="DDDDDD"/>
+                      </a:solidFill>
+                      <a:prstDash val="solid"/>
+                      <a:round/>
+                      <a:headEnd type="none" w="med" len="med"/>
+                      <a:tailEnd type="none" w="med" len="med"/>
+                    </a:lnR>
+                    <a:lnT w="9525" cap="flat" cmpd="sng" algn="ctr">
+                      <a:solidFill>
+                        <a:srgbClr val="DDDDDD"/>
+                      </a:solidFill>
+                      <a:prstDash val="solid"/>
+                      <a:round/>
+                      <a:headEnd type="none" w="med" len="med"/>
+                      <a:tailEnd type="none" w="med" len="med"/>
+                    </a:lnT>
+                    <a:lnB w="9525" cap="flat" cmpd="sng" algn="ctr">
+                      <a:solidFill>
+                        <a:srgbClr val="DDDDDD"/>
+                      </a:solidFill>
+                      <a:prstDash val="solid"/>
+                      <a:round/>
+                      <a:headEnd type="none" w="med" len="med"/>
+                      <a:tailEnd type="none" w="med" len="med"/>
+                    </a:lnB>
+                    <a:solidFill>
+                      <a:srgbClr val="FFFFFF"/>
+                    </a:solidFill>
+                  </a:tcPr>
+                </a:tc>
+                <a:tc>
+                  <a:txBody>
+                    <a:bodyPr/>
+                    <a:lstStyle/>
+                    <a:p>
+                      <a:pPr algn="l" fontAlgn="t"/>
+                      <a:r>
+                        <a:rPr lang="en-US">
+                          <a:effectLst/>
+                        </a:rPr>
+                        <a:t>MOV @SP+, PC</a:t>
+                      </a:r>
+                    </a:p>
+                  </a:txBody>
+                  <a:tcPr marL="76200" marR="76200" marT="76200" marB="76200">
+                    <a:lnL w="9525" cap="flat" cmpd="sng" algn="ctr">
+                      <a:solidFill>
+                        <a:srgbClr val="DDDDDD"/>
+                      </a:solidFill>
+                      <a:prstDash val="solid"/>
+                      <a:round/>
+                      <a:headEnd type="none" w="med" len="med"/>
+                      <a:tailEnd type="none" w="med" len="med"/>
+                    </a:lnL>
+                    <a:lnR w="9525" cap="flat" cmpd="sng" algn="ctr">
+                      <a:solidFill>
+                        <a:srgbClr val="DDDDDD"/>
+                      </a:solidFill>
+                      <a:prstDash val="solid"/>
+                      <a:round/>
+                      <a:headEnd type="none" w="med" len="med"/>
+                      <a:tailEnd type="none" w="med" len="med"/>
+                    </a:lnR>
+                    <a:lnT w="9525" cap="flat" cmpd="sng" algn="ctr">
+                      <a:solidFill>
+                        <a:srgbClr val="DDDDDD"/>
+                      </a:solidFill>
+                      <a:prstDash val="solid"/>
+                      <a:round/>
+                      <a:headEnd type="none" w="med" len="med"/>
+                      <a:tailEnd type="none" w="med" len="med"/>
+                    </a:lnT>
+                    <a:lnB w="9525" cap="flat" cmpd="sng" algn="ctr">
+                      <a:solidFill>
+                        <a:srgbClr val="DDDDDD"/>
+                      </a:solidFill>
+                      <a:prstDash val="solid"/>
+                      <a:round/>
+                      <a:headEnd type="none" w="med" len="med"/>
+                      <a:tailEnd type="none" w="med" len="med"/>
+                    </a:lnB>
+                    <a:solidFill>
+                      <a:srgbClr val="FFFFFF"/>
+                    </a:solidFill>
+                  </a:tcPr>
+                </a:tc>
+                <a:tc>
+                  <a:txBody>
+                    <a:bodyPr/>
+                    <a:lstStyle/>
+                    <a:p>
+                      <a:pPr algn="l" fontAlgn="t"/>
+                      <a:r>
+                        <a:rPr lang="en-US" dirty="0">
+                          <a:effectLst/>
+                        </a:rPr>
+                        <a:t>RET</a:t>
+                      </a:r>
+                    </a:p>
+                  </a:txBody>
+                  <a:tcPr marL="76200" marR="76200" marT="76200" marB="76200">
+                    <a:lnL w="9525" cap="flat" cmpd="sng" algn="ctr">
+                      <a:solidFill>
+                        <a:srgbClr val="DDDDDD"/>
+                      </a:solidFill>
+                      <a:prstDash val="solid"/>
+                      <a:round/>
+                      <a:headEnd type="none" w="med" len="med"/>
+                      <a:tailEnd type="none" w="med" len="med"/>
+                    </a:lnL>
+                    <a:lnT w="9525" cap="flat" cmpd="sng" algn="ctr">
+                      <a:solidFill>
+                        <a:srgbClr val="DDDDDD"/>
+                      </a:solidFill>
+                      <a:prstDash val="solid"/>
+                      <a:round/>
+                      <a:headEnd type="none" w="med" len="med"/>
+                      <a:tailEnd type="none" w="med" len="med"/>
+                    </a:lnT>
+                    <a:lnB w="9525" cap="flat" cmpd="sng" algn="ctr">
+                      <a:solidFill>
+                        <a:srgbClr val="DDDDDD"/>
+                      </a:solidFill>
+                      <a:prstDash val="solid"/>
+                      <a:round/>
+                      <a:headEnd type="none" w="med" len="med"/>
+                      <a:tailEnd type="none" w="med" len="med"/>
+                    </a:lnB>
+                  </a:tcPr>
+                </a:tc>
+              </a:tr>
+              <a:tr h="370824">
+                <a:tc>
+                  <a:txBody>
+                    <a:bodyPr/>
+                    <a:lstStyle/>
+                    <a:p>
+                      <a:pPr algn="l" fontAlgn="t"/>
+                      <a:r>
+                        <a:rPr lang="en-US" dirty="0">
+                          <a:effectLst/>
+                        </a:rPr>
+                        <a:t>CLRC</a:t>
+                      </a:r>
+                    </a:p>
+                  </a:txBody>
+                  <a:tcPr marL="76200" marR="76200" marT="76200" marB="76200">
+                    <a:lnL w="9525" cap="flat" cmpd="sng" algn="ctr">
+                      <a:solidFill>
+                        <a:srgbClr val="DDDDDD"/>
+                      </a:solidFill>
+                      <a:prstDash val="solid"/>
+                      <a:round/>
+                      <a:headEnd type="none" w="med" len="med"/>
+                      <a:tailEnd type="none" w="med" len="med"/>
+                    </a:lnL>
+                    <a:lnR w="9525" cap="flat" cmpd="sng" algn="ctr">
+                      <a:solidFill>
+                        <a:srgbClr val="DDDDDD"/>
+                      </a:solidFill>
+                      <a:prstDash val="solid"/>
+                      <a:round/>
+                      <a:headEnd type="none" w="med" len="med"/>
+                      <a:tailEnd type="none" w="med" len="med"/>
+                    </a:lnR>
+                    <a:lnT w="9525" cap="flat" cmpd="sng" algn="ctr">
+                      <a:solidFill>
+                        <a:srgbClr val="DDDDDD"/>
+                      </a:solidFill>
+                      <a:prstDash val="solid"/>
+                      <a:round/>
+                      <a:headEnd type="none" w="med" len="med"/>
+                      <a:tailEnd type="none" w="med" len="med"/>
+                    </a:lnT>
+                    <a:lnB w="9525" cap="flat" cmpd="sng" algn="ctr">
+                      <a:solidFill>
+                        <a:srgbClr val="DDDDDD"/>
+                      </a:solidFill>
+                      <a:prstDash val="solid"/>
+                      <a:round/>
+                      <a:headEnd type="none" w="med" len="med"/>
+                      <a:tailEnd type="none" w="med" len="med"/>
+                    </a:lnB>
+                    <a:solidFill>
+                      <a:srgbClr val="FFFFFF"/>
+                    </a:solidFill>
+                  </a:tcPr>
+                </a:tc>
+                <a:tc>
+                  <a:txBody>
+                    <a:bodyPr/>
+                    <a:lstStyle/>
+                    <a:p>
+                      <a:pPr algn="l" fontAlgn="t"/>
+                      <a:r>
+                        <a:rPr lang="en-US">
+                          <a:effectLst/>
+                        </a:rPr>
+                        <a:t>BIC #1, SR</a:t>
+                      </a:r>
+                    </a:p>
+                  </a:txBody>
+                  <a:tcPr marL="76200" marR="76200" marT="76200" marB="76200">
+                    <a:lnL w="9525" cap="flat" cmpd="sng" algn="ctr">
+                      <a:solidFill>
+                        <a:srgbClr val="DDDDDD"/>
+                      </a:solidFill>
+                      <a:prstDash val="solid"/>
+                      <a:round/>
+                      <a:headEnd type="none" w="med" len="med"/>
+                      <a:tailEnd type="none" w="med" len="med"/>
+                    </a:lnL>
+                    <a:lnR w="9525" cap="flat" cmpd="sng" algn="ctr">
+                      <a:solidFill>
+                        <a:srgbClr val="DDDDDD"/>
+                      </a:solidFill>
+                      <a:prstDash val="solid"/>
+                      <a:round/>
+                      <a:headEnd type="none" w="med" len="med"/>
+                      <a:tailEnd type="none" w="med" len="med"/>
+                    </a:lnR>
+                    <a:lnT w="9525" cap="flat" cmpd="sng" algn="ctr">
+                      <a:solidFill>
+                        <a:srgbClr val="DDDDDD"/>
+                      </a:solidFill>
+                      <a:prstDash val="solid"/>
+                      <a:round/>
+                      <a:headEnd type="none" w="med" len="med"/>
+                      <a:tailEnd type="none" w="med" len="med"/>
+                    </a:lnT>
+                    <a:lnB w="9525" cap="flat" cmpd="sng" algn="ctr">
+                      <a:solidFill>
+                        <a:srgbClr val="DDDDDD"/>
+                      </a:solidFill>
+                      <a:prstDash val="solid"/>
+                      <a:round/>
+                      <a:headEnd type="none" w="med" len="med"/>
+                      <a:tailEnd type="none" w="med" len="med"/>
+                    </a:lnB>
+                    <a:solidFill>
+                      <a:srgbClr val="FFFFFF"/>
+                    </a:solidFill>
+                  </a:tcPr>
+                </a:tc>
+                <a:tc>
+                  <a:txBody>
+                    <a:bodyPr/>
+                    <a:lstStyle/>
+                    <a:p>
+                      <a:pPr algn="l" fontAlgn="t"/>
+                      <a:endParaRPr lang="en-US" dirty="0">
+                        <a:effectLst/>
+                      </a:endParaRPr>
+                    </a:p>
+                  </a:txBody>
+                  <a:tcPr marL="76200" marR="76200" marT="76200" marB="76200">
+                    <a:lnL w="9525" cap="flat" cmpd="sng" algn="ctr">
+                      <a:solidFill>
+                        <a:srgbClr val="DDDDDD"/>
+                      </a:solidFill>
+                      <a:prstDash val="solid"/>
+                      <a:round/>
+                      <a:headEnd type="none" w="med" len="med"/>
+                      <a:tailEnd type="none" w="med" len="med"/>
+                    </a:lnL>
+                    <a:lnT w="9525" cap="flat" cmpd="sng" algn="ctr">
+                      <a:solidFill>
+                        <a:srgbClr val="DDDDDD"/>
+                      </a:solidFill>
+                      <a:prstDash val="solid"/>
+                      <a:round/>
+                      <a:headEnd type="none" w="med" len="med"/>
+                      <a:tailEnd type="none" w="med" len="med"/>
+                    </a:lnT>
+                    <a:lnB w="9525" cap="flat" cmpd="sng" algn="ctr">
+                      <a:solidFill>
+                        <a:srgbClr val="DDDDDD"/>
+                      </a:solidFill>
+                      <a:prstDash val="solid"/>
+                      <a:round/>
+                      <a:headEnd type="none" w="med" len="med"/>
+                      <a:tailEnd type="none" w="med" len="med"/>
+                    </a:lnB>
+                  </a:tcPr>
+                </a:tc>
+              </a:tr>
+              <a:tr h="370824">
+                <a:tc>
+                  <a:txBody>
+                    <a:bodyPr/>
+                    <a:lstStyle/>
+                    <a:p>
+                      <a:pPr algn="l" fontAlgn="t"/>
+                      <a:r>
+                        <a:rPr lang="en-US">
+                          <a:effectLst/>
+                        </a:rPr>
+                        <a:t>SETC</a:t>
+                      </a:r>
+                    </a:p>
+                  </a:txBody>
+                  <a:tcPr marL="76200" marR="76200" marT="76200" marB="76200">
+                    <a:lnL w="9525" cap="flat" cmpd="sng" algn="ctr">
+                      <a:solidFill>
+                        <a:srgbClr val="DDDDDD"/>
+                      </a:solidFill>
+                      <a:prstDash val="solid"/>
+                      <a:round/>
+                      <a:headEnd type="none" w="med" len="med"/>
+                      <a:tailEnd type="none" w="med" len="med"/>
+                    </a:lnL>
+                    <a:lnR w="9525" cap="flat" cmpd="sng" algn="ctr">
+                      <a:solidFill>
+                        <a:srgbClr val="DDDDDD"/>
+                      </a:solidFill>
+                      <a:prstDash val="solid"/>
+                      <a:round/>
+                      <a:headEnd type="none" w="med" len="med"/>
+                      <a:tailEnd type="none" w="med" len="med"/>
+                    </a:lnR>
+                    <a:lnT w="9525" cap="flat" cmpd="sng" algn="ctr">
+                      <a:solidFill>
+                        <a:srgbClr val="DDDDDD"/>
+                      </a:solidFill>
+                      <a:prstDash val="solid"/>
+                      <a:round/>
+                      <a:headEnd type="none" w="med" len="med"/>
+                      <a:tailEnd type="none" w="med" len="med"/>
+                    </a:lnT>
+                    <a:lnB w="9525" cap="flat" cmpd="sng" algn="ctr">
+                      <a:solidFill>
+                        <a:srgbClr val="DDDDDD"/>
+                      </a:solidFill>
+                      <a:prstDash val="solid"/>
+                      <a:round/>
+                      <a:headEnd type="none" w="med" len="med"/>
+                      <a:tailEnd type="none" w="med" len="med"/>
+                    </a:lnB>
+                    <a:solidFill>
+                      <a:srgbClr val="FFFFFF"/>
+                    </a:solidFill>
+                  </a:tcPr>
+                </a:tc>
+                <a:tc>
+                  <a:txBody>
+                    <a:bodyPr/>
+                    <a:lstStyle/>
+                    <a:p>
+                      <a:pPr algn="l" fontAlgn="t"/>
+                      <a:r>
+                        <a:rPr lang="en-US">
+                          <a:effectLst/>
+                        </a:rPr>
+                        <a:t>BIS #1, SR</a:t>
+                      </a:r>
+                    </a:p>
+                  </a:txBody>
+                  <a:tcPr marL="76200" marR="76200" marT="76200" marB="76200">
+                    <a:lnL w="9525" cap="flat" cmpd="sng" algn="ctr">
+                      <a:solidFill>
+                        <a:srgbClr val="DDDDDD"/>
+                      </a:solidFill>
+                      <a:prstDash val="solid"/>
+                      <a:round/>
+                      <a:headEnd type="none" w="med" len="med"/>
+                      <a:tailEnd type="none" w="med" len="med"/>
+                    </a:lnL>
+                    <a:lnR w="9525" cap="flat" cmpd="sng" algn="ctr">
+                      <a:solidFill>
+                        <a:srgbClr val="DDDDDD"/>
+                      </a:solidFill>
+                      <a:prstDash val="solid"/>
+                      <a:round/>
+                      <a:headEnd type="none" w="med" len="med"/>
+                      <a:tailEnd type="none" w="med" len="med"/>
+                    </a:lnR>
+                    <a:lnT w="9525" cap="flat" cmpd="sng" algn="ctr">
+                      <a:solidFill>
+                        <a:srgbClr val="DDDDDD"/>
+                      </a:solidFill>
+                      <a:prstDash val="solid"/>
+                      <a:round/>
+                      <a:headEnd type="none" w="med" len="med"/>
+                      <a:tailEnd type="none" w="med" len="med"/>
+                    </a:lnT>
+                    <a:lnB w="9525" cap="flat" cmpd="sng" algn="ctr">
+                      <a:solidFill>
+                        <a:srgbClr val="DDDDDD"/>
+                      </a:solidFill>
+                      <a:prstDash val="solid"/>
+                      <a:round/>
+                      <a:headEnd type="none" w="med" len="med"/>
+                      <a:tailEnd type="none" w="med" len="med"/>
+                    </a:lnB>
+                    <a:solidFill>
+                      <a:srgbClr val="FFFFFF"/>
+                    </a:solidFill>
+                  </a:tcPr>
+                </a:tc>
+                <a:tc>
+                  <a:txBody>
+                    <a:bodyPr/>
+                    <a:lstStyle/>
+                    <a:p>
+                      <a:pPr algn="l" fontAlgn="t"/>
+                      <a:endParaRPr lang="en-US" dirty="0">
+                        <a:effectLst/>
+                      </a:endParaRPr>
+                    </a:p>
+                  </a:txBody>
+                  <a:tcPr marL="76200" marR="76200" marT="76200" marB="76200">
+                    <a:lnL w="9525" cap="flat" cmpd="sng" algn="ctr">
+                      <a:solidFill>
+                        <a:srgbClr val="DDDDDD"/>
+                      </a:solidFill>
+                      <a:prstDash val="solid"/>
+                      <a:round/>
+                      <a:headEnd type="none" w="med" len="med"/>
+                      <a:tailEnd type="none" w="med" len="med"/>
+                    </a:lnL>
+                    <a:lnT w="9525" cap="flat" cmpd="sng" algn="ctr">
+                      <a:solidFill>
+                        <a:srgbClr val="DDDDDD"/>
+                      </a:solidFill>
+                      <a:prstDash val="solid"/>
+                      <a:round/>
+                      <a:headEnd type="none" w="med" len="med"/>
+                      <a:tailEnd type="none" w="med" len="med"/>
+                    </a:lnT>
+                    <a:lnB w="9525" cap="flat" cmpd="sng" algn="ctr">
+                      <a:solidFill>
+                        <a:srgbClr val="DDDDDD"/>
+                      </a:solidFill>
+                      <a:prstDash val="solid"/>
+                      <a:round/>
+                      <a:headEnd type="none" w="med" len="med"/>
+                      <a:tailEnd type="none" w="med" len="med"/>
+                    </a:lnB>
+                  </a:tcPr>
+                </a:tc>
+              </a:tr>
+              <a:tr h="370824">
+                <a:tc>
+                  <a:txBody>
+                    <a:bodyPr/>
+                    <a:lstStyle/>
+                    <a:p>
+                      <a:pPr algn="l" fontAlgn="t"/>
+                      <a:r>
+                        <a:rPr lang="en-US">
+                          <a:effectLst/>
+                        </a:rPr>
+                        <a:t>CLRZ</a:t>
+                      </a:r>
+                    </a:p>
+                  </a:txBody>
+                  <a:tcPr marL="76200" marR="76200" marT="76200" marB="76200">
+                    <a:lnL w="9525" cap="flat" cmpd="sng" algn="ctr">
+                      <a:solidFill>
+                        <a:srgbClr val="DDDDDD"/>
+                      </a:solidFill>
+                      <a:prstDash val="solid"/>
+                      <a:round/>
+                      <a:headEnd type="none" w="med" len="med"/>
+                      <a:tailEnd type="none" w="med" len="med"/>
+                    </a:lnL>
+                    <a:lnR w="9525" cap="flat" cmpd="sng" algn="ctr">
+                      <a:solidFill>
+                        <a:srgbClr val="DDDDDD"/>
+                      </a:solidFill>
+                      <a:prstDash val="solid"/>
+                      <a:round/>
+                      <a:headEnd type="none" w="med" len="med"/>
+                      <a:tailEnd type="none" w="med" len="med"/>
+                    </a:lnR>
+                    <a:lnT w="9525" cap="flat" cmpd="sng" algn="ctr">
+                      <a:solidFill>
+                        <a:srgbClr val="DDDDDD"/>
+                      </a:solidFill>
+                      <a:prstDash val="solid"/>
+                      <a:round/>
+                      <a:headEnd type="none" w="med" len="med"/>
+                      <a:tailEnd type="none" w="med" len="med"/>
+                    </a:lnT>
+                    <a:lnB w="9525" cap="flat" cmpd="sng" algn="ctr">
+                      <a:solidFill>
+                        <a:srgbClr val="DDDDDD"/>
+                      </a:solidFill>
+                      <a:prstDash val="solid"/>
+                      <a:round/>
+                      <a:headEnd type="none" w="med" len="med"/>
+                      <a:tailEnd type="none" w="med" len="med"/>
+                    </a:lnB>
+                    <a:solidFill>
+                      <a:srgbClr val="FFFFFF"/>
+                    </a:solidFill>
+                  </a:tcPr>
+                </a:tc>
+                <a:tc>
+                  <a:txBody>
+                    <a:bodyPr/>
+                    <a:lstStyle/>
+                    <a:p>
+                      <a:pPr algn="l" fontAlgn="t"/>
+                      <a:r>
+                        <a:rPr lang="en-US">
+                          <a:effectLst/>
+                        </a:rPr>
+                        <a:t>BIC #2, SR</a:t>
+                      </a:r>
+                    </a:p>
+                  </a:txBody>
+                  <a:tcPr marL="76200" marR="76200" marT="76200" marB="76200">
+                    <a:lnL w="9525" cap="flat" cmpd="sng" algn="ctr">
+                      <a:solidFill>
+                        <a:srgbClr val="DDDDDD"/>
+                      </a:solidFill>
+                      <a:prstDash val="solid"/>
+                      <a:round/>
+                      <a:headEnd type="none" w="med" len="med"/>
+                      <a:tailEnd type="none" w="med" len="med"/>
+                    </a:lnL>
+                    <a:lnR w="9525" cap="flat" cmpd="sng" algn="ctr">
+                      <a:solidFill>
+                        <a:srgbClr val="DDDDDD"/>
+                      </a:solidFill>
+                      <a:prstDash val="solid"/>
+                      <a:round/>
+                      <a:headEnd type="none" w="med" len="med"/>
+                      <a:tailEnd type="none" w="med" len="med"/>
+                    </a:lnR>
+                    <a:lnT w="9525" cap="flat" cmpd="sng" algn="ctr">
+                      <a:solidFill>
+                        <a:srgbClr val="DDDDDD"/>
+                      </a:solidFill>
+                      <a:prstDash val="solid"/>
+                      <a:round/>
+                      <a:headEnd type="none" w="med" len="med"/>
+                      <a:tailEnd type="none" w="med" len="med"/>
+                    </a:lnT>
+                    <a:lnB w="9525" cap="flat" cmpd="sng" algn="ctr">
+                      <a:solidFill>
+                        <a:srgbClr val="DDDDDD"/>
+                      </a:solidFill>
+                      <a:prstDash val="solid"/>
+                      <a:round/>
+                      <a:headEnd type="none" w="med" len="med"/>
+                      <a:tailEnd type="none" w="med" len="med"/>
+                    </a:lnB>
+                    <a:solidFill>
+                      <a:srgbClr val="FFFFFF"/>
+                    </a:solidFill>
+                  </a:tcPr>
+                </a:tc>
+                <a:tc>
+                  <a:txBody>
+                    <a:bodyPr/>
+                    <a:lstStyle/>
+                    <a:p>
+                      <a:pPr algn="l" fontAlgn="t"/>
+                      <a:endParaRPr lang="en-US" dirty="0">
+                        <a:effectLst/>
+                      </a:endParaRPr>
+                    </a:p>
+                  </a:txBody>
+                  <a:tcPr marL="76200" marR="76200" marT="76200" marB="76200">
+                    <a:lnL w="9525" cap="flat" cmpd="sng" algn="ctr">
+                      <a:solidFill>
+                        <a:srgbClr val="DDDDDD"/>
+                      </a:solidFill>
+                      <a:prstDash val="solid"/>
+                      <a:round/>
+                      <a:headEnd type="none" w="med" len="med"/>
+                      <a:tailEnd type="none" w="med" len="med"/>
+                    </a:lnL>
+                    <a:lnT w="9525" cap="flat" cmpd="sng" algn="ctr">
+                      <a:solidFill>
+                        <a:srgbClr val="DDDDDD"/>
+                      </a:solidFill>
+                      <a:prstDash val="solid"/>
+                      <a:round/>
+                      <a:headEnd type="none" w="med" len="med"/>
+                      <a:tailEnd type="none" w="med" len="med"/>
+                    </a:lnT>
+                    <a:lnB w="9525" cap="flat" cmpd="sng" algn="ctr">
+                      <a:solidFill>
+                        <a:srgbClr val="DDDDDD"/>
+                      </a:solidFill>
+                      <a:prstDash val="solid"/>
+                      <a:round/>
+                      <a:headEnd type="none" w="med" len="med"/>
+                      <a:tailEnd type="none" w="med" len="med"/>
+                    </a:lnB>
+                  </a:tcPr>
+                </a:tc>
+              </a:tr>
+              <a:tr h="370824">
+                <a:tc>
+                  <a:txBody>
+                    <a:bodyPr/>
+                    <a:lstStyle/>
+                    <a:p>
+                      <a:pPr algn="l" fontAlgn="t"/>
+                      <a:r>
+                        <a:rPr lang="en-US">
+                          <a:effectLst/>
+                        </a:rPr>
+                        <a:t>SETZ</a:t>
+                      </a:r>
+                    </a:p>
+                  </a:txBody>
+                  <a:tcPr marL="76200" marR="76200" marT="76200" marB="76200">
+                    <a:lnL w="9525" cap="flat" cmpd="sng" algn="ctr">
+                      <a:solidFill>
+                        <a:srgbClr val="DDDDDD"/>
+                      </a:solidFill>
+                      <a:prstDash val="solid"/>
+                      <a:round/>
+                      <a:headEnd type="none" w="med" len="med"/>
+                      <a:tailEnd type="none" w="med" len="med"/>
+                    </a:lnL>
+                    <a:lnR w="9525" cap="flat" cmpd="sng" algn="ctr">
+                      <a:solidFill>
+                        <a:srgbClr val="DDDDDD"/>
+                      </a:solidFill>
+                      <a:prstDash val="solid"/>
+                      <a:round/>
+                      <a:headEnd type="none" w="med" len="med"/>
+                      <a:tailEnd type="none" w="med" len="med"/>
+                    </a:lnR>
+                    <a:lnT w="9525" cap="flat" cmpd="sng" algn="ctr">
+                      <a:solidFill>
+                        <a:srgbClr val="DDDDDD"/>
+                      </a:solidFill>
+                      <a:prstDash val="solid"/>
+                      <a:round/>
+                      <a:headEnd type="none" w="med" len="med"/>
+                      <a:tailEnd type="none" w="med" len="med"/>
+                    </a:lnT>
+                    <a:lnB w="9525" cap="flat" cmpd="sng" algn="ctr">
+                      <a:solidFill>
+                        <a:srgbClr val="DDDDDD"/>
+                      </a:solidFill>
+                      <a:prstDash val="solid"/>
+                      <a:round/>
+                      <a:headEnd type="none" w="med" len="med"/>
+                      <a:tailEnd type="none" w="med" len="med"/>
+                    </a:lnB>
+                    <a:solidFill>
+                      <a:srgbClr val="FFFFFF"/>
+                    </a:solidFill>
+                  </a:tcPr>
+                </a:tc>
+                <a:tc>
+                  <a:txBody>
+                    <a:bodyPr/>
+                    <a:lstStyle/>
+                    <a:p>
+                      <a:pPr algn="l" fontAlgn="t"/>
+                      <a:r>
+                        <a:rPr lang="en-US">
+                          <a:effectLst/>
+                        </a:rPr>
+                        <a:t>BIS #2, SR</a:t>
+                      </a:r>
+                    </a:p>
+                  </a:txBody>
+                  <a:tcPr marL="76200" marR="76200" marT="76200" marB="76200">
+                    <a:lnL w="9525" cap="flat" cmpd="sng" algn="ctr">
+                      <a:solidFill>
+                        <a:srgbClr val="DDDDDD"/>
+                      </a:solidFill>
+                      <a:prstDash val="solid"/>
+                      <a:round/>
+                      <a:headEnd type="none" w="med" len="med"/>
+                      <a:tailEnd type="none" w="med" len="med"/>
+                    </a:lnL>
+                    <a:lnR w="9525" cap="flat" cmpd="sng" algn="ctr">
+                      <a:solidFill>
+                        <a:srgbClr val="DDDDDD"/>
+                      </a:solidFill>
+                      <a:prstDash val="solid"/>
+                      <a:round/>
+                      <a:headEnd type="none" w="med" len="med"/>
+                      <a:tailEnd type="none" w="med" len="med"/>
+                    </a:lnR>
+                    <a:lnT w="9525" cap="flat" cmpd="sng" algn="ctr">
+                      <a:solidFill>
+                        <a:srgbClr val="DDDDDD"/>
+                      </a:solidFill>
+                      <a:prstDash val="solid"/>
+                      <a:round/>
+                      <a:headEnd type="none" w="med" len="med"/>
+                      <a:tailEnd type="none" w="med" len="med"/>
+                    </a:lnT>
+                    <a:lnB w="9525" cap="flat" cmpd="sng" algn="ctr">
+                      <a:solidFill>
+                        <a:srgbClr val="DDDDDD"/>
+                      </a:solidFill>
+                      <a:prstDash val="solid"/>
+                      <a:round/>
+                      <a:headEnd type="none" w="med" len="med"/>
+                      <a:tailEnd type="none" w="med" len="med"/>
+                    </a:lnB>
+                    <a:solidFill>
+                      <a:srgbClr val="FFFFFF"/>
+                    </a:solidFill>
+                  </a:tcPr>
+                </a:tc>
+                <a:tc>
+                  <a:txBody>
+                    <a:bodyPr/>
+                    <a:lstStyle/>
+                    <a:p>
+                      <a:pPr algn="l" fontAlgn="t"/>
+                      <a:endParaRPr lang="en-US" dirty="0">
+                        <a:effectLst/>
+                      </a:endParaRPr>
+                    </a:p>
+                  </a:txBody>
+                  <a:tcPr marL="76200" marR="76200" marT="76200" marB="76200">
+                    <a:lnL w="9525" cap="flat" cmpd="sng" algn="ctr">
+                      <a:solidFill>
+                        <a:srgbClr val="DDDDDD"/>
+                      </a:solidFill>
+                      <a:prstDash val="solid"/>
+                      <a:round/>
+                      <a:headEnd type="none" w="med" len="med"/>
+                      <a:tailEnd type="none" w="med" len="med"/>
+                    </a:lnL>
+                    <a:lnT w="9525" cap="flat" cmpd="sng" algn="ctr">
+                      <a:solidFill>
+                        <a:srgbClr val="DDDDDD"/>
+                      </a:solidFill>
+                      <a:prstDash val="solid"/>
+                      <a:round/>
+                      <a:headEnd type="none" w="med" len="med"/>
+                      <a:tailEnd type="none" w="med" len="med"/>
+                    </a:lnT>
+                    <a:lnB w="9525" cap="flat" cmpd="sng" algn="ctr">
+                      <a:solidFill>
+                        <a:srgbClr val="DDDDDD"/>
+                      </a:solidFill>
+                      <a:prstDash val="solid"/>
+                      <a:round/>
+                      <a:headEnd type="none" w="med" len="med"/>
+                      <a:tailEnd type="none" w="med" len="med"/>
+                    </a:lnB>
+                  </a:tcPr>
+                </a:tc>
+              </a:tr>
+              <a:tr h="370824">
+                <a:tc>
+                  <a:txBody>
+                    <a:bodyPr/>
+                    <a:lstStyle/>
+                    <a:p>
+                      <a:pPr algn="l" fontAlgn="t"/>
+                      <a:r>
+                        <a:rPr lang="en-US">
+                          <a:effectLst/>
+                        </a:rPr>
+                        <a:t>CLRN</a:t>
+                      </a:r>
+                    </a:p>
+                  </a:txBody>
+                  <a:tcPr marL="76200" marR="76200" marT="76200" marB="76200">
+                    <a:lnL w="9525" cap="flat" cmpd="sng" algn="ctr">
+                      <a:solidFill>
+                        <a:srgbClr val="DDDDDD"/>
+                      </a:solidFill>
+                      <a:prstDash val="solid"/>
+                      <a:round/>
+                      <a:headEnd type="none" w="med" len="med"/>
+                      <a:tailEnd type="none" w="med" len="med"/>
+                    </a:lnL>
+                    <a:lnR w="9525" cap="flat" cmpd="sng" algn="ctr">
+                      <a:solidFill>
+                        <a:srgbClr val="DDDDDD"/>
+                      </a:solidFill>
+                      <a:prstDash val="solid"/>
+                      <a:round/>
+                      <a:headEnd type="none" w="med" len="med"/>
+                      <a:tailEnd type="none" w="med" len="med"/>
+                    </a:lnR>
+                    <a:lnT w="9525" cap="flat" cmpd="sng" algn="ctr">
+                      <a:solidFill>
+                        <a:srgbClr val="DDDDDD"/>
+                      </a:solidFill>
+                      <a:prstDash val="solid"/>
+                      <a:round/>
+                      <a:headEnd type="none" w="med" len="med"/>
+                      <a:tailEnd type="none" w="med" len="med"/>
+                    </a:lnT>
+                    <a:lnB w="9525" cap="flat" cmpd="sng" algn="ctr">
+                      <a:solidFill>
+                        <a:srgbClr val="DDDDDD"/>
+                      </a:solidFill>
+                      <a:prstDash val="solid"/>
+                      <a:round/>
+                      <a:headEnd type="none" w="med" len="med"/>
+                      <a:tailEnd type="none" w="med" len="med"/>
+                    </a:lnB>
+                    <a:solidFill>
+                      <a:srgbClr val="FFFFFF"/>
+                    </a:solidFill>
+                  </a:tcPr>
+                </a:tc>
+                <a:tc>
+                  <a:txBody>
+                    <a:bodyPr/>
+                    <a:lstStyle/>
+                    <a:p>
+                      <a:pPr algn="l" fontAlgn="t"/>
+                      <a:r>
+                        <a:rPr lang="en-US">
+                          <a:effectLst/>
+                        </a:rPr>
+                        <a:t>BIC #4, SR</a:t>
+                      </a:r>
+                    </a:p>
+                  </a:txBody>
+                  <a:tcPr marL="76200" marR="76200" marT="76200" marB="76200">
+                    <a:lnL w="9525" cap="flat" cmpd="sng" algn="ctr">
+                      <a:solidFill>
+                        <a:srgbClr val="DDDDDD"/>
+                      </a:solidFill>
+                      <a:prstDash val="solid"/>
+                      <a:round/>
+                      <a:headEnd type="none" w="med" len="med"/>
+                      <a:tailEnd type="none" w="med" len="med"/>
+                    </a:lnL>
+                    <a:lnR w="9525" cap="flat" cmpd="sng" algn="ctr">
+                      <a:solidFill>
+                        <a:srgbClr val="DDDDDD"/>
+                      </a:solidFill>
+                      <a:prstDash val="solid"/>
+                      <a:round/>
+                      <a:headEnd type="none" w="med" len="med"/>
+                      <a:tailEnd type="none" w="med" len="med"/>
+                    </a:lnR>
+                    <a:lnT w="9525" cap="flat" cmpd="sng" algn="ctr">
+                      <a:solidFill>
+                        <a:srgbClr val="DDDDDD"/>
+                      </a:solidFill>
+                      <a:prstDash val="solid"/>
+                      <a:round/>
+                      <a:headEnd type="none" w="med" len="med"/>
+                      <a:tailEnd type="none" w="med" len="med"/>
+                    </a:lnT>
+                    <a:lnB w="9525" cap="flat" cmpd="sng" algn="ctr">
+                      <a:solidFill>
+                        <a:srgbClr val="DDDDDD"/>
+                      </a:solidFill>
+                      <a:prstDash val="solid"/>
+                      <a:round/>
+                      <a:headEnd type="none" w="med" len="med"/>
+                      <a:tailEnd type="none" w="med" len="med"/>
+                    </a:lnB>
+                    <a:solidFill>
+                      <a:srgbClr val="FFFFFF"/>
+                    </a:solidFill>
+                  </a:tcPr>
+                </a:tc>
+                <a:tc>
+                  <a:txBody>
+                    <a:bodyPr/>
+                    <a:lstStyle/>
+                    <a:p>
+                      <a:pPr algn="l" fontAlgn="t"/>
+                      <a:endParaRPr lang="en-US" dirty="0">
+                        <a:effectLst/>
+                      </a:endParaRPr>
+                    </a:p>
+                  </a:txBody>
+                  <a:tcPr marL="76200" marR="76200" marT="76200" marB="76200">
+                    <a:lnL w="9525" cap="flat" cmpd="sng" algn="ctr">
+                      <a:solidFill>
+                        <a:srgbClr val="DDDDDD"/>
+                      </a:solidFill>
+                      <a:prstDash val="solid"/>
+                      <a:round/>
+                      <a:headEnd type="none" w="med" len="med"/>
+                      <a:tailEnd type="none" w="med" len="med"/>
+                    </a:lnL>
+                    <a:lnT w="9525" cap="flat" cmpd="sng" algn="ctr">
+                      <a:solidFill>
+                        <a:srgbClr val="DDDDDD"/>
+                      </a:solidFill>
+                      <a:prstDash val="solid"/>
+                      <a:round/>
+                      <a:headEnd type="none" w="med" len="med"/>
+                      <a:tailEnd type="none" w="med" len="med"/>
+                    </a:lnT>
+                    <a:lnB w="9525" cap="flat" cmpd="sng" algn="ctr">
+                      <a:solidFill>
+                        <a:srgbClr val="DDDDDD"/>
+                      </a:solidFill>
+                      <a:prstDash val="solid"/>
+                      <a:round/>
+                      <a:headEnd type="none" w="med" len="med"/>
+                      <a:tailEnd type="none" w="med" len="med"/>
+                    </a:lnB>
+                  </a:tcPr>
+                </a:tc>
+              </a:tr>
+              <a:tr h="370824">
+                <a:tc>
+                  <a:txBody>
+                    <a:bodyPr/>
+                    <a:lstStyle/>
+                    <a:p>
+                      <a:pPr algn="l" fontAlgn="t"/>
+                      <a:r>
+                        <a:rPr lang="en-US">
+                          <a:effectLst/>
+                        </a:rPr>
+                        <a:t>SETN</a:t>
+                      </a:r>
+                    </a:p>
+                  </a:txBody>
+                  <a:tcPr marL="76200" marR="76200" marT="76200" marB="76200">
+                    <a:lnL w="9525" cap="flat" cmpd="sng" algn="ctr">
+                      <a:solidFill>
+                        <a:srgbClr val="DDDDDD"/>
+                      </a:solidFill>
+                      <a:prstDash val="solid"/>
+                      <a:round/>
+                      <a:headEnd type="none" w="med" len="med"/>
+                      <a:tailEnd type="none" w="med" len="med"/>
+                    </a:lnL>
+                    <a:lnR w="9525" cap="flat" cmpd="sng" algn="ctr">
+                      <a:solidFill>
+                        <a:srgbClr val="DDDDDD"/>
+                      </a:solidFill>
+                      <a:prstDash val="solid"/>
+                      <a:round/>
+                      <a:headEnd type="none" w="med" len="med"/>
+                      <a:tailEnd type="none" w="med" len="med"/>
+                    </a:lnR>
+                    <a:lnT w="9525" cap="flat" cmpd="sng" algn="ctr">
+                      <a:solidFill>
+                        <a:srgbClr val="DDDDDD"/>
+                      </a:solidFill>
+                      <a:prstDash val="solid"/>
+                      <a:round/>
+                      <a:headEnd type="none" w="med" len="med"/>
+                      <a:tailEnd type="none" w="med" len="med"/>
+                    </a:lnT>
+                    <a:lnB w="9525" cap="flat" cmpd="sng" algn="ctr">
+                      <a:solidFill>
+                        <a:srgbClr val="DDDDDD"/>
+                      </a:solidFill>
+                      <a:prstDash val="solid"/>
+                      <a:round/>
+                      <a:headEnd type="none" w="med" len="med"/>
+                      <a:tailEnd type="none" w="med" len="med"/>
+                    </a:lnB>
+                    <a:solidFill>
+                      <a:srgbClr val="FFFFFF"/>
+                    </a:solidFill>
+                  </a:tcPr>
+                </a:tc>
+                <a:tc>
+                  <a:txBody>
+                    <a:bodyPr/>
+                    <a:lstStyle/>
+                    <a:p>
+                      <a:pPr algn="l" fontAlgn="t"/>
+                      <a:r>
+                        <a:rPr lang="en-US">
+                          <a:effectLst/>
+                        </a:rPr>
+                        <a:t>BIS #4, SR</a:t>
+                      </a:r>
+                    </a:p>
+                  </a:txBody>
+                  <a:tcPr marL="76200" marR="76200" marT="76200" marB="76200">
+                    <a:lnL w="9525" cap="flat" cmpd="sng" algn="ctr">
+                      <a:solidFill>
+                        <a:srgbClr val="DDDDDD"/>
+                      </a:solidFill>
+                      <a:prstDash val="solid"/>
+                      <a:round/>
+                      <a:headEnd type="none" w="med" len="med"/>
+                      <a:tailEnd type="none" w="med" len="med"/>
+                    </a:lnL>
+                    <a:lnR w="9525" cap="flat" cmpd="sng" algn="ctr">
+                      <a:solidFill>
+                        <a:srgbClr val="DDDDDD"/>
+                      </a:solidFill>
+                      <a:prstDash val="solid"/>
+                      <a:round/>
+                      <a:headEnd type="none" w="med" len="med"/>
+                      <a:tailEnd type="none" w="med" len="med"/>
+                    </a:lnR>
+                    <a:lnT w="9525" cap="flat" cmpd="sng" algn="ctr">
+                      <a:solidFill>
+                        <a:srgbClr val="DDDDDD"/>
+                      </a:solidFill>
+                      <a:prstDash val="solid"/>
+                      <a:round/>
+                      <a:headEnd type="none" w="med" len="med"/>
+                      <a:tailEnd type="none" w="med" len="med"/>
+                    </a:lnT>
+                    <a:lnB w="9525" cap="flat" cmpd="sng" algn="ctr">
+                      <a:solidFill>
+                        <a:srgbClr val="DDDDDD"/>
+                      </a:solidFill>
+                      <a:prstDash val="solid"/>
+                      <a:round/>
+                      <a:headEnd type="none" w="med" len="med"/>
+                      <a:tailEnd type="none" w="med" len="med"/>
+                    </a:lnB>
+                    <a:solidFill>
+                      <a:srgbClr val="FFFFFF"/>
+                    </a:solidFill>
+                  </a:tcPr>
+                </a:tc>
+                <a:tc>
+                  <a:txBody>
+                    <a:bodyPr/>
+                    <a:lstStyle/>
+                    <a:p>
+                      <a:pPr algn="l" fontAlgn="t"/>
+                      <a:endParaRPr lang="en-US" dirty="0">
+                        <a:effectLst/>
+                      </a:endParaRPr>
+                    </a:p>
+                  </a:txBody>
+                  <a:tcPr marL="76200" marR="76200" marT="76200" marB="76200">
+                    <a:lnL w="9525" cap="flat" cmpd="sng" algn="ctr">
+                      <a:solidFill>
+                        <a:srgbClr val="DDDDDD"/>
+                      </a:solidFill>
+                      <a:prstDash val="solid"/>
+                      <a:round/>
+                      <a:headEnd type="none" w="med" len="med"/>
+                      <a:tailEnd type="none" w="med" len="med"/>
+                    </a:lnL>
+                    <a:lnT w="9525" cap="flat" cmpd="sng" algn="ctr">
+                      <a:solidFill>
+                        <a:srgbClr val="DDDDDD"/>
+                      </a:solidFill>
+                      <a:prstDash val="solid"/>
+                      <a:round/>
+                      <a:headEnd type="none" w="med" len="med"/>
+                      <a:tailEnd type="none" w="med" len="med"/>
+                    </a:lnT>
+                    <a:lnB w="9525" cap="flat" cmpd="sng" algn="ctr">
+                      <a:solidFill>
+                        <a:srgbClr val="DDDDDD"/>
+                      </a:solidFill>
+                      <a:prstDash val="solid"/>
+                      <a:round/>
+                      <a:headEnd type="none" w="med" len="med"/>
+                      <a:tailEnd type="none" w="med" len="med"/>
+                    </a:lnB>
+                  </a:tcPr>
+                </a:tc>
+              </a:tr>
+              <a:tr h="370824">
+                <a:tc>
+                  <a:txBody>
+                    <a:bodyPr/>
+                    <a:lstStyle/>
+                    <a:p>
+                      <a:pPr algn="l" fontAlgn="t"/>
+                      <a:r>
+                        <a:rPr lang="en-US">
+                          <a:effectLst/>
+                        </a:rPr>
+                        <a:t>DINT</a:t>
+                      </a:r>
+                    </a:p>
+                  </a:txBody>
+                  <a:tcPr marL="76200" marR="76200" marT="76200" marB="76200">
+                    <a:lnL w="9525" cap="flat" cmpd="sng" algn="ctr">
+                      <a:solidFill>
+                        <a:srgbClr val="DDDDDD"/>
+                      </a:solidFill>
+                      <a:prstDash val="solid"/>
+                      <a:round/>
+                      <a:headEnd type="none" w="med" len="med"/>
+                      <a:tailEnd type="none" w="med" len="med"/>
+                    </a:lnL>
+                    <a:lnR w="9525" cap="flat" cmpd="sng" algn="ctr">
+                      <a:solidFill>
+                        <a:srgbClr val="DDDDDD"/>
+                      </a:solidFill>
+                      <a:prstDash val="solid"/>
+                      <a:round/>
+                      <a:headEnd type="none" w="med" len="med"/>
+                      <a:tailEnd type="none" w="med" len="med"/>
+                    </a:lnR>
+                    <a:lnT w="9525" cap="flat" cmpd="sng" algn="ctr">
+                      <a:solidFill>
+                        <a:srgbClr val="DDDDDD"/>
+                      </a:solidFill>
+                      <a:prstDash val="solid"/>
+                      <a:round/>
+                      <a:headEnd type="none" w="med" len="med"/>
+                      <a:tailEnd type="none" w="med" len="med"/>
+                    </a:lnT>
+                    <a:lnB w="9525" cap="flat" cmpd="sng" algn="ctr">
+                      <a:solidFill>
+                        <a:srgbClr val="DDDDDD"/>
+                      </a:solidFill>
+                      <a:prstDash val="solid"/>
+                      <a:round/>
+                      <a:headEnd type="none" w="med" len="med"/>
+                      <a:tailEnd type="none" w="med" len="med"/>
+                    </a:lnB>
+                    <a:solidFill>
+                      <a:srgbClr val="FFFFFF"/>
+                    </a:solidFill>
+                  </a:tcPr>
+                </a:tc>
+                <a:tc>
+                  <a:txBody>
+                    <a:bodyPr/>
+                    <a:lstStyle/>
+                    <a:p>
+                      <a:pPr algn="l" fontAlgn="t"/>
+                      <a:r>
+                        <a:rPr lang="en-US">
+                          <a:effectLst/>
+                        </a:rPr>
+                        <a:t>BIC #8, SR</a:t>
+                      </a:r>
+                    </a:p>
+                  </a:txBody>
+                  <a:tcPr marL="76200" marR="76200" marT="76200" marB="76200">
+                    <a:lnL w="9525" cap="flat" cmpd="sng" algn="ctr">
+                      <a:solidFill>
+                        <a:srgbClr val="DDDDDD"/>
+                      </a:solidFill>
+                      <a:prstDash val="solid"/>
+                      <a:round/>
+                      <a:headEnd type="none" w="med" len="med"/>
+                      <a:tailEnd type="none" w="med" len="med"/>
+                    </a:lnL>
+                    <a:lnR w="9525" cap="flat" cmpd="sng" algn="ctr">
+                      <a:solidFill>
+                        <a:srgbClr val="DDDDDD"/>
+                      </a:solidFill>
+                      <a:prstDash val="solid"/>
+                      <a:round/>
+                      <a:headEnd type="none" w="med" len="med"/>
+                      <a:tailEnd type="none" w="med" len="med"/>
+                    </a:lnR>
+                    <a:lnT w="9525" cap="flat" cmpd="sng" algn="ctr">
+                      <a:solidFill>
+                        <a:srgbClr val="DDDDDD"/>
+                      </a:solidFill>
+                      <a:prstDash val="solid"/>
+                      <a:round/>
+                      <a:headEnd type="none" w="med" len="med"/>
+                      <a:tailEnd type="none" w="med" len="med"/>
+                    </a:lnT>
+                    <a:lnB w="9525" cap="flat" cmpd="sng" algn="ctr">
+                      <a:solidFill>
+                        <a:srgbClr val="DDDDDD"/>
+                      </a:solidFill>
+                      <a:prstDash val="solid"/>
+                      <a:round/>
+                      <a:headEnd type="none" w="med" len="med"/>
+                      <a:tailEnd type="none" w="med" len="med"/>
+                    </a:lnB>
+                    <a:solidFill>
+                      <a:srgbClr val="FFFFFF"/>
+                    </a:solidFill>
+                  </a:tcPr>
+                </a:tc>
+                <a:tc>
+                  <a:txBody>
+                    <a:bodyPr/>
+                    <a:lstStyle/>
+                    <a:p>
+                      <a:pPr algn="l" fontAlgn="t"/>
+                      <a:endParaRPr lang="en-US" dirty="0">
+                        <a:effectLst/>
+                      </a:endParaRPr>
+                    </a:p>
+                  </a:txBody>
+                  <a:tcPr marL="76200" marR="76200" marT="76200" marB="76200">
+                    <a:lnL w="9525" cap="flat" cmpd="sng" algn="ctr">
+                      <a:solidFill>
+                        <a:srgbClr val="DDDDDD"/>
+                      </a:solidFill>
+                      <a:prstDash val="solid"/>
+                      <a:round/>
+                      <a:headEnd type="none" w="med" len="med"/>
+                      <a:tailEnd type="none" w="med" len="med"/>
+                    </a:lnL>
+                    <a:lnT w="9525" cap="flat" cmpd="sng" algn="ctr">
+                      <a:solidFill>
+                        <a:srgbClr val="DDDDDD"/>
+                      </a:solidFill>
+                      <a:prstDash val="solid"/>
+                      <a:round/>
+                      <a:headEnd type="none" w="med" len="med"/>
+                      <a:tailEnd type="none" w="med" len="med"/>
+                    </a:lnT>
+                    <a:lnB w="9525" cap="flat" cmpd="sng" algn="ctr">
+                      <a:solidFill>
+                        <a:srgbClr val="DDDDDD"/>
+                      </a:solidFill>
+                      <a:prstDash val="solid"/>
+                      <a:round/>
+                      <a:headEnd type="none" w="med" len="med"/>
+                      <a:tailEnd type="none" w="med" len="med"/>
+                    </a:lnB>
+                  </a:tcPr>
+                </a:tc>
+              </a:tr>
+              <a:tr h="370824">
+                <a:tc>
+                  <a:txBody>
+                    <a:bodyPr/>
+                    <a:lstStyle/>
+                    <a:p>
+                      <a:pPr algn="l" fontAlgn="t"/>
+                      <a:r>
+                        <a:rPr lang="en-US">
+                          <a:effectLst/>
+                        </a:rPr>
+                        <a:t>EINT</a:t>
+                      </a:r>
+                    </a:p>
+                  </a:txBody>
+                  <a:tcPr marL="76200" marR="76200" marT="76200" marB="76200">
+                    <a:lnL w="9525" cap="flat" cmpd="sng" algn="ctr">
+                      <a:solidFill>
+                        <a:srgbClr val="DDDDDD"/>
+                      </a:solidFill>
+                      <a:prstDash val="solid"/>
+                      <a:round/>
+                      <a:headEnd type="none" w="med" len="med"/>
+                      <a:tailEnd type="none" w="med" len="med"/>
+                    </a:lnL>
+                    <a:lnR w="9525" cap="flat" cmpd="sng" algn="ctr">
+                      <a:solidFill>
+                        <a:srgbClr val="DDDDDD"/>
+                      </a:solidFill>
+                      <a:prstDash val="solid"/>
+                      <a:round/>
+                      <a:headEnd type="none" w="med" len="med"/>
+                      <a:tailEnd type="none" w="med" len="med"/>
+                    </a:lnR>
+                    <a:lnT w="9525" cap="flat" cmpd="sng" algn="ctr">
+                      <a:solidFill>
+                        <a:srgbClr val="DDDDDD"/>
+                      </a:solidFill>
+                      <a:prstDash val="solid"/>
+                      <a:round/>
+                      <a:headEnd type="none" w="med" len="med"/>
+                      <a:tailEnd type="none" w="med" len="med"/>
+                    </a:lnT>
+                    <a:lnB w="9525" cap="flat" cmpd="sng" algn="ctr">
+                      <a:solidFill>
+                        <a:srgbClr val="DDDDDD"/>
+                      </a:solidFill>
+                      <a:prstDash val="solid"/>
+                      <a:round/>
+                      <a:headEnd type="none" w="med" len="med"/>
+                      <a:tailEnd type="none" w="med" len="med"/>
+                    </a:lnB>
+                    <a:solidFill>
+                      <a:srgbClr val="FFFFFF"/>
+                    </a:solidFill>
+                  </a:tcPr>
+                </a:tc>
+                <a:tc>
+                  <a:txBody>
+                    <a:bodyPr/>
+                    <a:lstStyle/>
+                    <a:p>
+                      <a:pPr algn="l" fontAlgn="t"/>
+                      <a:r>
+                        <a:rPr lang="en-US" dirty="0">
+                          <a:effectLst/>
+                        </a:rPr>
+                        <a:t>BIS #8, SR</a:t>
+                      </a:r>
+                    </a:p>
+                  </a:txBody>
+                  <a:tcPr marL="76200" marR="76200" marT="76200" marB="76200">
+                    <a:lnL w="9525" cap="flat" cmpd="sng" algn="ctr">
+                      <a:solidFill>
+                        <a:srgbClr val="DDDDDD"/>
+                      </a:solidFill>
+                      <a:prstDash val="solid"/>
+                      <a:round/>
+                      <a:headEnd type="none" w="med" len="med"/>
+                      <a:tailEnd type="none" w="med" len="med"/>
+                    </a:lnL>
+                    <a:lnR w="9525" cap="flat" cmpd="sng" algn="ctr">
+                      <a:solidFill>
+                        <a:srgbClr val="DDDDDD"/>
+                      </a:solidFill>
+                      <a:prstDash val="solid"/>
+                      <a:round/>
+                      <a:headEnd type="none" w="med" len="med"/>
+                      <a:tailEnd type="none" w="med" len="med"/>
+                    </a:lnR>
+                    <a:lnT w="9525" cap="flat" cmpd="sng" algn="ctr">
+                      <a:solidFill>
+                        <a:srgbClr val="DDDDDD"/>
+                      </a:solidFill>
+                      <a:prstDash val="solid"/>
+                      <a:round/>
+                      <a:headEnd type="none" w="med" len="med"/>
+                      <a:tailEnd type="none" w="med" len="med"/>
+                    </a:lnT>
+                    <a:lnB w="9525" cap="flat" cmpd="sng" algn="ctr">
+                      <a:solidFill>
+                        <a:srgbClr val="DDDDDD"/>
+                      </a:solidFill>
+                      <a:prstDash val="solid"/>
+                      <a:round/>
+                      <a:headEnd type="none" w="med" len="med"/>
+                      <a:tailEnd type="none" w="med" len="med"/>
+                    </a:lnB>
+                    <a:solidFill>
+                      <a:srgbClr val="FFFFFF"/>
+                    </a:solidFill>
+                  </a:tcPr>
+                </a:tc>
+                <a:tc>
+                  <a:txBody>
+                    <a:bodyPr/>
+                    <a:lstStyle/>
+                    <a:p>
+                      <a:pPr algn="l" fontAlgn="t"/>
+                      <a:endParaRPr lang="en-US" dirty="0">
+                        <a:effectLst/>
+                      </a:endParaRPr>
+                    </a:p>
+                  </a:txBody>
+                  <a:tcPr marL="76200" marR="76200" marT="76200" marB="76200">
+                    <a:lnL w="9525" cap="flat" cmpd="sng" algn="ctr">
+                      <a:solidFill>
+                        <a:srgbClr val="DDDDDD"/>
+                      </a:solidFill>
+                      <a:prstDash val="solid"/>
+                      <a:round/>
+                      <a:headEnd type="none" w="med" len="med"/>
+                      <a:tailEnd type="none" w="med" len="med"/>
+                    </a:lnL>
+                    <a:lnT w="9525" cap="flat" cmpd="sng" algn="ctr">
+                      <a:solidFill>
+                        <a:srgbClr val="DDDDDD"/>
+                      </a:solidFill>
+                      <a:prstDash val="solid"/>
+                      <a:round/>
+                      <a:headEnd type="none" w="med" len="med"/>
+                      <a:tailEnd type="none" w="med" len="med"/>
+                    </a:lnT>
+                  </a:tcPr>
+                </a:tc>
+              </a:tr>
+            </a:tbl>
+          </a:graphicData>
+        </a:graphic>
+      </p:graphicFrame>
+    </p:spTree>
+    <p:extLst>
+      <p:ext uri="{BB962C8B-B14F-4D97-AF65-F5344CB8AC3E}">
+        <p14:creationId xmlns:p14="http://schemas.microsoft.com/office/powerpoint/2010/main" val="17552102"/>
+      </p:ext>
+    </p:extLst>
+  </p:cSld>
+  <p:clrMapOvr>
+    <a:masterClrMapping/>
+  </p:clrMapOvr>
+  <p:timing>
+    <p:tnLst>
+      <p:par>
+        <p:cTn id="1" dur="indefinite" restart="never" nodeType="tmRoot"/>
+      </p:par>
+    </p:tnLst>
+  </p:timing>
+</p:sld>
+</file>
+
+<file path=ppt/slides/slide22.xml><?xml version="1.0" encoding="utf-8"?>
+<p:sld xmlns:a="http://schemas.openxmlformats.org/drawingml/2006/main" xmlns:r="http://schemas.openxmlformats.org/officeDocument/2006/relationships" xmlns:p="http://schemas.openxmlformats.org/presentationml/2006/main">
+  <p:cSld>
+    <p:spTree>
+      <p:nvGrpSpPr>
+        <p:cNvPr id="1" name=""/>
+        <p:cNvGrpSpPr/>
+        <p:nvPr/>
+      </p:nvGrpSpPr>
+      <p:grpSpPr>
+        <a:xfrm>
+          <a:off x="0" y="0"/>
+          <a:ext cx="0" cy="0"/>
+          <a:chOff x="0" y="0"/>
+          <a:chExt cx="0" cy="0"/>
+        </a:xfrm>
+      </p:grpSpPr>
+      <p:sp>
+        <p:nvSpPr>
+          <p:cNvPr id="2" name="Title 1"/>
+          <p:cNvSpPr>
+            <a:spLocks noGrp="1"/>
+          </p:cNvSpPr>
+          <p:nvPr>
+            <p:ph type="title"/>
+          </p:nvPr>
+        </p:nvSpPr>
+        <p:spPr/>
+        <p:txBody>
+          <a:bodyPr/>
+          <a:lstStyle/>
+          <a:p>
+            <a:r>
+              <a:rPr lang="en-US" b="1" dirty="0" smtClean="0"/>
+              <a:t>More Emulated </a:t>
+            </a:r>
+            <a:r>
+              <a:rPr lang="en-US" b="1" dirty="0"/>
+              <a:t>Instructions</a:t>
+            </a:r>
+          </a:p>
+        </p:txBody>
+      </p:sp>
+      <p:sp>
+        <p:nvSpPr>
+          <p:cNvPr id="7" name="Rectangle 1"/>
+          <p:cNvSpPr>
+            <a:spLocks noChangeArrowheads="1"/>
+          </p:cNvSpPr>
+          <p:nvPr/>
+        </p:nvSpPr>
+        <p:spPr bwMode="auto">
+          <a:xfrm>
+            <a:off x="6115556" y="4767183"/>
+            <a:ext cx="219932" cy="523220"/>
+          </a:xfrm>
+          <a:prstGeom prst="rect">
+            <a:avLst/>
+          </a:prstGeom>
+          <a:noFill/>
+          <a:ln>
+            <a:noFill/>
+          </a:ln>
+          <a:effectLst/>
+          <a:extLst>
+            <a:ext uri="{909E8E84-426E-40DD-AFC4-6F175D3DCCD1}">
+              <a14:hiddenFill xmlns:a14="http://schemas.microsoft.com/office/drawing/2010/main">
+                <a:solidFill>
+                  <a:schemeClr val="accent1"/>
+                </a:solidFill>
+              </a14:hiddenFill>
+            </a:ext>
+            <a:ext uri="{91240B29-F687-4F45-9708-019B960494DF}">
+              <a14:hiddenLine xmlns:a14="http://schemas.microsoft.com/office/drawing/2010/main" w="9525">
+                <a:solidFill>
+                  <a:schemeClr val="tx1"/>
+                </a:solidFill>
+                <a:miter lim="800000"/>
+                <a:headEnd/>
+                <a:tailEnd/>
+              </a14:hiddenLine>
+            </a:ext>
+            <a:ext uri="{AF507438-7753-43E0-B8FC-AC1667EBCBE1}">
+              <a14:hiddenEffects xmlns:a14="http://schemas.microsoft.com/office/drawing/2010/main">
+                <a:effectLst>
+                  <a:outerShdw dist="35921" dir="2700000" algn="ctr" rotWithShape="0">
+                    <a:schemeClr val="bg2"/>
+                  </a:outerShdw>
+                </a:effectLst>
+              </a14:hiddenEffects>
+            </a:ext>
+          </a:extLst>
+        </p:spPr>
+        <p:txBody>
+          <a:bodyPr vert="horz" wrap="none" lIns="91440" tIns="45720" rIns="91440" bIns="45720" numCol="1" anchor="ctr" anchorCtr="0" compatLnSpc="1">
+            <a:prstTxWarp prst="textNoShape">
+              <a:avLst/>
+            </a:prstTxWarp>
+            <a:spAutoFit/>
+          </a:bodyPr>
+          <a:lstStyle/>
+          <a:p>
+            <a:pPr marL="0" marR="0" lvl="0" indent="0" algn="l" defTabSz="914400" rtl="0" eaLnBrk="1" fontAlgn="base" latinLnBrk="0" hangingPunct="1">
+              <a:lnSpc>
+                <a:spcPct val="100000"/>
+              </a:lnSpc>
+              <a:spcBef>
+                <a:spcPct val="0"/>
+              </a:spcBef>
+              <a:spcAft>
+                <a:spcPct val="0"/>
+              </a:spcAft>
+              <a:buClrTx/>
+              <a:buSzTx/>
+              <a:buFontTx/>
+              <a:buNone/>
+              <a:tabLst/>
+            </a:pPr>
+            <a:r>
+              <a:rPr kumimoji="0" lang="en-US" sz="1000" b="0" i="0" u="none" strike="noStrike" cap="none" normalizeH="0" baseline="0" dirty="0" smtClean="0">
+                <a:ln>
+                  <a:noFill/>
+                </a:ln>
+                <a:solidFill>
+                  <a:srgbClr val="333333"/>
+                </a:solidFill>
+                <a:effectLst/>
+                <a:latin typeface="Helvetica Neue"/>
+                <a:cs typeface="Arial" pitchFamily="34" charset="0"/>
+              </a:rPr>
+              <a:t>:</a:t>
+            </a:r>
+            <a:endParaRPr kumimoji="0" lang="en-US" sz="700" b="0" i="0" u="none" strike="noStrike" cap="none" normalizeH="0" baseline="0" dirty="0" smtClean="0">
+              <a:ln>
+                <a:noFill/>
+              </a:ln>
+              <a:solidFill>
+                <a:schemeClr val="tx1"/>
+              </a:solidFill>
+              <a:effectLst/>
+              <a:latin typeface="Arial" pitchFamily="34" charset="0"/>
+              <a:cs typeface="Arial" pitchFamily="34" charset="0"/>
+            </a:endParaRPr>
+          </a:p>
+          <a:p>
+            <a:pPr marL="0" marR="0" lvl="0" indent="0" algn="l" defTabSz="914400" rtl="0" eaLnBrk="0" fontAlgn="base" latinLnBrk="0" hangingPunct="0">
+              <a:lnSpc>
+                <a:spcPct val="100000"/>
+              </a:lnSpc>
+              <a:spcBef>
+                <a:spcPct val="0"/>
+              </a:spcBef>
+              <a:spcAft>
+                <a:spcPct val="0"/>
+              </a:spcAft>
+              <a:buClrTx/>
+              <a:buSzTx/>
+              <a:buFontTx/>
+              <a:buNone/>
+              <a:tabLst/>
+            </a:pPr>
+            <a:endParaRPr kumimoji="0" lang="en-US" sz="1800" b="0" i="0" u="none" strike="noStrike" cap="none" normalizeH="0" baseline="0" dirty="0" smtClean="0">
+              <a:ln>
+                <a:noFill/>
+              </a:ln>
+              <a:solidFill>
+                <a:schemeClr val="tx1"/>
+              </a:solidFill>
+              <a:effectLst/>
+              <a:latin typeface="Arial" pitchFamily="34" charset="0"/>
+              <a:cs typeface="Arial" pitchFamily="34" charset="0"/>
+            </a:endParaRPr>
+          </a:p>
+        </p:txBody>
+      </p:sp>
+      <p:graphicFrame>
+        <p:nvGraphicFramePr>
+          <p:cNvPr id="5" name="Content Placeholder 4"/>
+          <p:cNvGraphicFramePr>
+            <a:graphicFrameLocks noGrp="1"/>
+          </p:cNvGraphicFramePr>
+          <p:nvPr>
+            <p:ph idx="1"/>
+            <p:extLst>
+              <p:ext uri="{D42A27DB-BD31-4B8C-83A1-F6EECF244321}">
+                <p14:modId xmlns:p14="http://schemas.microsoft.com/office/powerpoint/2010/main" val="1656387051"/>
+              </p:ext>
+            </p:extLst>
+          </p:nvPr>
+        </p:nvGraphicFramePr>
+        <p:xfrm>
+          <a:off x="564419" y="806508"/>
+          <a:ext cx="7772400" cy="5396034"/>
+        </p:xfrm>
+        <a:graphic>
+          <a:graphicData uri="http://schemas.openxmlformats.org/drawingml/2006/table">
+            <a:tbl>
+              <a:tblPr/>
+              <a:tblGrid>
+                <a:gridCol w="3886200"/>
+                <a:gridCol w="3886200"/>
+              </a:tblGrid>
+              <a:tr h="370824">
+                <a:tc>
+                  <a:txBody>
+                    <a:bodyPr/>
+                    <a:lstStyle/>
+                    <a:p>
+                      <a:pPr algn="l" fontAlgn="b"/>
+                      <a:r>
+                        <a:rPr lang="en-US" sz="1600" b="1" dirty="0">
+                          <a:effectLst/>
+                        </a:rPr>
+                        <a:t>Emulated Instruction</a:t>
+                      </a:r>
+                    </a:p>
+                  </a:txBody>
+                  <a:tcPr marL="66219" marR="66219" marT="66219" marB="66219" anchor="b">
+                    <a:lnL w="9525" cap="flat" cmpd="sng" algn="ctr">
+                      <a:solidFill>
+                        <a:srgbClr val="DDDDDD"/>
+                      </a:solidFill>
+                      <a:prstDash val="solid"/>
+                      <a:round/>
+                      <a:headEnd type="none" w="med" len="med"/>
+                      <a:tailEnd type="none" w="med" len="med"/>
+                    </a:lnL>
+                    <a:lnR w="9525" cap="flat" cmpd="sng" algn="ctr">
+                      <a:solidFill>
+                        <a:srgbClr val="DDDDDD"/>
+                      </a:solidFill>
+                      <a:prstDash val="solid"/>
+                      <a:round/>
+                      <a:headEnd type="none" w="med" len="med"/>
+                      <a:tailEnd type="none" w="med" len="med"/>
+                    </a:lnR>
+                    <a:lnT w="9525" cap="flat" cmpd="sng" algn="ctr">
+                      <a:solidFill>
+                        <a:srgbClr val="DDDDDD"/>
+                      </a:solidFill>
+                      <a:prstDash val="solid"/>
+                      <a:round/>
+                      <a:headEnd type="none" w="med" len="med"/>
+                      <a:tailEnd type="none" w="med" len="med"/>
+                    </a:lnT>
+                    <a:lnB w="9525" cap="flat" cmpd="sng" algn="ctr">
+                      <a:solidFill>
+                        <a:srgbClr val="DDDDDD"/>
+                      </a:solidFill>
+                      <a:prstDash val="solid"/>
+                      <a:round/>
+                      <a:headEnd type="none" w="med" len="med"/>
+                      <a:tailEnd type="none" w="med" len="med"/>
+                    </a:lnB>
+                    <a:solidFill>
+                      <a:srgbClr val="FFFFFF"/>
+                    </a:solidFill>
+                  </a:tcPr>
+                </a:tc>
+                <a:tc>
+                  <a:txBody>
+                    <a:bodyPr/>
+                    <a:lstStyle/>
+                    <a:p>
+                      <a:pPr algn="l" fontAlgn="b"/>
+                      <a:r>
+                        <a:rPr lang="en-US" sz="1600" b="1">
+                          <a:effectLst/>
+                        </a:rPr>
+                        <a:t>Assembly Instruction</a:t>
+                      </a:r>
+                    </a:p>
+                  </a:txBody>
+                  <a:tcPr marL="66219" marR="66219" marT="66219" marB="66219" anchor="b">
+                    <a:lnL w="9525" cap="flat" cmpd="sng" algn="ctr">
+                      <a:solidFill>
+                        <a:srgbClr val="DDDDDD"/>
+                      </a:solidFill>
+                      <a:prstDash val="solid"/>
+                      <a:round/>
+                      <a:headEnd type="none" w="med" len="med"/>
+                      <a:tailEnd type="none" w="med" len="med"/>
+                    </a:lnL>
+                    <a:lnR w="9525" cap="flat" cmpd="sng" algn="ctr">
+                      <a:solidFill>
+                        <a:srgbClr val="DDDDDD"/>
+                      </a:solidFill>
+                      <a:prstDash val="solid"/>
+                      <a:round/>
+                      <a:headEnd type="none" w="med" len="med"/>
+                      <a:tailEnd type="none" w="med" len="med"/>
+                    </a:lnR>
+                    <a:lnT w="9525" cap="flat" cmpd="sng" algn="ctr">
+                      <a:solidFill>
+                        <a:srgbClr val="DDDDDD"/>
+                      </a:solidFill>
+                      <a:prstDash val="solid"/>
+                      <a:round/>
+                      <a:headEnd type="none" w="med" len="med"/>
+                      <a:tailEnd type="none" w="med" len="med"/>
+                    </a:lnT>
+                    <a:lnB w="9525" cap="flat" cmpd="sng" algn="ctr">
+                      <a:solidFill>
+                        <a:srgbClr val="DDDDDD"/>
+                      </a:solidFill>
+                      <a:prstDash val="solid"/>
+                      <a:round/>
+                      <a:headEnd type="none" w="med" len="med"/>
+                      <a:tailEnd type="none" w="med" len="med"/>
+                    </a:lnB>
+                    <a:solidFill>
+                      <a:srgbClr val="FFFFFF"/>
+                    </a:solidFill>
+                  </a:tcPr>
+                </a:tc>
+              </a:tr>
+              <a:tr h="370824">
+                <a:tc>
+                  <a:txBody>
+                    <a:bodyPr/>
+                    <a:lstStyle/>
+                    <a:p>
+                      <a:pPr algn="l" fontAlgn="t"/>
+                      <a:r>
+                        <a:rPr lang="en-US" sz="1600">
+                          <a:effectLst/>
+                        </a:rPr>
+                        <a:t>RLA(.B)</a:t>
+                      </a:r>
+                    </a:p>
+                  </a:txBody>
+                  <a:tcPr marL="66219" marR="66219" marT="66219" marB="66219">
+                    <a:lnL w="9525" cap="flat" cmpd="sng" algn="ctr">
+                      <a:solidFill>
+                        <a:srgbClr val="DDDDDD"/>
+                      </a:solidFill>
+                      <a:prstDash val="solid"/>
+                      <a:round/>
+                      <a:headEnd type="none" w="med" len="med"/>
+                      <a:tailEnd type="none" w="med" len="med"/>
+                    </a:lnL>
+                    <a:lnR w="9525" cap="flat" cmpd="sng" algn="ctr">
+                      <a:solidFill>
+                        <a:srgbClr val="DDDDDD"/>
+                      </a:solidFill>
+                      <a:prstDash val="solid"/>
+                      <a:round/>
+                      <a:headEnd type="none" w="med" len="med"/>
+                      <a:tailEnd type="none" w="med" len="med"/>
+                    </a:lnR>
+                    <a:lnT w="9525" cap="flat" cmpd="sng" algn="ctr">
+                      <a:solidFill>
+                        <a:srgbClr val="DDDDDD"/>
+                      </a:solidFill>
+                      <a:prstDash val="solid"/>
+                      <a:round/>
+                      <a:headEnd type="none" w="med" len="med"/>
+                      <a:tailEnd type="none" w="med" len="med"/>
+                    </a:lnT>
+                    <a:lnB w="9525" cap="flat" cmpd="sng" algn="ctr">
+                      <a:solidFill>
+                        <a:srgbClr val="DDDDDD"/>
+                      </a:solidFill>
+                      <a:prstDash val="solid"/>
+                      <a:round/>
+                      <a:headEnd type="none" w="med" len="med"/>
+                      <a:tailEnd type="none" w="med" len="med"/>
+                    </a:lnB>
+                    <a:solidFill>
+                      <a:srgbClr val="F9F9F9"/>
+                    </a:solidFill>
+                  </a:tcPr>
+                </a:tc>
+                <a:tc>
+                  <a:txBody>
+                    <a:bodyPr/>
+                    <a:lstStyle/>
+                    <a:p>
+                      <a:pPr algn="l" fontAlgn="t"/>
+                      <a:r>
+                        <a:rPr lang="en-US" sz="1600">
+                          <a:effectLst/>
+                        </a:rPr>
+                        <a:t>ADD(.B) dst, dst</a:t>
+                      </a:r>
+                    </a:p>
+                  </a:txBody>
+                  <a:tcPr marL="66219" marR="66219" marT="66219" marB="66219">
+                    <a:lnL w="9525" cap="flat" cmpd="sng" algn="ctr">
+                      <a:solidFill>
+                        <a:srgbClr val="DDDDDD"/>
+                      </a:solidFill>
+                      <a:prstDash val="solid"/>
+                      <a:round/>
+                      <a:headEnd type="none" w="med" len="med"/>
+                      <a:tailEnd type="none" w="med" len="med"/>
+                    </a:lnL>
+                    <a:lnR w="9525" cap="flat" cmpd="sng" algn="ctr">
+                      <a:solidFill>
+                        <a:srgbClr val="DDDDDD"/>
+                      </a:solidFill>
+                      <a:prstDash val="solid"/>
+                      <a:round/>
+                      <a:headEnd type="none" w="med" len="med"/>
+                      <a:tailEnd type="none" w="med" len="med"/>
+                    </a:lnR>
+                    <a:lnT w="9525" cap="flat" cmpd="sng" algn="ctr">
+                      <a:solidFill>
+                        <a:srgbClr val="DDDDDD"/>
+                      </a:solidFill>
+                      <a:prstDash val="solid"/>
+                      <a:round/>
+                      <a:headEnd type="none" w="med" len="med"/>
+                      <a:tailEnd type="none" w="med" len="med"/>
+                    </a:lnT>
+                    <a:lnB w="9525" cap="flat" cmpd="sng" algn="ctr">
+                      <a:solidFill>
+                        <a:srgbClr val="DDDDDD"/>
+                      </a:solidFill>
+                      <a:prstDash val="solid"/>
+                      <a:round/>
+                      <a:headEnd type="none" w="med" len="med"/>
+                      <a:tailEnd type="none" w="med" len="med"/>
+                    </a:lnB>
+                    <a:solidFill>
+                      <a:srgbClr val="F9F9F9"/>
+                    </a:solidFill>
+                  </a:tcPr>
+                </a:tc>
+              </a:tr>
+              <a:tr h="370824">
+                <a:tc>
+                  <a:txBody>
+                    <a:bodyPr/>
+                    <a:lstStyle/>
+                    <a:p>
+                      <a:pPr algn="l" fontAlgn="t"/>
+                      <a:r>
+                        <a:rPr lang="en-US" sz="1600">
+                          <a:effectLst/>
+                        </a:rPr>
+                        <a:t>RLC(.B)</a:t>
+                      </a:r>
+                    </a:p>
+                  </a:txBody>
+                  <a:tcPr marL="66219" marR="66219" marT="66219" marB="66219">
+                    <a:lnL w="9525" cap="flat" cmpd="sng" algn="ctr">
+                      <a:solidFill>
+                        <a:srgbClr val="DDDDDD"/>
+                      </a:solidFill>
+                      <a:prstDash val="solid"/>
+                      <a:round/>
+                      <a:headEnd type="none" w="med" len="med"/>
+                      <a:tailEnd type="none" w="med" len="med"/>
+                    </a:lnL>
+                    <a:lnR w="9525" cap="flat" cmpd="sng" algn="ctr">
+                      <a:solidFill>
+                        <a:srgbClr val="DDDDDD"/>
+                      </a:solidFill>
+                      <a:prstDash val="solid"/>
+                      <a:round/>
+                      <a:headEnd type="none" w="med" len="med"/>
+                      <a:tailEnd type="none" w="med" len="med"/>
+                    </a:lnR>
+                    <a:lnT w="9525" cap="flat" cmpd="sng" algn="ctr">
+                      <a:solidFill>
+                        <a:srgbClr val="DDDDDD"/>
+                      </a:solidFill>
+                      <a:prstDash val="solid"/>
+                      <a:round/>
+                      <a:headEnd type="none" w="med" len="med"/>
+                      <a:tailEnd type="none" w="med" len="med"/>
+                    </a:lnT>
+                    <a:lnB w="9525" cap="flat" cmpd="sng" algn="ctr">
+                      <a:solidFill>
+                        <a:srgbClr val="DDDDDD"/>
+                      </a:solidFill>
+                      <a:prstDash val="solid"/>
+                      <a:round/>
+                      <a:headEnd type="none" w="med" len="med"/>
+                      <a:tailEnd type="none" w="med" len="med"/>
+                    </a:lnB>
+                    <a:solidFill>
+                      <a:srgbClr val="FFFFFF"/>
+                    </a:solidFill>
+                  </a:tcPr>
+                </a:tc>
+                <a:tc>
+                  <a:txBody>
+                    <a:bodyPr/>
+                    <a:lstStyle/>
+                    <a:p>
+                      <a:pPr algn="l" fontAlgn="t"/>
+                      <a:r>
+                        <a:rPr lang="en-US" sz="1600" dirty="0">
+                          <a:effectLst/>
+                        </a:rPr>
+                        <a:t>ADDC(.B) </a:t>
+                      </a:r>
+                      <a:r>
+                        <a:rPr lang="en-US" sz="1600" dirty="0" err="1">
+                          <a:effectLst/>
+                        </a:rPr>
+                        <a:t>dst</a:t>
+                      </a:r>
+                      <a:r>
+                        <a:rPr lang="en-US" sz="1600" dirty="0">
+                          <a:effectLst/>
+                        </a:rPr>
+                        <a:t>, </a:t>
+                      </a:r>
+                      <a:r>
+                        <a:rPr lang="en-US" sz="1600" dirty="0" err="1">
+                          <a:effectLst/>
+                        </a:rPr>
+                        <a:t>dst</a:t>
+                      </a:r>
+                      <a:endParaRPr lang="en-US" sz="1600" dirty="0">
+                        <a:effectLst/>
+                      </a:endParaRPr>
+                    </a:p>
+                  </a:txBody>
+                  <a:tcPr marL="66219" marR="66219" marT="66219" marB="66219">
+                    <a:lnL w="9525" cap="flat" cmpd="sng" algn="ctr">
+                      <a:solidFill>
+                        <a:srgbClr val="DDDDDD"/>
+                      </a:solidFill>
+                      <a:prstDash val="solid"/>
+                      <a:round/>
+                      <a:headEnd type="none" w="med" len="med"/>
+                      <a:tailEnd type="none" w="med" len="med"/>
+                    </a:lnL>
+                    <a:lnR w="9525" cap="flat" cmpd="sng" algn="ctr">
+                      <a:solidFill>
+                        <a:srgbClr val="DDDDDD"/>
+                      </a:solidFill>
+                      <a:prstDash val="solid"/>
+                      <a:round/>
+                      <a:headEnd type="none" w="med" len="med"/>
+                      <a:tailEnd type="none" w="med" len="med"/>
+                    </a:lnR>
+                    <a:lnT w="9525" cap="flat" cmpd="sng" algn="ctr">
+                      <a:solidFill>
+                        <a:srgbClr val="DDDDDD"/>
+                      </a:solidFill>
+                      <a:prstDash val="solid"/>
+                      <a:round/>
+                      <a:headEnd type="none" w="med" len="med"/>
+                      <a:tailEnd type="none" w="med" len="med"/>
+                    </a:lnT>
+                    <a:lnB w="9525" cap="flat" cmpd="sng" algn="ctr">
+                      <a:solidFill>
+                        <a:srgbClr val="DDDDDD"/>
+                      </a:solidFill>
+                      <a:prstDash val="solid"/>
+                      <a:round/>
+                      <a:headEnd type="none" w="med" len="med"/>
+                      <a:tailEnd type="none" w="med" len="med"/>
+                    </a:lnB>
+                    <a:solidFill>
+                      <a:srgbClr val="FFFFFF"/>
+                    </a:solidFill>
+                  </a:tcPr>
+                </a:tc>
+              </a:tr>
+              <a:tr h="370824">
+                <a:tc>
+                  <a:txBody>
+                    <a:bodyPr/>
+                    <a:lstStyle/>
+                    <a:p>
+                      <a:pPr algn="l" fontAlgn="t"/>
+                      <a:r>
+                        <a:rPr lang="en-US" dirty="0">
+                          <a:effectLst/>
+                        </a:rPr>
+                        <a:t>INV(.B) </a:t>
+                      </a:r>
+                      <a:r>
+                        <a:rPr lang="en-US" dirty="0" err="1">
+                          <a:effectLst/>
+                        </a:rPr>
+                        <a:t>dst</a:t>
+                      </a:r>
+                      <a:endParaRPr lang="en-US" dirty="0">
+                        <a:effectLst/>
+                      </a:endParaRPr>
+                    </a:p>
+                  </a:txBody>
+                  <a:tcPr marL="76200" marR="76200" marT="76200" marB="76200">
+                    <a:lnL w="9525" cap="flat" cmpd="sng" algn="ctr">
+                      <a:solidFill>
+                        <a:srgbClr val="DDDDDD"/>
+                      </a:solidFill>
+                      <a:prstDash val="solid"/>
+                      <a:round/>
+                      <a:headEnd type="none" w="med" len="med"/>
+                      <a:tailEnd type="none" w="med" len="med"/>
+                    </a:lnL>
+                    <a:lnR w="9525" cap="flat" cmpd="sng" algn="ctr">
+                      <a:solidFill>
+                        <a:srgbClr val="DDDDDD"/>
+                      </a:solidFill>
+                      <a:prstDash val="solid"/>
+                      <a:round/>
+                      <a:headEnd type="none" w="med" len="med"/>
+                      <a:tailEnd type="none" w="med" len="med"/>
+                    </a:lnR>
+                    <a:lnT w="9525" cap="flat" cmpd="sng" algn="ctr">
+                      <a:solidFill>
+                        <a:srgbClr val="DDDDDD"/>
+                      </a:solidFill>
+                      <a:prstDash val="solid"/>
+                      <a:round/>
+                      <a:headEnd type="none" w="med" len="med"/>
+                      <a:tailEnd type="none" w="med" len="med"/>
+                    </a:lnT>
+                    <a:lnB w="9525" cap="flat" cmpd="sng" algn="ctr">
+                      <a:solidFill>
+                        <a:srgbClr val="DDDDDD"/>
+                      </a:solidFill>
+                      <a:prstDash val="solid"/>
+                      <a:round/>
+                      <a:headEnd type="none" w="med" len="med"/>
+                      <a:tailEnd type="none" w="med" len="med"/>
+                    </a:lnB>
+                    <a:solidFill>
+                      <a:srgbClr val="FFFFFF"/>
+                    </a:solidFill>
+                  </a:tcPr>
+                </a:tc>
+                <a:tc>
+                  <a:txBody>
+                    <a:bodyPr/>
+                    <a:lstStyle/>
+                    <a:p>
+                      <a:pPr algn="l" fontAlgn="t"/>
+                      <a:r>
+                        <a:rPr lang="en-US">
+                          <a:effectLst/>
+                        </a:rPr>
+                        <a:t>XOR(.B) #-1, dst</a:t>
+                      </a:r>
+                    </a:p>
+                  </a:txBody>
+                  <a:tcPr marL="76200" marR="76200" marT="76200" marB="76200">
+                    <a:lnL w="9525" cap="flat" cmpd="sng" algn="ctr">
+                      <a:solidFill>
+                        <a:srgbClr val="DDDDDD"/>
+                      </a:solidFill>
+                      <a:prstDash val="solid"/>
+                      <a:round/>
+                      <a:headEnd type="none" w="med" len="med"/>
+                      <a:tailEnd type="none" w="med" len="med"/>
+                    </a:lnL>
+                    <a:lnR w="9525" cap="flat" cmpd="sng" algn="ctr">
+                      <a:solidFill>
+                        <a:srgbClr val="DDDDDD"/>
+                      </a:solidFill>
+                      <a:prstDash val="solid"/>
+                      <a:round/>
+                      <a:headEnd type="none" w="med" len="med"/>
+                      <a:tailEnd type="none" w="med" len="med"/>
+                    </a:lnR>
+                    <a:lnT w="9525" cap="flat" cmpd="sng" algn="ctr">
+                      <a:solidFill>
+                        <a:srgbClr val="DDDDDD"/>
+                      </a:solidFill>
+                      <a:prstDash val="solid"/>
+                      <a:round/>
+                      <a:headEnd type="none" w="med" len="med"/>
+                      <a:tailEnd type="none" w="med" len="med"/>
+                    </a:lnT>
+                    <a:lnB w="9525" cap="flat" cmpd="sng" algn="ctr">
+                      <a:solidFill>
+                        <a:srgbClr val="DDDDDD"/>
+                      </a:solidFill>
+                      <a:prstDash val="solid"/>
+                      <a:round/>
+                      <a:headEnd type="none" w="med" len="med"/>
+                      <a:tailEnd type="none" w="med" len="med"/>
+                    </a:lnB>
+                    <a:solidFill>
+                      <a:srgbClr val="FFFFFF"/>
+                    </a:solidFill>
+                  </a:tcPr>
+                </a:tc>
+              </a:tr>
+              <a:tr h="370824">
+                <a:tc>
+                  <a:txBody>
+                    <a:bodyPr/>
+                    <a:lstStyle/>
+                    <a:p>
+                      <a:pPr algn="l" fontAlgn="t"/>
+                      <a:r>
+                        <a:rPr lang="en-US">
+                          <a:effectLst/>
+                        </a:rPr>
+                        <a:t>CLR(.B) dst</a:t>
+                      </a:r>
+                    </a:p>
+                  </a:txBody>
+                  <a:tcPr marL="76200" marR="76200" marT="76200" marB="76200">
+                    <a:lnL w="9525" cap="flat" cmpd="sng" algn="ctr">
+                      <a:solidFill>
+                        <a:srgbClr val="DDDDDD"/>
+                      </a:solidFill>
+                      <a:prstDash val="solid"/>
+                      <a:round/>
+                      <a:headEnd type="none" w="med" len="med"/>
+                      <a:tailEnd type="none" w="med" len="med"/>
+                    </a:lnL>
+                    <a:lnR w="9525" cap="flat" cmpd="sng" algn="ctr">
+                      <a:solidFill>
+                        <a:srgbClr val="DDDDDD"/>
+                      </a:solidFill>
+                      <a:prstDash val="solid"/>
+                      <a:round/>
+                      <a:headEnd type="none" w="med" len="med"/>
+                      <a:tailEnd type="none" w="med" len="med"/>
+                    </a:lnR>
+                    <a:lnT w="9525" cap="flat" cmpd="sng" algn="ctr">
+                      <a:solidFill>
+                        <a:srgbClr val="DDDDDD"/>
+                      </a:solidFill>
+                      <a:prstDash val="solid"/>
+                      <a:round/>
+                      <a:headEnd type="none" w="med" len="med"/>
+                      <a:tailEnd type="none" w="med" len="med"/>
+                    </a:lnT>
+                    <a:lnB w="9525" cap="flat" cmpd="sng" algn="ctr">
+                      <a:solidFill>
+                        <a:srgbClr val="DDDDDD"/>
+                      </a:solidFill>
+                      <a:prstDash val="solid"/>
+                      <a:round/>
+                      <a:headEnd type="none" w="med" len="med"/>
+                      <a:tailEnd type="none" w="med" len="med"/>
+                    </a:lnB>
+                    <a:solidFill>
+                      <a:srgbClr val="FFFFFF"/>
+                    </a:solidFill>
+                  </a:tcPr>
+                </a:tc>
+                <a:tc>
+                  <a:txBody>
+                    <a:bodyPr/>
+                    <a:lstStyle/>
+                    <a:p>
+                      <a:pPr algn="l" fontAlgn="t"/>
+                      <a:r>
+                        <a:rPr lang="en-US">
+                          <a:effectLst/>
+                        </a:rPr>
+                        <a:t>MOV(.B) #0, dst</a:t>
+                      </a:r>
+                    </a:p>
+                  </a:txBody>
+                  <a:tcPr marL="76200" marR="76200" marT="76200" marB="76200">
+                    <a:lnL w="9525" cap="flat" cmpd="sng" algn="ctr">
+                      <a:solidFill>
+                        <a:srgbClr val="DDDDDD"/>
+                      </a:solidFill>
+                      <a:prstDash val="solid"/>
+                      <a:round/>
+                      <a:headEnd type="none" w="med" len="med"/>
+                      <a:tailEnd type="none" w="med" len="med"/>
+                    </a:lnL>
+                    <a:lnR w="9525" cap="flat" cmpd="sng" algn="ctr">
+                      <a:solidFill>
+                        <a:srgbClr val="DDDDDD"/>
+                      </a:solidFill>
+                      <a:prstDash val="solid"/>
+                      <a:round/>
+                      <a:headEnd type="none" w="med" len="med"/>
+                      <a:tailEnd type="none" w="med" len="med"/>
+                    </a:lnR>
+                    <a:lnT w="9525" cap="flat" cmpd="sng" algn="ctr">
+                      <a:solidFill>
+                        <a:srgbClr val="DDDDDD"/>
+                      </a:solidFill>
+                      <a:prstDash val="solid"/>
+                      <a:round/>
+                      <a:headEnd type="none" w="med" len="med"/>
+                      <a:tailEnd type="none" w="med" len="med"/>
+                    </a:lnT>
+                    <a:lnB w="9525" cap="flat" cmpd="sng" algn="ctr">
+                      <a:solidFill>
+                        <a:srgbClr val="DDDDDD"/>
+                      </a:solidFill>
+                      <a:prstDash val="solid"/>
+                      <a:round/>
+                      <a:headEnd type="none" w="med" len="med"/>
+                      <a:tailEnd type="none" w="med" len="med"/>
+                    </a:lnB>
+                    <a:solidFill>
+                      <a:srgbClr val="FFFFFF"/>
+                    </a:solidFill>
+                  </a:tcPr>
+                </a:tc>
+              </a:tr>
+              <a:tr h="370824">
+                <a:tc>
+                  <a:txBody>
+                    <a:bodyPr/>
+                    <a:lstStyle/>
+                    <a:p>
+                      <a:pPr algn="l" fontAlgn="t"/>
+                      <a:r>
+                        <a:rPr lang="en-US" dirty="0">
+                          <a:effectLst/>
+                        </a:rPr>
+                        <a:t>TST(.B) </a:t>
+                      </a:r>
+                      <a:r>
+                        <a:rPr lang="en-US" dirty="0" err="1">
+                          <a:effectLst/>
+                        </a:rPr>
+                        <a:t>dst</a:t>
+                      </a:r>
+                      <a:endParaRPr lang="en-US" dirty="0">
+                        <a:effectLst/>
+                      </a:endParaRPr>
+                    </a:p>
+                  </a:txBody>
+                  <a:tcPr marL="76200" marR="76200" marT="76200" marB="76200">
+                    <a:lnL w="9525" cap="flat" cmpd="sng" algn="ctr">
+                      <a:solidFill>
+                        <a:srgbClr val="DDDDDD"/>
+                      </a:solidFill>
+                      <a:prstDash val="solid"/>
+                      <a:round/>
+                      <a:headEnd type="none" w="med" len="med"/>
+                      <a:tailEnd type="none" w="med" len="med"/>
+                    </a:lnL>
+                    <a:lnR w="9525" cap="flat" cmpd="sng" algn="ctr">
+                      <a:solidFill>
+                        <a:srgbClr val="DDDDDD"/>
+                      </a:solidFill>
+                      <a:prstDash val="solid"/>
+                      <a:round/>
+                      <a:headEnd type="none" w="med" len="med"/>
+                      <a:tailEnd type="none" w="med" len="med"/>
+                    </a:lnR>
+                    <a:lnT w="9525" cap="flat" cmpd="sng" algn="ctr">
+                      <a:solidFill>
+                        <a:srgbClr val="DDDDDD"/>
+                      </a:solidFill>
+                      <a:prstDash val="solid"/>
+                      <a:round/>
+                      <a:headEnd type="none" w="med" len="med"/>
+                      <a:tailEnd type="none" w="med" len="med"/>
+                    </a:lnT>
+                    <a:lnB w="9525" cap="flat" cmpd="sng" algn="ctr">
+                      <a:solidFill>
+                        <a:srgbClr val="DDDDDD"/>
+                      </a:solidFill>
+                      <a:prstDash val="solid"/>
+                      <a:round/>
+                      <a:headEnd type="none" w="med" len="med"/>
+                      <a:tailEnd type="none" w="med" len="med"/>
+                    </a:lnB>
+                    <a:solidFill>
+                      <a:srgbClr val="FFFFFF"/>
+                    </a:solidFill>
+                  </a:tcPr>
+                </a:tc>
+                <a:tc>
+                  <a:txBody>
+                    <a:bodyPr/>
+                    <a:lstStyle/>
+                    <a:p>
+                      <a:pPr algn="l" fontAlgn="t"/>
+                      <a:r>
+                        <a:rPr lang="en-US" dirty="0">
+                          <a:effectLst/>
+                        </a:rPr>
+                        <a:t>CMP(.B) #0, </a:t>
+                      </a:r>
+                      <a:r>
+                        <a:rPr lang="en-US" dirty="0" err="1">
+                          <a:effectLst/>
+                        </a:rPr>
+                        <a:t>dst</a:t>
+                      </a:r>
+                      <a:endParaRPr lang="en-US" dirty="0">
+                        <a:effectLst/>
+                      </a:endParaRPr>
+                    </a:p>
+                  </a:txBody>
+                  <a:tcPr marL="76200" marR="76200" marT="76200" marB="76200">
+                    <a:lnL w="9525" cap="flat" cmpd="sng" algn="ctr">
+                      <a:solidFill>
+                        <a:srgbClr val="DDDDDD"/>
+                      </a:solidFill>
+                      <a:prstDash val="solid"/>
+                      <a:round/>
+                      <a:headEnd type="none" w="med" len="med"/>
+                      <a:tailEnd type="none" w="med" len="med"/>
+                    </a:lnL>
+                    <a:lnR w="9525" cap="flat" cmpd="sng" algn="ctr">
+                      <a:solidFill>
+                        <a:srgbClr val="DDDDDD"/>
+                      </a:solidFill>
+                      <a:prstDash val="solid"/>
+                      <a:round/>
+                      <a:headEnd type="none" w="med" len="med"/>
+                      <a:tailEnd type="none" w="med" len="med"/>
+                    </a:lnR>
+                    <a:lnT w="9525" cap="flat" cmpd="sng" algn="ctr">
+                      <a:solidFill>
+                        <a:srgbClr val="DDDDDD"/>
+                      </a:solidFill>
+                      <a:prstDash val="solid"/>
+                      <a:round/>
+                      <a:headEnd type="none" w="med" len="med"/>
+                      <a:tailEnd type="none" w="med" len="med"/>
+                    </a:lnT>
+                    <a:lnB w="9525" cap="flat" cmpd="sng" algn="ctr">
+                      <a:solidFill>
+                        <a:srgbClr val="DDDDDD"/>
+                      </a:solidFill>
+                      <a:prstDash val="solid"/>
+                      <a:round/>
+                      <a:headEnd type="none" w="med" len="med"/>
+                      <a:tailEnd type="none" w="med" len="med"/>
+                    </a:lnB>
+                    <a:solidFill>
+                      <a:srgbClr val="FFFFFF"/>
+                    </a:solidFill>
+                  </a:tcPr>
+                </a:tc>
+              </a:tr>
+              <a:tr h="370824">
+                <a:tc>
+                  <a:txBody>
+                    <a:bodyPr/>
+                    <a:lstStyle/>
+                    <a:p>
+                      <a:pPr algn="l" fontAlgn="t"/>
+                      <a:r>
+                        <a:rPr lang="en-US" dirty="0">
+                          <a:effectLst/>
+                        </a:rPr>
+                        <a:t>DEC(.B) </a:t>
+                      </a:r>
+                      <a:r>
+                        <a:rPr lang="en-US" dirty="0" err="1">
+                          <a:effectLst/>
+                        </a:rPr>
+                        <a:t>dst</a:t>
+                      </a:r>
+                      <a:endParaRPr lang="en-US" dirty="0">
+                        <a:effectLst/>
+                      </a:endParaRPr>
+                    </a:p>
+                  </a:txBody>
+                  <a:tcPr marL="76200" marR="76200" marT="76200" marB="76200">
+                    <a:lnL w="9525" cap="flat" cmpd="sng" algn="ctr">
+                      <a:solidFill>
+                        <a:srgbClr val="DDDDDD"/>
+                      </a:solidFill>
+                      <a:prstDash val="solid"/>
+                      <a:round/>
+                      <a:headEnd type="none" w="med" len="med"/>
+                      <a:tailEnd type="none" w="med" len="med"/>
+                    </a:lnL>
+                    <a:lnR w="9525" cap="flat" cmpd="sng" algn="ctr">
+                      <a:solidFill>
+                        <a:srgbClr val="DDDDDD"/>
+                      </a:solidFill>
+                      <a:prstDash val="solid"/>
+                      <a:round/>
+                      <a:headEnd type="none" w="med" len="med"/>
+                      <a:tailEnd type="none" w="med" len="med"/>
+                    </a:lnR>
+                    <a:lnT w="9525" cap="flat" cmpd="sng" algn="ctr">
+                      <a:solidFill>
+                        <a:srgbClr val="DDDDDD"/>
+                      </a:solidFill>
+                      <a:prstDash val="solid"/>
+                      <a:round/>
+                      <a:headEnd type="none" w="med" len="med"/>
+                      <a:tailEnd type="none" w="med" len="med"/>
+                    </a:lnT>
+                    <a:lnB w="9525" cap="flat" cmpd="sng" algn="ctr">
+                      <a:solidFill>
+                        <a:srgbClr val="DDDDDD"/>
+                      </a:solidFill>
+                      <a:prstDash val="solid"/>
+                      <a:round/>
+                      <a:headEnd type="none" w="med" len="med"/>
+                      <a:tailEnd type="none" w="med" len="med"/>
+                    </a:lnB>
+                    <a:solidFill>
+                      <a:srgbClr val="FFFFFF"/>
+                    </a:solidFill>
+                  </a:tcPr>
+                </a:tc>
+                <a:tc>
+                  <a:txBody>
+                    <a:bodyPr/>
+                    <a:lstStyle/>
+                    <a:p>
+                      <a:pPr algn="l" fontAlgn="t"/>
+                      <a:r>
+                        <a:rPr lang="en-US">
+                          <a:effectLst/>
+                        </a:rPr>
+                        <a:t>SUB(.B) #1, dst</a:t>
+                      </a:r>
+                    </a:p>
+                  </a:txBody>
+                  <a:tcPr marL="76200" marR="76200" marT="76200" marB="76200">
+                    <a:lnL w="9525" cap="flat" cmpd="sng" algn="ctr">
+                      <a:solidFill>
+                        <a:srgbClr val="DDDDDD"/>
+                      </a:solidFill>
+                      <a:prstDash val="solid"/>
+                      <a:round/>
+                      <a:headEnd type="none" w="med" len="med"/>
+                      <a:tailEnd type="none" w="med" len="med"/>
+                    </a:lnL>
+                    <a:lnR w="9525" cap="flat" cmpd="sng" algn="ctr">
+                      <a:solidFill>
+                        <a:srgbClr val="DDDDDD"/>
+                      </a:solidFill>
+                      <a:prstDash val="solid"/>
+                      <a:round/>
+                      <a:headEnd type="none" w="med" len="med"/>
+                      <a:tailEnd type="none" w="med" len="med"/>
+                    </a:lnR>
+                    <a:lnT w="9525" cap="flat" cmpd="sng" algn="ctr">
+                      <a:solidFill>
+                        <a:srgbClr val="DDDDDD"/>
+                      </a:solidFill>
+                      <a:prstDash val="solid"/>
+                      <a:round/>
+                      <a:headEnd type="none" w="med" len="med"/>
+                      <a:tailEnd type="none" w="med" len="med"/>
+                    </a:lnT>
+                    <a:lnB w="9525" cap="flat" cmpd="sng" algn="ctr">
+                      <a:solidFill>
+                        <a:srgbClr val="DDDDDD"/>
+                      </a:solidFill>
+                      <a:prstDash val="solid"/>
+                      <a:round/>
+                      <a:headEnd type="none" w="med" len="med"/>
+                      <a:tailEnd type="none" w="med" len="med"/>
+                    </a:lnB>
+                    <a:solidFill>
+                      <a:srgbClr val="FFFFFF"/>
+                    </a:solidFill>
+                  </a:tcPr>
+                </a:tc>
+              </a:tr>
+              <a:tr h="370824">
+                <a:tc>
+                  <a:txBody>
+                    <a:bodyPr/>
+                    <a:lstStyle/>
+                    <a:p>
+                      <a:pPr algn="l" fontAlgn="t"/>
+                      <a:r>
+                        <a:rPr lang="en-US">
+                          <a:effectLst/>
+                        </a:rPr>
+                        <a:t>DECD(.B) dst</a:t>
+                      </a:r>
+                    </a:p>
+                  </a:txBody>
+                  <a:tcPr marL="76200" marR="76200" marT="76200" marB="76200">
+                    <a:lnL w="9525" cap="flat" cmpd="sng" algn="ctr">
+                      <a:solidFill>
+                        <a:srgbClr val="DDDDDD"/>
+                      </a:solidFill>
+                      <a:prstDash val="solid"/>
+                      <a:round/>
+                      <a:headEnd type="none" w="med" len="med"/>
+                      <a:tailEnd type="none" w="med" len="med"/>
+                    </a:lnL>
+                    <a:lnR w="9525" cap="flat" cmpd="sng" algn="ctr">
+                      <a:solidFill>
+                        <a:srgbClr val="DDDDDD"/>
+                      </a:solidFill>
+                      <a:prstDash val="solid"/>
+                      <a:round/>
+                      <a:headEnd type="none" w="med" len="med"/>
+                      <a:tailEnd type="none" w="med" len="med"/>
+                    </a:lnR>
+                    <a:lnT w="9525" cap="flat" cmpd="sng" algn="ctr">
+                      <a:solidFill>
+                        <a:srgbClr val="DDDDDD"/>
+                      </a:solidFill>
+                      <a:prstDash val="solid"/>
+                      <a:round/>
+                      <a:headEnd type="none" w="med" len="med"/>
+                      <a:tailEnd type="none" w="med" len="med"/>
+                    </a:lnT>
+                    <a:lnB w="9525" cap="flat" cmpd="sng" algn="ctr">
+                      <a:solidFill>
+                        <a:srgbClr val="DDDDDD"/>
+                      </a:solidFill>
+                      <a:prstDash val="solid"/>
+                      <a:round/>
+                      <a:headEnd type="none" w="med" len="med"/>
+                      <a:tailEnd type="none" w="med" len="med"/>
+                    </a:lnB>
+                    <a:solidFill>
+                      <a:srgbClr val="FFFFFF"/>
+                    </a:solidFill>
+                  </a:tcPr>
+                </a:tc>
+                <a:tc>
+                  <a:txBody>
+                    <a:bodyPr/>
+                    <a:lstStyle/>
+                    <a:p>
+                      <a:pPr algn="l" fontAlgn="t"/>
+                      <a:r>
+                        <a:rPr lang="en-US">
+                          <a:effectLst/>
+                        </a:rPr>
+                        <a:t>SUB(.B) #2, dst</a:t>
+                      </a:r>
+                    </a:p>
+                  </a:txBody>
+                  <a:tcPr marL="76200" marR="76200" marT="76200" marB="76200">
+                    <a:lnL w="9525" cap="flat" cmpd="sng" algn="ctr">
+                      <a:solidFill>
+                        <a:srgbClr val="DDDDDD"/>
+                      </a:solidFill>
+                      <a:prstDash val="solid"/>
+                      <a:round/>
+                      <a:headEnd type="none" w="med" len="med"/>
+                      <a:tailEnd type="none" w="med" len="med"/>
+                    </a:lnL>
+                    <a:lnR w="9525" cap="flat" cmpd="sng" algn="ctr">
+                      <a:solidFill>
+                        <a:srgbClr val="DDDDDD"/>
+                      </a:solidFill>
+                      <a:prstDash val="solid"/>
+                      <a:round/>
+                      <a:headEnd type="none" w="med" len="med"/>
+                      <a:tailEnd type="none" w="med" len="med"/>
+                    </a:lnR>
+                    <a:lnT w="9525" cap="flat" cmpd="sng" algn="ctr">
+                      <a:solidFill>
+                        <a:srgbClr val="DDDDDD"/>
+                      </a:solidFill>
+                      <a:prstDash val="solid"/>
+                      <a:round/>
+                      <a:headEnd type="none" w="med" len="med"/>
+                      <a:tailEnd type="none" w="med" len="med"/>
+                    </a:lnT>
+                    <a:lnB w="9525" cap="flat" cmpd="sng" algn="ctr">
+                      <a:solidFill>
+                        <a:srgbClr val="DDDDDD"/>
+                      </a:solidFill>
+                      <a:prstDash val="solid"/>
+                      <a:round/>
+                      <a:headEnd type="none" w="med" len="med"/>
+                      <a:tailEnd type="none" w="med" len="med"/>
+                    </a:lnB>
+                    <a:solidFill>
+                      <a:srgbClr val="FFFFFF"/>
+                    </a:solidFill>
+                  </a:tcPr>
+                </a:tc>
+              </a:tr>
+              <a:tr h="370824">
+                <a:tc>
+                  <a:txBody>
+                    <a:bodyPr/>
+                    <a:lstStyle/>
+                    <a:p>
+                      <a:pPr algn="l" fontAlgn="t"/>
+                      <a:r>
+                        <a:rPr lang="en-US">
+                          <a:effectLst/>
+                        </a:rPr>
+                        <a:t>INC(.B) dst</a:t>
+                      </a:r>
+                    </a:p>
+                  </a:txBody>
+                  <a:tcPr marL="76200" marR="76200" marT="76200" marB="76200">
+                    <a:lnL w="9525" cap="flat" cmpd="sng" algn="ctr">
+                      <a:solidFill>
+                        <a:srgbClr val="DDDDDD"/>
+                      </a:solidFill>
+                      <a:prstDash val="solid"/>
+                      <a:round/>
+                      <a:headEnd type="none" w="med" len="med"/>
+                      <a:tailEnd type="none" w="med" len="med"/>
+                    </a:lnL>
+                    <a:lnR w="9525" cap="flat" cmpd="sng" algn="ctr">
+                      <a:solidFill>
+                        <a:srgbClr val="DDDDDD"/>
+                      </a:solidFill>
+                      <a:prstDash val="solid"/>
+                      <a:round/>
+                      <a:headEnd type="none" w="med" len="med"/>
+                      <a:tailEnd type="none" w="med" len="med"/>
+                    </a:lnR>
+                    <a:lnT w="9525" cap="flat" cmpd="sng" algn="ctr">
+                      <a:solidFill>
+                        <a:srgbClr val="DDDDDD"/>
+                      </a:solidFill>
+                      <a:prstDash val="solid"/>
+                      <a:round/>
+                      <a:headEnd type="none" w="med" len="med"/>
+                      <a:tailEnd type="none" w="med" len="med"/>
+                    </a:lnT>
+                    <a:lnB w="9525" cap="flat" cmpd="sng" algn="ctr">
+                      <a:solidFill>
+                        <a:srgbClr val="DDDDDD"/>
+                      </a:solidFill>
+                      <a:prstDash val="solid"/>
+                      <a:round/>
+                      <a:headEnd type="none" w="med" len="med"/>
+                      <a:tailEnd type="none" w="med" len="med"/>
+                    </a:lnB>
+                    <a:solidFill>
+                      <a:srgbClr val="FFFFFF"/>
+                    </a:solidFill>
+                  </a:tcPr>
+                </a:tc>
+                <a:tc>
+                  <a:txBody>
+                    <a:bodyPr/>
+                    <a:lstStyle/>
+                    <a:p>
+                      <a:pPr algn="l" fontAlgn="t"/>
+                      <a:r>
+                        <a:rPr lang="en-US">
+                          <a:effectLst/>
+                        </a:rPr>
+                        <a:t>ADD(.B) #1, dst</a:t>
+                      </a:r>
+                    </a:p>
+                  </a:txBody>
+                  <a:tcPr marL="76200" marR="76200" marT="76200" marB="76200">
+                    <a:lnL w="9525" cap="flat" cmpd="sng" algn="ctr">
+                      <a:solidFill>
+                        <a:srgbClr val="DDDDDD"/>
+                      </a:solidFill>
+                      <a:prstDash val="solid"/>
+                      <a:round/>
+                      <a:headEnd type="none" w="med" len="med"/>
+                      <a:tailEnd type="none" w="med" len="med"/>
+                    </a:lnL>
+                    <a:lnR w="9525" cap="flat" cmpd="sng" algn="ctr">
+                      <a:solidFill>
+                        <a:srgbClr val="DDDDDD"/>
+                      </a:solidFill>
+                      <a:prstDash val="solid"/>
+                      <a:round/>
+                      <a:headEnd type="none" w="med" len="med"/>
+                      <a:tailEnd type="none" w="med" len="med"/>
+                    </a:lnR>
+                    <a:lnT w="9525" cap="flat" cmpd="sng" algn="ctr">
+                      <a:solidFill>
+                        <a:srgbClr val="DDDDDD"/>
+                      </a:solidFill>
+                      <a:prstDash val="solid"/>
+                      <a:round/>
+                      <a:headEnd type="none" w="med" len="med"/>
+                      <a:tailEnd type="none" w="med" len="med"/>
+                    </a:lnT>
+                    <a:lnB w="9525" cap="flat" cmpd="sng" algn="ctr">
+                      <a:solidFill>
+                        <a:srgbClr val="DDDDDD"/>
+                      </a:solidFill>
+                      <a:prstDash val="solid"/>
+                      <a:round/>
+                      <a:headEnd type="none" w="med" len="med"/>
+                      <a:tailEnd type="none" w="med" len="med"/>
+                    </a:lnB>
+                    <a:solidFill>
+                      <a:srgbClr val="FFFFFF"/>
+                    </a:solidFill>
+                  </a:tcPr>
+                </a:tc>
+              </a:tr>
+              <a:tr h="370824">
+                <a:tc>
+                  <a:txBody>
+                    <a:bodyPr/>
+                    <a:lstStyle/>
+                    <a:p>
+                      <a:pPr algn="l" fontAlgn="t"/>
+                      <a:r>
+                        <a:rPr lang="en-US" dirty="0">
+                          <a:effectLst/>
+                        </a:rPr>
+                        <a:t>INCD(.B) </a:t>
+                      </a:r>
+                      <a:r>
+                        <a:rPr lang="en-US" dirty="0" err="1">
+                          <a:effectLst/>
+                        </a:rPr>
+                        <a:t>dst</a:t>
+                      </a:r>
+                      <a:endParaRPr lang="en-US" dirty="0">
+                        <a:effectLst/>
+                      </a:endParaRPr>
+                    </a:p>
+                  </a:txBody>
+                  <a:tcPr marL="76200" marR="76200" marT="76200" marB="76200">
+                    <a:lnL w="9525" cap="flat" cmpd="sng" algn="ctr">
+                      <a:solidFill>
+                        <a:srgbClr val="DDDDDD"/>
+                      </a:solidFill>
+                      <a:prstDash val="solid"/>
+                      <a:round/>
+                      <a:headEnd type="none" w="med" len="med"/>
+                      <a:tailEnd type="none" w="med" len="med"/>
+                    </a:lnL>
+                    <a:lnR w="9525" cap="flat" cmpd="sng" algn="ctr">
+                      <a:solidFill>
+                        <a:srgbClr val="DDDDDD"/>
+                      </a:solidFill>
+                      <a:prstDash val="solid"/>
+                      <a:round/>
+                      <a:headEnd type="none" w="med" len="med"/>
+                      <a:tailEnd type="none" w="med" len="med"/>
+                    </a:lnR>
+                    <a:lnT w="9525" cap="flat" cmpd="sng" algn="ctr">
+                      <a:solidFill>
+                        <a:srgbClr val="DDDDDD"/>
+                      </a:solidFill>
+                      <a:prstDash val="solid"/>
+                      <a:round/>
+                      <a:headEnd type="none" w="med" len="med"/>
+                      <a:tailEnd type="none" w="med" len="med"/>
+                    </a:lnT>
+                    <a:lnB w="9525" cap="flat" cmpd="sng" algn="ctr">
+                      <a:solidFill>
+                        <a:srgbClr val="DDDDDD"/>
+                      </a:solidFill>
+                      <a:prstDash val="solid"/>
+                      <a:round/>
+                      <a:headEnd type="none" w="med" len="med"/>
+                      <a:tailEnd type="none" w="med" len="med"/>
+                    </a:lnB>
+                    <a:solidFill>
+                      <a:srgbClr val="FFFFFF"/>
+                    </a:solidFill>
+                  </a:tcPr>
+                </a:tc>
+                <a:tc>
+                  <a:txBody>
+                    <a:bodyPr/>
+                    <a:lstStyle/>
+                    <a:p>
+                      <a:pPr algn="l" fontAlgn="t"/>
+                      <a:r>
+                        <a:rPr lang="en-US" dirty="0">
+                          <a:effectLst/>
+                        </a:rPr>
+                        <a:t>ADD(.B) #2, </a:t>
+                      </a:r>
+                      <a:r>
+                        <a:rPr lang="en-US" dirty="0" err="1">
+                          <a:effectLst/>
+                        </a:rPr>
+                        <a:t>dst</a:t>
+                      </a:r>
+                      <a:endParaRPr lang="en-US" dirty="0">
+                        <a:effectLst/>
+                      </a:endParaRPr>
+                    </a:p>
+                  </a:txBody>
+                  <a:tcPr marL="76200" marR="76200" marT="76200" marB="76200">
+                    <a:lnL w="9525" cap="flat" cmpd="sng" algn="ctr">
+                      <a:solidFill>
+                        <a:srgbClr val="DDDDDD"/>
+                      </a:solidFill>
+                      <a:prstDash val="solid"/>
+                      <a:round/>
+                      <a:headEnd type="none" w="med" len="med"/>
+                      <a:tailEnd type="none" w="med" len="med"/>
+                    </a:lnL>
+                    <a:lnR w="9525" cap="flat" cmpd="sng" algn="ctr">
+                      <a:solidFill>
+                        <a:srgbClr val="DDDDDD"/>
+                      </a:solidFill>
+                      <a:prstDash val="solid"/>
+                      <a:round/>
+                      <a:headEnd type="none" w="med" len="med"/>
+                      <a:tailEnd type="none" w="med" len="med"/>
+                    </a:lnR>
+                    <a:lnT w="9525" cap="flat" cmpd="sng" algn="ctr">
+                      <a:solidFill>
+                        <a:srgbClr val="DDDDDD"/>
+                      </a:solidFill>
+                      <a:prstDash val="solid"/>
+                      <a:round/>
+                      <a:headEnd type="none" w="med" len="med"/>
+                      <a:tailEnd type="none" w="med" len="med"/>
+                    </a:lnT>
+                    <a:lnB w="9525" cap="flat" cmpd="sng" algn="ctr">
+                      <a:solidFill>
+                        <a:srgbClr val="DDDDDD"/>
+                      </a:solidFill>
+                      <a:prstDash val="solid"/>
+                      <a:round/>
+                      <a:headEnd type="none" w="med" len="med"/>
+                      <a:tailEnd type="none" w="med" len="med"/>
+                    </a:lnB>
+                    <a:solidFill>
+                      <a:srgbClr val="FFFFFF"/>
+                    </a:solidFill>
+                  </a:tcPr>
+                </a:tc>
+              </a:tr>
+              <a:tr h="370824">
+                <a:tc>
+                  <a:txBody>
+                    <a:bodyPr/>
+                    <a:lstStyle/>
+                    <a:p>
+                      <a:pPr algn="l" fontAlgn="t"/>
+                      <a:r>
+                        <a:rPr lang="en-US" dirty="0">
+                          <a:effectLst/>
+                        </a:rPr>
+                        <a:t>ADC(.B) </a:t>
+                      </a:r>
+                      <a:r>
+                        <a:rPr lang="en-US" dirty="0" err="1">
+                          <a:effectLst/>
+                        </a:rPr>
+                        <a:t>dst</a:t>
+                      </a:r>
+                      <a:endParaRPr lang="en-US" dirty="0">
+                        <a:effectLst/>
+                      </a:endParaRPr>
+                    </a:p>
+                  </a:txBody>
+                  <a:tcPr marL="76200" marR="76200" marT="76200" marB="76200">
+                    <a:lnL w="9525" cap="flat" cmpd="sng" algn="ctr">
+                      <a:solidFill>
+                        <a:srgbClr val="DDDDDD"/>
+                      </a:solidFill>
+                      <a:prstDash val="solid"/>
+                      <a:round/>
+                      <a:headEnd type="none" w="med" len="med"/>
+                      <a:tailEnd type="none" w="med" len="med"/>
+                    </a:lnL>
+                    <a:lnR w="9525" cap="flat" cmpd="sng" algn="ctr">
+                      <a:solidFill>
+                        <a:srgbClr val="DDDDDD"/>
+                      </a:solidFill>
+                      <a:prstDash val="solid"/>
+                      <a:round/>
+                      <a:headEnd type="none" w="med" len="med"/>
+                      <a:tailEnd type="none" w="med" len="med"/>
+                    </a:lnR>
+                    <a:lnT w="9525" cap="flat" cmpd="sng" algn="ctr">
+                      <a:solidFill>
+                        <a:srgbClr val="DDDDDD"/>
+                      </a:solidFill>
+                      <a:prstDash val="solid"/>
+                      <a:round/>
+                      <a:headEnd type="none" w="med" len="med"/>
+                      <a:tailEnd type="none" w="med" len="med"/>
+                    </a:lnT>
+                    <a:lnB w="9525" cap="flat" cmpd="sng" algn="ctr">
+                      <a:solidFill>
+                        <a:srgbClr val="DDDDDD"/>
+                      </a:solidFill>
+                      <a:prstDash val="solid"/>
+                      <a:round/>
+                      <a:headEnd type="none" w="med" len="med"/>
+                      <a:tailEnd type="none" w="med" len="med"/>
+                    </a:lnB>
+                    <a:solidFill>
+                      <a:srgbClr val="FFFFFF"/>
+                    </a:solidFill>
+                  </a:tcPr>
+                </a:tc>
+                <a:tc>
+                  <a:txBody>
+                    <a:bodyPr/>
+                    <a:lstStyle/>
+                    <a:p>
+                      <a:pPr algn="l" fontAlgn="t"/>
+                      <a:r>
+                        <a:rPr lang="en-US">
+                          <a:effectLst/>
+                        </a:rPr>
+                        <a:t>ADDC(.B) #0, dst</a:t>
+                      </a:r>
+                    </a:p>
+                  </a:txBody>
+                  <a:tcPr marL="76200" marR="76200" marT="76200" marB="76200">
+                    <a:lnL w="9525" cap="flat" cmpd="sng" algn="ctr">
+                      <a:solidFill>
+                        <a:srgbClr val="DDDDDD"/>
+                      </a:solidFill>
+                      <a:prstDash val="solid"/>
+                      <a:round/>
+                      <a:headEnd type="none" w="med" len="med"/>
+                      <a:tailEnd type="none" w="med" len="med"/>
+                    </a:lnL>
+                    <a:lnR w="9525" cap="flat" cmpd="sng" algn="ctr">
+                      <a:solidFill>
+                        <a:srgbClr val="DDDDDD"/>
+                      </a:solidFill>
+                      <a:prstDash val="solid"/>
+                      <a:round/>
+                      <a:headEnd type="none" w="med" len="med"/>
+                      <a:tailEnd type="none" w="med" len="med"/>
+                    </a:lnR>
+                    <a:lnT w="9525" cap="flat" cmpd="sng" algn="ctr">
+                      <a:solidFill>
+                        <a:srgbClr val="DDDDDD"/>
+                      </a:solidFill>
+                      <a:prstDash val="solid"/>
+                      <a:round/>
+                      <a:headEnd type="none" w="med" len="med"/>
+                      <a:tailEnd type="none" w="med" len="med"/>
+                    </a:lnT>
+                    <a:lnB w="9525" cap="flat" cmpd="sng" algn="ctr">
+                      <a:solidFill>
+                        <a:srgbClr val="DDDDDD"/>
+                      </a:solidFill>
+                      <a:prstDash val="solid"/>
+                      <a:round/>
+                      <a:headEnd type="none" w="med" len="med"/>
+                      <a:tailEnd type="none" w="med" len="med"/>
+                    </a:lnB>
+                    <a:solidFill>
+                      <a:srgbClr val="FFFFFF"/>
+                    </a:solidFill>
+                  </a:tcPr>
+                </a:tc>
+              </a:tr>
+              <a:tr h="370824">
+                <a:tc>
+                  <a:txBody>
+                    <a:bodyPr/>
+                    <a:lstStyle/>
+                    <a:p>
+                      <a:pPr algn="l" fontAlgn="t"/>
+                      <a:r>
+                        <a:rPr lang="en-US">
+                          <a:effectLst/>
+                        </a:rPr>
+                        <a:t>DADC(.B) dst</a:t>
+                      </a:r>
+                    </a:p>
+                  </a:txBody>
+                  <a:tcPr marL="76200" marR="76200" marT="76200" marB="76200">
+                    <a:lnL w="9525" cap="flat" cmpd="sng" algn="ctr">
+                      <a:solidFill>
+                        <a:srgbClr val="DDDDDD"/>
+                      </a:solidFill>
+                      <a:prstDash val="solid"/>
+                      <a:round/>
+                      <a:headEnd type="none" w="med" len="med"/>
+                      <a:tailEnd type="none" w="med" len="med"/>
+                    </a:lnL>
+                    <a:lnR w="9525" cap="flat" cmpd="sng" algn="ctr">
+                      <a:solidFill>
+                        <a:srgbClr val="DDDDDD"/>
+                      </a:solidFill>
+                      <a:prstDash val="solid"/>
+                      <a:round/>
+                      <a:headEnd type="none" w="med" len="med"/>
+                      <a:tailEnd type="none" w="med" len="med"/>
+                    </a:lnR>
+                    <a:lnT w="9525" cap="flat" cmpd="sng" algn="ctr">
+                      <a:solidFill>
+                        <a:srgbClr val="DDDDDD"/>
+                      </a:solidFill>
+                      <a:prstDash val="solid"/>
+                      <a:round/>
+                      <a:headEnd type="none" w="med" len="med"/>
+                      <a:tailEnd type="none" w="med" len="med"/>
+                    </a:lnT>
+                    <a:lnB w="9525" cap="flat" cmpd="sng" algn="ctr">
+                      <a:solidFill>
+                        <a:srgbClr val="DDDDDD"/>
+                      </a:solidFill>
+                      <a:prstDash val="solid"/>
+                      <a:round/>
+                      <a:headEnd type="none" w="med" len="med"/>
+                      <a:tailEnd type="none" w="med" len="med"/>
+                    </a:lnB>
+                    <a:solidFill>
+                      <a:srgbClr val="FFFFFF"/>
+                    </a:solidFill>
+                  </a:tcPr>
+                </a:tc>
+                <a:tc>
+                  <a:txBody>
+                    <a:bodyPr/>
+                    <a:lstStyle/>
+                    <a:p>
+                      <a:pPr algn="l" fontAlgn="t"/>
+                      <a:r>
+                        <a:rPr lang="en-US">
+                          <a:effectLst/>
+                        </a:rPr>
+                        <a:t>DADD(.B) #0, dst</a:t>
+                      </a:r>
+                    </a:p>
+                  </a:txBody>
+                  <a:tcPr marL="76200" marR="76200" marT="76200" marB="76200">
+                    <a:lnL w="9525" cap="flat" cmpd="sng" algn="ctr">
+                      <a:solidFill>
+                        <a:srgbClr val="DDDDDD"/>
+                      </a:solidFill>
+                      <a:prstDash val="solid"/>
+                      <a:round/>
+                      <a:headEnd type="none" w="med" len="med"/>
+                      <a:tailEnd type="none" w="med" len="med"/>
+                    </a:lnL>
+                    <a:lnR w="9525" cap="flat" cmpd="sng" algn="ctr">
+                      <a:solidFill>
+                        <a:srgbClr val="DDDDDD"/>
+                      </a:solidFill>
+                      <a:prstDash val="solid"/>
+                      <a:round/>
+                      <a:headEnd type="none" w="med" len="med"/>
+                      <a:tailEnd type="none" w="med" len="med"/>
+                    </a:lnR>
+                    <a:lnT w="9525" cap="flat" cmpd="sng" algn="ctr">
+                      <a:solidFill>
+                        <a:srgbClr val="DDDDDD"/>
+                      </a:solidFill>
+                      <a:prstDash val="solid"/>
+                      <a:round/>
+                      <a:headEnd type="none" w="med" len="med"/>
+                      <a:tailEnd type="none" w="med" len="med"/>
+                    </a:lnT>
+                    <a:lnB w="9525" cap="flat" cmpd="sng" algn="ctr">
+                      <a:solidFill>
+                        <a:srgbClr val="DDDDDD"/>
+                      </a:solidFill>
+                      <a:prstDash val="solid"/>
+                      <a:round/>
+                      <a:headEnd type="none" w="med" len="med"/>
+                      <a:tailEnd type="none" w="med" len="med"/>
+                    </a:lnB>
+                    <a:solidFill>
+                      <a:srgbClr val="FFFFFF"/>
+                    </a:solidFill>
+                  </a:tcPr>
+                </a:tc>
+              </a:tr>
+              <a:tr h="370824">
+                <a:tc>
+                  <a:txBody>
+                    <a:bodyPr/>
+                    <a:lstStyle/>
+                    <a:p>
+                      <a:pPr algn="l" fontAlgn="t"/>
+                      <a:r>
+                        <a:rPr lang="en-US">
+                          <a:effectLst/>
+                        </a:rPr>
+                        <a:t>SBC(.B) dst</a:t>
+                      </a:r>
+                    </a:p>
+                  </a:txBody>
+                  <a:tcPr marL="76200" marR="76200" marT="76200" marB="76200">
+                    <a:lnL w="9525" cap="flat" cmpd="sng" algn="ctr">
+                      <a:solidFill>
+                        <a:srgbClr val="DDDDDD"/>
+                      </a:solidFill>
+                      <a:prstDash val="solid"/>
+                      <a:round/>
+                      <a:headEnd type="none" w="med" len="med"/>
+                      <a:tailEnd type="none" w="med" len="med"/>
+                    </a:lnL>
+                    <a:lnR w="9525" cap="flat" cmpd="sng" algn="ctr">
+                      <a:solidFill>
+                        <a:srgbClr val="DDDDDD"/>
+                      </a:solidFill>
+                      <a:prstDash val="solid"/>
+                      <a:round/>
+                      <a:headEnd type="none" w="med" len="med"/>
+                      <a:tailEnd type="none" w="med" len="med"/>
+                    </a:lnR>
+                    <a:lnT w="9525" cap="flat" cmpd="sng" algn="ctr">
+                      <a:solidFill>
+                        <a:srgbClr val="DDDDDD"/>
+                      </a:solidFill>
+                      <a:prstDash val="solid"/>
+                      <a:round/>
+                      <a:headEnd type="none" w="med" len="med"/>
+                      <a:tailEnd type="none" w="med" len="med"/>
+                    </a:lnT>
+                    <a:lnB w="9525" cap="flat" cmpd="sng" algn="ctr">
+                      <a:solidFill>
+                        <a:srgbClr val="DDDDDD"/>
+                      </a:solidFill>
+                      <a:prstDash val="solid"/>
+                      <a:round/>
+                      <a:headEnd type="none" w="med" len="med"/>
+                      <a:tailEnd type="none" w="med" len="med"/>
+                    </a:lnB>
+                    <a:solidFill>
+                      <a:srgbClr val="FFFFFF"/>
+                    </a:solidFill>
+                  </a:tcPr>
+                </a:tc>
+                <a:tc>
+                  <a:txBody>
+                    <a:bodyPr/>
+                    <a:lstStyle/>
+                    <a:p>
+                      <a:pPr algn="l" fontAlgn="t"/>
+                      <a:r>
+                        <a:rPr lang="en-US" dirty="0">
+                          <a:effectLst/>
+                        </a:rPr>
+                        <a:t>SUBC(.B) #0, </a:t>
+                      </a:r>
+                      <a:r>
+                        <a:rPr lang="en-US" dirty="0" err="1">
+                          <a:effectLst/>
+                        </a:rPr>
+                        <a:t>dst</a:t>
+                      </a:r>
+                      <a:endParaRPr lang="en-US" dirty="0">
+                        <a:effectLst/>
+                      </a:endParaRPr>
+                    </a:p>
+                  </a:txBody>
+                  <a:tcPr marL="76200" marR="76200" marT="76200" marB="76200">
+                    <a:lnL w="9525" cap="flat" cmpd="sng" algn="ctr">
+                      <a:solidFill>
+                        <a:srgbClr val="DDDDDD"/>
+                      </a:solidFill>
+                      <a:prstDash val="solid"/>
+                      <a:round/>
+                      <a:headEnd type="none" w="med" len="med"/>
+                      <a:tailEnd type="none" w="med" len="med"/>
+                    </a:lnL>
+                    <a:lnR w="9525" cap="flat" cmpd="sng" algn="ctr">
+                      <a:solidFill>
+                        <a:srgbClr val="DDDDDD"/>
+                      </a:solidFill>
+                      <a:prstDash val="solid"/>
+                      <a:round/>
+                      <a:headEnd type="none" w="med" len="med"/>
+                      <a:tailEnd type="none" w="med" len="med"/>
+                    </a:lnR>
+                    <a:lnT w="9525" cap="flat" cmpd="sng" algn="ctr">
+                      <a:solidFill>
+                        <a:srgbClr val="DDDDDD"/>
+                      </a:solidFill>
+                      <a:prstDash val="solid"/>
+                      <a:round/>
+                      <a:headEnd type="none" w="med" len="med"/>
+                      <a:tailEnd type="none" w="med" len="med"/>
+                    </a:lnT>
+                    <a:lnB w="9525" cap="flat" cmpd="sng" algn="ctr">
+                      <a:solidFill>
+                        <a:srgbClr val="DDDDDD"/>
+                      </a:solidFill>
+                      <a:prstDash val="solid"/>
+                      <a:round/>
+                      <a:headEnd type="none" w="med" len="med"/>
+                      <a:tailEnd type="none" w="med" len="med"/>
+                    </a:lnB>
+                    <a:solidFill>
+                      <a:srgbClr val="FFFFFF"/>
+                    </a:solidFill>
+                  </a:tcPr>
+                </a:tc>
+              </a:tr>
+            </a:tbl>
+          </a:graphicData>
+        </a:graphic>
+      </p:graphicFrame>
+    </p:spTree>
+    <p:extLst>
+      <p:ext uri="{BB962C8B-B14F-4D97-AF65-F5344CB8AC3E}">
+        <p14:creationId xmlns:p14="http://schemas.microsoft.com/office/powerpoint/2010/main" val="75042992"/>
+      </p:ext>
+    </p:extLst>
+  </p:cSld>
+  <p:clrMapOvr>
+    <a:masterClrMapping/>
+  </p:clrMapOvr>
+  <p:timing>
+    <p:tnLst>
+      <p:par>
+        <p:cTn id="1" dur="indefinite" restart="never" nodeType="tmRoot"/>
+      </p:par>
+    </p:tnLst>
+  </p:timing>
 </p:sld>
 </file>
 
@@ -9939,6 +13994,13 @@
   <p:clrMapOvr>
     <a:masterClrMapping/>
   </p:clrMapOvr>
+  <p:timing>
+    <p:tnLst>
+      <p:par>
+        <p:cTn id="1" dur="indefinite" restart="never" nodeType="tmRoot"/>
+      </p:par>
+    </p:tnLst>
+  </p:timing>
 </p:sld>
 </file>
 
@@ -10390,7 +14452,7 @@
             </a:r>
             <a:r>
               <a:rPr lang="en-US" sz="2000" dirty="0">
-                <a:hlinkClick r:id="rId2" action="ppaction://hlinkfile"/>
+                <a:hlinkClick r:id="rId2"/>
               </a:rPr>
               <a:t>MSP430G2x53 2x13 Mixed Signal MCU Datasheet</a:t>
             </a:r>
@@ -10443,6 +14505,65 @@
           </a:extLst>
         </p:spPr>
       </p:pic>
+      <p:sp>
+        <p:nvSpPr>
+          <p:cNvPr id="5" name="TextBox 4"/>
+          <p:cNvSpPr txBox="1"/>
+          <p:nvPr/>
+        </p:nvSpPr>
+        <p:spPr>
+          <a:xfrm>
+            <a:off x="1350934" y="4855336"/>
+            <a:ext cx="6892313" cy="1569660"/>
+          </a:xfrm>
+          <a:prstGeom prst="rect">
+            <a:avLst/>
+          </a:prstGeom>
+          <a:noFill/>
+        </p:spPr>
+        <p:txBody>
+          <a:bodyPr wrap="square" rtlCol="0">
+            <a:spAutoFit/>
+          </a:bodyPr>
+          <a:lstStyle/>
+          <a:p>
+            <a:r>
+              <a:rPr lang="en-US" dirty="0" smtClean="0"/>
+              <a:t>Reference:</a:t>
+            </a:r>
+          </a:p>
+          <a:p>
+            <a:r>
+              <a:rPr lang="en-US" dirty="0" smtClean="0"/>
+              <a:t>Page 43 of Device </a:t>
+            </a:r>
+            <a:r>
+              <a:rPr lang="en-US" dirty="0"/>
+              <a:t>Specific (BB pp </a:t>
+            </a:r>
+            <a:r>
+              <a:rPr lang="en-US" dirty="0" smtClean="0"/>
+              <a:t>124)</a:t>
+            </a:r>
+            <a:endParaRPr lang="en-US" dirty="0" smtClean="0"/>
+          </a:p>
+          <a:p>
+            <a:r>
+              <a:rPr lang="en-US" dirty="0" err="1" smtClean="0"/>
+              <a:t>And/Or</a:t>
+            </a:r>
+            <a:r>
+              <a:rPr lang="en-US" dirty="0" smtClean="0"/>
+              <a:t> Page 333 of Family User </a:t>
+            </a:r>
+            <a:r>
+              <a:rPr lang="en-US" dirty="0" smtClean="0"/>
+              <a:t>Guide (BB pp 41)</a:t>
+            </a:r>
+            <a:endParaRPr lang="en-US" dirty="0"/>
+          </a:p>
+        </p:txBody>
+      </p:sp>
     </p:spTree>
     <p:extLst>
       <p:ext uri="{BB962C8B-B14F-4D97-AF65-F5344CB8AC3E}">
@@ -10456,9 +14577,80 @@
   <p:timing>
     <p:tnLst>
       <p:par>
-        <p:cTn id="1" dur="indefinite" restart="never" nodeType="tmRoot"/>
+        <p:cTn id="1" dur="indefinite" restart="never" nodeType="tmRoot">
+          <p:childTnLst>
+            <p:seq concurrent="1" nextAc="seek">
+              <p:cTn id="2" dur="indefinite" nodeType="mainSeq">
+                <p:childTnLst>
+                  <p:par>
+                    <p:cTn id="3" fill="hold">
+                      <p:stCondLst>
+                        <p:cond delay="indefinite"/>
+                      </p:stCondLst>
+                      <p:childTnLst>
+                        <p:par>
+                          <p:cTn id="4" fill="hold">
+                            <p:stCondLst>
+                              <p:cond delay="0"/>
+                            </p:stCondLst>
+                            <p:childTnLst>
+                              <p:par>
+                                <p:cTn id="5" presetID="1" presetClass="entr" presetSubtype="0" fill="hold" grpId="0" nodeType="clickEffect">
+                                  <p:stCondLst>
+                                    <p:cond delay="0"/>
+                                  </p:stCondLst>
+                                  <p:childTnLst>
+                                    <p:set>
+                                      <p:cBhvr>
+                                        <p:cTn id="6" dur="1" fill="hold">
+                                          <p:stCondLst>
+                                            <p:cond delay="0"/>
+                                          </p:stCondLst>
+                                        </p:cTn>
+                                        <p:tgtEl>
+                                          <p:spTgt spid="5"/>
+                                        </p:tgtEl>
+                                        <p:attrNameLst>
+                                          <p:attrName>style.visibility</p:attrName>
+                                        </p:attrNameLst>
+                                      </p:cBhvr>
+                                      <p:to>
+                                        <p:strVal val="visible"/>
+                                      </p:to>
+                                    </p:set>
+                                  </p:childTnLst>
+                                </p:cTn>
+                              </p:par>
+                            </p:childTnLst>
+                          </p:cTn>
+                        </p:par>
+                      </p:childTnLst>
+                    </p:cTn>
+                  </p:par>
+                </p:childTnLst>
+              </p:cTn>
+              <p:prevCondLst>
+                <p:cond evt="onPrev" delay="0">
+                  <p:tgtEl>
+                    <p:sldTgt/>
+                  </p:tgtEl>
+                </p:cond>
+              </p:prevCondLst>
+              <p:nextCondLst>
+                <p:cond evt="onNext" delay="0">
+                  <p:tgtEl>
+                    <p:sldTgt/>
+                  </p:tgtEl>
+                </p:cond>
+              </p:nextCondLst>
+            </p:seq>
+          </p:childTnLst>
+        </p:cTn>
       </p:par>
     </p:tnLst>
+    <p:bldLst>
+      <p:bldP spid="5" grpId="0"/>
+    </p:bldLst>
   </p:timing>
 </p:sld>
 </file>
@@ -10763,6 +14955,35 @@
           </a:extLst>
         </p:spPr>
       </p:pic>
+      <p:sp>
+        <p:nvSpPr>
+          <p:cNvPr id="5" name="TextBox 4"/>
+          <p:cNvSpPr txBox="1"/>
+          <p:nvPr/>
+        </p:nvSpPr>
+        <p:spPr>
+          <a:xfrm>
+            <a:off x="3168201" y="4646934"/>
+            <a:ext cx="5061399" cy="461665"/>
+          </a:xfrm>
+          <a:prstGeom prst="rect">
+            <a:avLst/>
+          </a:prstGeom>
+          <a:noFill/>
+        </p:spPr>
+        <p:txBody>
+          <a:bodyPr wrap="square" rtlCol="0">
+            <a:spAutoFit/>
+          </a:bodyPr>
+          <a:lstStyle/>
+          <a:p>
+            <a:r>
+              <a:rPr lang="en-US" dirty="0" smtClean="0"/>
+              <a:t>Reference:  Page 43 of Device Specific</a:t>
+            </a:r>
+          </a:p>
+        </p:txBody>
+      </p:sp>
     </p:spTree>
     <p:extLst>
       <p:ext uri="{BB962C8B-B14F-4D97-AF65-F5344CB8AC3E}">
@@ -10776,9 +14997,80 @@
   <p:timing>
     <p:tnLst>
       <p:par>
-        <p:cTn id="1" dur="indefinite" restart="never" nodeType="tmRoot"/>
+        <p:cTn id="1" dur="indefinite" restart="never" nodeType="tmRoot">
+          <p:childTnLst>
+            <p:seq concurrent="1" nextAc="seek">
+              <p:cTn id="2" dur="indefinite" nodeType="mainSeq">
+                <p:childTnLst>
+                  <p:par>
+                    <p:cTn id="3" fill="hold">
+                      <p:stCondLst>
+                        <p:cond delay="indefinite"/>
+                      </p:stCondLst>
+                      <p:childTnLst>
+                        <p:par>
+                          <p:cTn id="4" fill="hold">
+                            <p:stCondLst>
+                              <p:cond delay="0"/>
+                            </p:stCondLst>
+                            <p:childTnLst>
+                              <p:par>
+                                <p:cTn id="5" presetID="1" presetClass="entr" presetSubtype="0" fill="hold" grpId="0" nodeType="clickEffect">
+                                  <p:stCondLst>
+                                    <p:cond delay="0"/>
+                                  </p:stCondLst>
+                                  <p:childTnLst>
+                                    <p:set>
+                                      <p:cBhvr>
+                                        <p:cTn id="6" dur="1" fill="hold">
+                                          <p:stCondLst>
+                                            <p:cond delay="0"/>
+                                          </p:stCondLst>
+                                        </p:cTn>
+                                        <p:tgtEl>
+                                          <p:spTgt spid="5"/>
+                                        </p:tgtEl>
+                                        <p:attrNameLst>
+                                          <p:attrName>style.visibility</p:attrName>
+                                        </p:attrNameLst>
+                                      </p:cBhvr>
+                                      <p:to>
+                                        <p:strVal val="visible"/>
+                                      </p:to>
+                                    </p:set>
+                                  </p:childTnLst>
+                                </p:cTn>
+                              </p:par>
+                            </p:childTnLst>
+                          </p:cTn>
+                        </p:par>
+                      </p:childTnLst>
+                    </p:cTn>
+                  </p:par>
+                </p:childTnLst>
+              </p:cTn>
+              <p:prevCondLst>
+                <p:cond evt="onPrev" delay="0">
+                  <p:tgtEl>
+                    <p:sldTgt/>
+                  </p:tgtEl>
+                </p:cond>
+              </p:prevCondLst>
+              <p:nextCondLst>
+                <p:cond evt="onNext" delay="0">
+                  <p:tgtEl>
+                    <p:sldTgt/>
+                  </p:tgtEl>
+                </p:cond>
+              </p:nextCondLst>
+            </p:seq>
+          </p:childTnLst>
+        </p:cTn>
       </p:par>
     </p:tnLst>
+    <p:bldLst>
+      <p:bldP spid="5" grpId="0"/>
+    </p:bldLst>
   </p:timing>
 </p:sld>
 </file>
@@ -11224,6 +15516,13 @@
   <p:clrMapOvr>
     <a:masterClrMapping/>
   </p:clrMapOvr>
+  <p:timing>
+    <p:tnLst>
+      <p:par>
+        <p:cTn id="1" dur="indefinite" restart="never" nodeType="tmRoot"/>
+      </p:par>
+    </p:tnLst>
+  </p:timing>
 </p:sld>
 </file>
 

</xml_diff>

<commit_message>
L14 - added example code + links.  minor modifications to slides
</commit_message>
<xml_diff>
--- a/notes/L14/Lsn14.pptx
+++ b/notes/L14/Lsn14.pptx
@@ -5,17 +5,17 @@
     <p:sldMasterId id="2147483648" r:id="rId1"/>
   </p:sldMasterIdLst>
   <p:notesMasterIdLst>
-    <p:notesMasterId r:id="rId24"/>
+    <p:notesMasterId r:id="rId25"/>
   </p:notesMasterIdLst>
   <p:handoutMasterIdLst>
-    <p:handoutMasterId r:id="rId25"/>
+    <p:handoutMasterId r:id="rId26"/>
   </p:handoutMasterIdLst>
   <p:sldIdLst>
     <p:sldId id="282" r:id="rId2"/>
     <p:sldId id="360" r:id="rId3"/>
-    <p:sldId id="348" r:id="rId4"/>
-    <p:sldId id="355" r:id="rId5"/>
-    <p:sldId id="359" r:id="rId6"/>
+    <p:sldId id="355" r:id="rId4"/>
+    <p:sldId id="359" r:id="rId5"/>
+    <p:sldId id="348" r:id="rId6"/>
     <p:sldId id="361" r:id="rId7"/>
     <p:sldId id="362" r:id="rId8"/>
     <p:sldId id="364" r:id="rId9"/>
@@ -32,7 +32,8 @@
     <p:sldId id="374" r:id="rId20"/>
     <p:sldId id="375" r:id="rId21"/>
     <p:sldId id="376" r:id="rId22"/>
-    <p:sldId id="373" r:id="rId23"/>
+    <p:sldId id="379" r:id="rId23"/>
+    <p:sldId id="373" r:id="rId24"/>
   </p:sldIdLst>
   <p:sldSz cx="9144000" cy="6858000" type="screen4x3"/>
   <p:notesSz cx="7010400" cy="9296400"/>
@@ -3941,84 +3942,21 @@
                   <a:srgbClr val="0070C0"/>
                 </a:solidFill>
               </a:rPr>
-              <a:t>Extra Credit badlec5.asm due today</a:t>
-            </a:r>
-          </a:p>
-          <a:p>
-            <a:pPr lvl="1" algn="l"/>
+              <a:t>Extra Credit badlec5.asm due </a:t>
+            </a:r>
             <a:r>
               <a:rPr lang="en-US" sz="2000" dirty="0" smtClean="0">
                 <a:solidFill>
                   <a:srgbClr val="0070C0"/>
                 </a:solidFill>
               </a:rPr>
-              <a:t>Assignment 5 Due </a:t>
-            </a:r>
-            <a:r>
-              <a:rPr lang="en-US" sz="2000" dirty="0" smtClean="0">
-                <a:solidFill>
-                  <a:srgbClr val="0070C0"/>
-                </a:solidFill>
-              </a:rPr>
-              <a:t>L15</a:t>
+              <a:t>today</a:t>
             </a:r>
             <a:endParaRPr lang="en-US" sz="2000" dirty="0" smtClean="0">
               <a:solidFill>
                 <a:srgbClr val="0070C0"/>
               </a:solidFill>
             </a:endParaRPr>
-          </a:p>
-          <a:p>
-            <a:pPr lvl="1" algn="l"/>
-            <a:r>
-              <a:rPr lang="en-US" sz="2000" dirty="0" smtClean="0">
-                <a:solidFill>
-                  <a:srgbClr val="0070C0"/>
-                </a:solidFill>
-              </a:rPr>
-              <a:t>Lab 3 Mega </a:t>
-            </a:r>
-            <a:r>
-              <a:rPr lang="en-US" sz="2000" dirty="0" err="1" smtClean="0">
-                <a:solidFill>
-                  <a:srgbClr val="0070C0"/>
-                </a:solidFill>
-              </a:rPr>
-              <a:t>PreLab</a:t>
-            </a:r>
-            <a:r>
-              <a:rPr lang="en-US" sz="2000" dirty="0">
-                <a:solidFill>
-                  <a:srgbClr val="0070C0"/>
-                </a:solidFill>
-              </a:rPr>
-              <a:t> </a:t>
-            </a:r>
-            <a:r>
-              <a:rPr lang="en-US" sz="2000" dirty="0" smtClean="0">
-                <a:solidFill>
-                  <a:srgbClr val="0070C0"/>
-                </a:solidFill>
-              </a:rPr>
-              <a:t>due </a:t>
-            </a:r>
-            <a:r>
-              <a:rPr lang="en-US" sz="2000" dirty="0" smtClean="0">
-                <a:solidFill>
-                  <a:srgbClr val="0070C0"/>
-                </a:solidFill>
-              </a:rPr>
-              <a:t>L16</a:t>
-            </a:r>
-            <a:endParaRPr lang="en-US" sz="2000" dirty="0" smtClean="0">
-              <a:solidFill>
-                <a:srgbClr val="0070C0"/>
-              </a:solidFill>
-            </a:endParaRPr>
-          </a:p>
-          <a:p>
-            <a:pPr algn="l"/>
-            <a:endParaRPr lang="en-US" sz="2400" dirty="0" smtClean="0"/>
           </a:p>
         </p:txBody>
       </p:sp>
@@ -5207,8 +5145,13 @@
             </a:r>
             <a:r>
               <a:rPr lang="en-US" sz="1600" dirty="0"/>
-              <a:t>could delay for too long a period and miss good button pushes</a:t>
-            </a:r>
+              <a:t>could delay for too long a period and miss good button </a:t>
+            </a:r>
+            <a:r>
+              <a:rPr lang="en-US" sz="1600" dirty="0" smtClean="0"/>
+              <a:t>pushes</a:t>
+            </a:r>
+            <a:endParaRPr lang="en-US" sz="1600" dirty="0"/>
           </a:p>
           <a:p>
             <a:pPr lvl="1"/>
@@ -5662,7 +5605,11 @@
             </a:pPr>
             <a:r>
               <a:rPr lang="en-US" sz="1400" b="1" dirty="0"/>
-              <a:t>MSP430 Family Users Guide, </a:t>
+              <a:t>MSP430 Family Users </a:t>
+            </a:r>
+            <a:r>
+              <a:rPr lang="en-US" sz="1400" b="1" dirty="0" smtClean="0"/>
+              <a:t>Guide Section 3.4.4, </a:t>
             </a:r>
             <a:r>
               <a:rPr lang="en-US" sz="1400" b="1" dirty="0" smtClean="0"/>
@@ -5674,11 +5621,7 @@
             </a:r>
             <a:r>
               <a:rPr lang="en-US" sz="1400" b="1" dirty="0" smtClean="0"/>
-              <a:t>instruction (Blue Book pp 18</a:t>
-            </a:r>
-            <a:r>
-              <a:rPr lang="en-US" sz="1400" b="1" dirty="0" smtClean="0"/>
-              <a:t>)</a:t>
+              <a:t>instruction (Blue Book pp 18)</a:t>
             </a:r>
           </a:p>
           <a:p>
@@ -10187,25 +10130,8 @@
                 <a:latin typeface="Courier New" pitchFamily="49" charset="0"/>
                 <a:cs typeface="Courier New" pitchFamily="49" charset="0"/>
               </a:rPr>
-              <a:t>2 </a:t>
-            </a:r>
-            <a:r>
-              <a:rPr lang="en-US" sz="2000" b="1" dirty="0" smtClean="0">
-                <a:solidFill>
-                  <a:srgbClr val="00B050"/>
-                </a:solidFill>
-                <a:latin typeface="Courier New" pitchFamily="49" charset="0"/>
-                <a:cs typeface="Courier New" pitchFamily="49" charset="0"/>
-              </a:rPr>
-              <a:t>cycles?</a:t>
-            </a:r>
-            <a:endParaRPr lang="en-US" sz="2000" b="1" dirty="0" smtClean="0">
-              <a:solidFill>
-                <a:srgbClr val="00B050"/>
-              </a:solidFill>
-              <a:latin typeface="Courier New" pitchFamily="49" charset="0"/>
-              <a:cs typeface="Courier New" pitchFamily="49" charset="0"/>
-            </a:endParaRPr>
+              <a:t>2 cycles?</a:t>
+            </a:r>
           </a:p>
           <a:p>
             <a:pPr marL="0" indent="0">
@@ -11327,7 +11253,61 @@
               </a:rPr>
               <a:t>BB Pg. 126 </a:t>
             </a:r>
-            <a:endParaRPr kumimoji="0" lang="en-US" sz="2400" b="0" i="0" u="none" strike="noStrike" cap="none" normalizeH="0" baseline="0" dirty="0" smtClean="0">
+          </a:p>
+        </p:txBody>
+      </p:sp>
+      <p:sp>
+        <p:nvSpPr>
+          <p:cNvPr id="8" name="Rectangle 7"/>
+          <p:cNvSpPr/>
+          <p:nvPr/>
+        </p:nvSpPr>
+        <p:spPr bwMode="auto">
+          <a:xfrm>
+            <a:off x="331774" y="1376219"/>
+            <a:ext cx="1357746" cy="461818"/>
+          </a:xfrm>
+          <a:prstGeom prst="rect">
+            <a:avLst/>
+          </a:prstGeom>
+          <a:noFill/>
+          <a:ln w="28575" cap="flat" cmpd="sng" algn="ctr">
+            <a:solidFill>
+              <a:srgbClr val="FF0000"/>
+            </a:solidFill>
+            <a:prstDash val="sysDash"/>
+            <a:round/>
+            <a:headEnd type="none" w="med" len="med"/>
+            <a:tailEnd type="none" w="med" len="med"/>
+          </a:ln>
+          <a:effectLst/>
+        </p:spPr>
+        <p:txBody>
+          <a:bodyPr vert="horz" wrap="square" lIns="91440" tIns="45720" rIns="91440" bIns="45720" numCol="1" rtlCol="0" anchor="t" anchorCtr="0" compatLnSpc="1">
+            <a:prstTxWarp prst="textNoShape">
+              <a:avLst/>
+            </a:prstTxWarp>
+            <a:spAutoFit/>
+          </a:bodyPr>
+          <a:lstStyle/>
+          <a:p>
+            <a:pPr marL="0" marR="0" indent="0" algn="l" defTabSz="914400" rtl="0" eaLnBrk="1" fontAlgn="base" latinLnBrk="0" hangingPunct="1">
+              <a:lnSpc>
+                <a:spcPct val="100000"/>
+              </a:lnSpc>
+              <a:spcBef>
+                <a:spcPct val="50000"/>
+              </a:spcBef>
+              <a:spcAft>
+                <a:spcPct val="0"/>
+              </a:spcAft>
+              <a:buClrTx/>
+              <a:buSzTx/>
+              <a:buFontTx/>
+              <a:buNone/>
+              <a:tabLst/>
+            </a:pPr>
+            <a:endParaRPr kumimoji="0" lang="en-US" sz="2400" b="0" i="0" u="none" strike="noStrike" cap="none" normalizeH="0" baseline="0" smtClean="0">
               <a:ln>
                 <a:noFill/>
               </a:ln>
@@ -11341,6 +11321,35 @@
           </a:p>
         </p:txBody>
       </p:sp>
+      <p:cxnSp>
+        <p:nvCxnSpPr>
+          <p:cNvPr id="10" name="Elbow Connector 9"/>
+          <p:cNvCxnSpPr/>
+          <p:nvPr/>
+        </p:nvCxnSpPr>
+        <p:spPr bwMode="auto">
+          <a:xfrm rot="16200000" flipH="1">
+            <a:off x="1514400" y="1699123"/>
+            <a:ext cx="3657599" cy="3473607"/>
+          </a:xfrm>
+          <a:prstGeom prst="bentConnector3">
+            <a:avLst>
+              <a:gd name="adj1" fmla="val 110859"/>
+            </a:avLst>
+          </a:prstGeom>
+          <a:noFill/>
+          <a:ln w="38100" cap="flat" cmpd="sng" algn="ctr">
+            <a:solidFill>
+              <a:srgbClr val="FF0000"/>
+            </a:solidFill>
+            <a:prstDash val="solid"/>
+            <a:round/>
+            <a:headEnd type="none" w="med" len="med"/>
+            <a:tailEnd type="arrow"/>
+          </a:ln>
+          <a:effectLst/>
+        </p:spPr>
+      </p:cxnSp>
     </p:spTree>
     <p:extLst>
       <p:ext uri="{BB962C8B-B14F-4D97-AF65-F5344CB8AC3E}">
@@ -11354,15 +11363,184 @@
   <p:timing>
     <p:tnLst>
       <p:par>
-        <p:cTn id="1" dur="indefinite" restart="never" nodeType="tmRoot"/>
+        <p:cTn id="1" dur="indefinite" restart="never" nodeType="tmRoot">
+          <p:childTnLst>
+            <p:seq concurrent="1" nextAc="seek">
+              <p:cTn id="2" dur="indefinite" nodeType="mainSeq">
+                <p:childTnLst>
+                  <p:par>
+                    <p:cTn id="3" fill="hold">
+                      <p:stCondLst>
+                        <p:cond delay="indefinite"/>
+                      </p:stCondLst>
+                      <p:childTnLst>
+                        <p:par>
+                          <p:cTn id="4" fill="hold">
+                            <p:stCondLst>
+                              <p:cond delay="0"/>
+                            </p:stCondLst>
+                            <p:childTnLst>
+                              <p:par>
+                                <p:cTn id="5" presetID="42" presetClass="entr" presetSubtype="0" fill="hold" grpId="0" nodeType="clickEffect">
+                                  <p:stCondLst>
+                                    <p:cond delay="0"/>
+                                  </p:stCondLst>
+                                  <p:childTnLst>
+                                    <p:set>
+                                      <p:cBhvr>
+                                        <p:cTn id="6" dur="1" fill="hold">
+                                          <p:stCondLst>
+                                            <p:cond delay="0"/>
+                                          </p:stCondLst>
+                                        </p:cTn>
+                                        <p:tgtEl>
+                                          <p:spTgt spid="8"/>
+                                        </p:tgtEl>
+                                        <p:attrNameLst>
+                                          <p:attrName>style.visibility</p:attrName>
+                                        </p:attrNameLst>
+                                      </p:cBhvr>
+                                      <p:to>
+                                        <p:strVal val="visible"/>
+                                      </p:to>
+                                    </p:set>
+                                    <p:animEffect transition="in" filter="fade">
+                                      <p:cBhvr>
+                                        <p:cTn id="7" dur="1000"/>
+                                        <p:tgtEl>
+                                          <p:spTgt spid="8"/>
+                                        </p:tgtEl>
+                                      </p:cBhvr>
+                                    </p:animEffect>
+                                    <p:anim calcmode="lin" valueType="num">
+                                      <p:cBhvr>
+                                        <p:cTn id="8" dur="1000" fill="hold"/>
+                                        <p:tgtEl>
+                                          <p:spTgt spid="8"/>
+                                        </p:tgtEl>
+                                        <p:attrNameLst>
+                                          <p:attrName>ppt_x</p:attrName>
+                                        </p:attrNameLst>
+                                      </p:cBhvr>
+                                      <p:tavLst>
+                                        <p:tav tm="0">
+                                          <p:val>
+                                            <p:strVal val="#ppt_x"/>
+                                          </p:val>
+                                        </p:tav>
+                                        <p:tav tm="100000">
+                                          <p:val>
+                                            <p:strVal val="#ppt_x"/>
+                                          </p:val>
+                                        </p:tav>
+                                      </p:tavLst>
+                                    </p:anim>
+                                    <p:anim calcmode="lin" valueType="num">
+                                      <p:cBhvr>
+                                        <p:cTn id="9" dur="1000" fill="hold"/>
+                                        <p:tgtEl>
+                                          <p:spTgt spid="8"/>
+                                        </p:tgtEl>
+                                        <p:attrNameLst>
+                                          <p:attrName>ppt_y</p:attrName>
+                                        </p:attrNameLst>
+                                      </p:cBhvr>
+                                      <p:tavLst>
+                                        <p:tav tm="0">
+                                          <p:val>
+                                            <p:strVal val="#ppt_y+.1"/>
+                                          </p:val>
+                                        </p:tav>
+                                        <p:tav tm="100000">
+                                          <p:val>
+                                            <p:strVal val="#ppt_y"/>
+                                          </p:val>
+                                        </p:tav>
+                                      </p:tavLst>
+                                    </p:anim>
+                                  </p:childTnLst>
+                                </p:cTn>
+                              </p:par>
+                            </p:childTnLst>
+                          </p:cTn>
+                        </p:par>
+                        <p:par>
+                          <p:cTn id="10" fill="hold">
+                            <p:stCondLst>
+                              <p:cond delay="1000"/>
+                            </p:stCondLst>
+                            <p:childTnLst>
+                              <p:par>
+                                <p:cTn id="11" presetID="16" presetClass="entr" presetSubtype="21" fill="hold" nodeType="afterEffect">
+                                  <p:stCondLst>
+                                    <p:cond delay="0"/>
+                                  </p:stCondLst>
+                                  <p:childTnLst>
+                                    <p:set>
+                                      <p:cBhvr>
+                                        <p:cTn id="12" dur="1" fill="hold">
+                                          <p:stCondLst>
+                                            <p:cond delay="0"/>
+                                          </p:stCondLst>
+                                        </p:cTn>
+                                        <p:tgtEl>
+                                          <p:spTgt spid="10"/>
+                                        </p:tgtEl>
+                                        <p:attrNameLst>
+                                          <p:attrName>style.visibility</p:attrName>
+                                        </p:attrNameLst>
+                                      </p:cBhvr>
+                                      <p:to>
+                                        <p:strVal val="visible"/>
+                                      </p:to>
+                                    </p:set>
+                                    <p:animEffect transition="in" filter="barn(inVertical)">
+                                      <p:cBhvr>
+                                        <p:cTn id="13" dur="500"/>
+                                        <p:tgtEl>
+                                          <p:spTgt spid="10"/>
+                                        </p:tgtEl>
+                                      </p:cBhvr>
+                                    </p:animEffect>
+                                  </p:childTnLst>
+                                </p:cTn>
+                              </p:par>
+                            </p:childTnLst>
+                          </p:cTn>
+                        </p:par>
+                      </p:childTnLst>
+                    </p:cTn>
+                  </p:par>
+                </p:childTnLst>
+              </p:cTn>
+              <p:prevCondLst>
+                <p:cond evt="onPrev" delay="0">
+                  <p:tgtEl>
+                    <p:sldTgt/>
+                  </p:tgtEl>
+                </p:cond>
+              </p:prevCondLst>
+              <p:nextCondLst>
+                <p:cond evt="onNext" delay="0">
+                  <p:tgtEl>
+                    <p:sldTgt/>
+                  </p:tgtEl>
+                </p:cond>
+              </p:nextCondLst>
+            </p:seq>
+          </p:childTnLst>
+        </p:cTn>
       </p:par>
     </p:tnLst>
+    <p:bldLst>
+      <p:bldP spid="8" grpId="0" animBg="1"/>
+    </p:bldLst>
   </p:timing>
 </p:sld>
 </file>
 
 <file path=ppt/slides/slide2.xml><?xml version="1.0" encoding="utf-8"?>
-<p:sld xmlns:a="http://schemas.openxmlformats.org/drawingml/2006/main" xmlns:r="http://schemas.openxmlformats.org/officeDocument/2006/relationships" xmlns:p="http://schemas.openxmlformats.org/presentationml/2006/main">
+<p:sld xmlns:a="http://schemas.openxmlformats.org/drawingml/2006/main" xmlns:r="http://schemas.openxmlformats.org/officeDocument/2006/relationships" xmlns:p="http://schemas.openxmlformats.org/presentationml/2006/main" show="0">
   <p:cSld>
     <p:spTree>
       <p:nvGrpSpPr>
@@ -11395,7 +11573,7 @@
           <a:p>
             <a:r>
               <a:rPr lang="en-US" b="1" dirty="0" smtClean="0"/>
-              <a:t>Homework</a:t>
+              <a:t>Practice from last time</a:t>
             </a:r>
             <a:endParaRPr lang="en-US" dirty="0"/>
           </a:p>
@@ -12106,6 +12284,14 @@
   <p:clrMapOvr>
     <a:masterClrMapping/>
   </p:clrMapOvr>
+  <mc:AlternateContent xmlns:mc="http://schemas.openxmlformats.org/markup-compatibility/2006">
+    <mc:Choice xmlns:p14="http://schemas.microsoft.com/office/powerpoint/2010/main" Requires="p14">
+      <p:transition spd="slow" p14:dur="2000"/>
+    </mc:Choice>
+    <mc:Fallback>
+      <p:transition spd="slow"/>
+    </mc:Fallback>
+  </mc:AlternateContent>
   <p:timing>
     <p:tnLst>
       <p:par>
@@ -13121,6 +13307,16 @@
               <a:buNone/>
             </a:pPr>
             <a:r>
+              <a:rPr lang="en-US" sz="1400" b="1" dirty="0">
+                <a:solidFill>
+                  <a:schemeClr val="accent2"/>
+                </a:solidFill>
+                <a:latin typeface="Courier New" pitchFamily="49" charset="0"/>
+                <a:cs typeface="Courier New" pitchFamily="49" charset="0"/>
+              </a:rPr>
+              <a:t>		</a:t>
+            </a:r>
+            <a:r>
               <a:rPr lang="en-US" sz="1400" b="1" dirty="0" smtClean="0">
                 <a:solidFill>
                   <a:schemeClr val="accent2"/>
@@ -13128,10 +13324,45 @@
                 <a:latin typeface="Courier New" pitchFamily="49" charset="0"/>
                 <a:cs typeface="Courier New" pitchFamily="49" charset="0"/>
               </a:rPr>
+              <a:t>    </a:t>
+            </a:r>
+            <a:r>
+              <a:rPr lang="en-US" sz="1400" b="1" dirty="0" smtClean="0">
+                <a:solidFill>
+                  <a:srgbClr val="00B050"/>
+                </a:solidFill>
+                <a:latin typeface="Courier New" pitchFamily="49" charset="0"/>
+                <a:cs typeface="Courier New" pitchFamily="49" charset="0"/>
+              </a:rPr>
+              <a:t>; </a:t>
+            </a:r>
+            <a:r>
+              <a:rPr lang="en-US" sz="1400" b="1" dirty="0">
+                <a:solidFill>
+                  <a:srgbClr val="00B050"/>
+                </a:solidFill>
+                <a:latin typeface="Courier New" pitchFamily="49" charset="0"/>
+                <a:cs typeface="Courier New" pitchFamily="49" charset="0"/>
+              </a:rPr>
+              <a:t>Setup P1.3 for button input</a:t>
+            </a:r>
+          </a:p>
+          <a:p>
+            <a:pPr marL="0" indent="0">
+              <a:buNone/>
+            </a:pPr>
+            <a:r>
+              <a:rPr lang="en-US" sz="1400" b="1" dirty="0">
+                <a:solidFill>
+                  <a:schemeClr val="accent2"/>
+                </a:solidFill>
+                <a:latin typeface="Courier New" pitchFamily="49" charset="0"/>
+                <a:cs typeface="Courier New" pitchFamily="49" charset="0"/>
+              </a:rPr>
               <a:t>                     </a:t>
             </a:r>
             <a:r>
-              <a:rPr lang="en-US" sz="1400" b="1" dirty="0" err="1" smtClean="0">
+              <a:rPr lang="en-US" sz="1400" b="1" dirty="0" err="1">
                 <a:solidFill>
                   <a:schemeClr val="accent2"/>
                 </a:solidFill>
@@ -13141,16 +13372,6 @@
               <a:t>bis.b</a:t>
             </a:r>
             <a:r>
-              <a:rPr lang="en-US" sz="1400" b="1" dirty="0" smtClean="0">
-                <a:solidFill>
-                  <a:schemeClr val="accent2"/>
-                </a:solidFill>
-                <a:latin typeface="Courier New" pitchFamily="49" charset="0"/>
-                <a:cs typeface="Courier New" pitchFamily="49" charset="0"/>
-              </a:rPr>
-              <a:t>  </a:t>
-            </a:r>
-            <a:r>
               <a:rPr lang="en-US" sz="1400" b="1" dirty="0">
                 <a:solidFill>
                   <a:schemeClr val="accent2"/>
@@ -13158,7 +13379,7 @@
                 <a:latin typeface="Courier New" pitchFamily="49" charset="0"/>
                 <a:cs typeface="Courier New" pitchFamily="49" charset="0"/>
               </a:rPr>
-              <a:t>#BIT3, &amp;P1OUT</a:t>
+              <a:t>  #BIT3, &amp;P1OUT</a:t>
             </a:r>
           </a:p>
           <a:p>
@@ -13228,17 +13449,7 @@
                 <a:latin typeface="Courier New" pitchFamily="49" charset="0"/>
                 <a:cs typeface="Courier New" pitchFamily="49" charset="0"/>
               </a:rPr>
-              <a:t>  #BIT3, &amp;</a:t>
-            </a:r>
-            <a:r>
-              <a:rPr lang="en-US" sz="1400" b="1" dirty="0" smtClean="0">
-                <a:solidFill>
-                  <a:schemeClr val="accent2"/>
-                </a:solidFill>
-                <a:latin typeface="Courier New" pitchFamily="49" charset="0"/>
-                <a:cs typeface="Courier New" pitchFamily="49" charset="0"/>
-              </a:rPr>
-              <a:t>P1DIR</a:t>
+              <a:t>  #BIT3, &amp;P1DIR</a:t>
             </a:r>
           </a:p>
           <a:p>
@@ -13258,6 +13469,16 @@
               <a:buNone/>
             </a:pPr>
             <a:r>
+              <a:rPr lang="en-US" sz="1400" b="1" dirty="0">
+                <a:solidFill>
+                  <a:schemeClr val="accent2"/>
+                </a:solidFill>
+                <a:latin typeface="Courier New" pitchFamily="49" charset="0"/>
+                <a:cs typeface="Courier New" pitchFamily="49" charset="0"/>
+              </a:rPr>
+              <a:t>                     </a:t>
+            </a:r>
+            <a:r>
               <a:rPr lang="en-US" sz="1400" b="1" dirty="0" err="1">
                 <a:solidFill>
                   <a:schemeClr val="accent2"/>
@@ -13265,7 +13486,7 @@
                 <a:latin typeface="Courier New" pitchFamily="49" charset="0"/>
                 <a:cs typeface="Courier New" pitchFamily="49" charset="0"/>
               </a:rPr>
-              <a:t>check_btn</a:t>
+              <a:t>clr</a:t>
             </a:r>
             <a:r>
               <a:rPr lang="en-US" sz="1400" b="1" dirty="0">
@@ -13275,190 +13496,31 @@
                 <a:latin typeface="Courier New" pitchFamily="49" charset="0"/>
                 <a:cs typeface="Courier New" pitchFamily="49" charset="0"/>
               </a:rPr>
-              <a:t>:    </a:t>
+              <a:t> R4		</a:t>
             </a:r>
             <a:r>
               <a:rPr lang="en-US" sz="1400" b="1" dirty="0" smtClean="0">
                 <a:solidFill>
-                  <a:schemeClr val="accent2"/>
-                </a:solidFill>
-                <a:latin typeface="Courier New" pitchFamily="49" charset="0"/>
-                <a:cs typeface="Courier New" pitchFamily="49" charset="0"/>
-              </a:rPr>
-              <a:t>       </a:t>
-            </a:r>
-            <a:r>
-              <a:rPr lang="en-US" sz="1400" b="1" dirty="0" err="1" smtClean="0">
-                <a:solidFill>
-                  <a:schemeClr val="accent2"/>
-                </a:solidFill>
-                <a:latin typeface="Courier New" pitchFamily="49" charset="0"/>
-                <a:cs typeface="Courier New" pitchFamily="49" charset="0"/>
-              </a:rPr>
-              <a:t>bit.b</a:t>
-            </a:r>
-            <a:r>
-              <a:rPr lang="en-US" sz="1400" b="1" dirty="0" smtClean="0">
-                <a:solidFill>
-                  <a:schemeClr val="accent2"/>
-                </a:solidFill>
-                <a:latin typeface="Courier New" pitchFamily="49" charset="0"/>
-                <a:cs typeface="Courier New" pitchFamily="49" charset="0"/>
-              </a:rPr>
-              <a:t>  </a:t>
-            </a:r>
-            <a:r>
-              <a:rPr lang="en-US" sz="1400" b="1" dirty="0">
-                <a:solidFill>
-                  <a:schemeClr val="accent2"/>
-                </a:solidFill>
-                <a:latin typeface="Courier New" pitchFamily="49" charset="0"/>
-                <a:cs typeface="Courier New" pitchFamily="49" charset="0"/>
-              </a:rPr>
-              <a:t>#BIT3, &amp;P1IN</a:t>
-            </a:r>
-          </a:p>
-          <a:p>
-            <a:pPr marL="0" indent="0">
-              <a:buNone/>
-            </a:pPr>
-            <a:r>
-              <a:rPr lang="en-US" sz="1400" b="1" dirty="0">
-                <a:solidFill>
-                  <a:schemeClr val="accent2"/>
-                </a:solidFill>
-                <a:latin typeface="Courier New" pitchFamily="49" charset="0"/>
-                <a:cs typeface="Courier New" pitchFamily="49" charset="0"/>
-              </a:rPr>
-              <a:t>                     </a:t>
-            </a:r>
-            <a:r>
-              <a:rPr lang="en-US" sz="1400" b="1" dirty="0" err="1" smtClean="0">
-                <a:solidFill>
-                  <a:schemeClr val="accent2"/>
-                </a:solidFill>
-                <a:latin typeface="Courier New" pitchFamily="49" charset="0"/>
-                <a:cs typeface="Courier New" pitchFamily="49" charset="0"/>
-              </a:rPr>
-              <a:t>jnz</a:t>
-            </a:r>
-            <a:r>
-              <a:rPr lang="en-US" sz="1400" b="1" dirty="0" smtClean="0">
-                <a:solidFill>
-                  <a:schemeClr val="accent2"/>
-                </a:solidFill>
-                <a:latin typeface="Courier New" pitchFamily="49" charset="0"/>
-                <a:cs typeface="Courier New" pitchFamily="49" charset="0"/>
-              </a:rPr>
-              <a:t>    </a:t>
+                  <a:srgbClr val="00B050"/>
+                </a:solidFill>
+                <a:latin typeface="Courier New" pitchFamily="49" charset="0"/>
+                <a:cs typeface="Courier New" pitchFamily="49" charset="0"/>
+              </a:rPr>
+              <a:t>; </a:t>
             </a:r>
             <a:r>
               <a:rPr lang="en-US" sz="1400" b="1" dirty="0" err="1">
                 <a:solidFill>
-                  <a:schemeClr val="accent2"/>
-                </a:solidFill>
-                <a:latin typeface="Courier New" pitchFamily="49" charset="0"/>
-                <a:cs typeface="Courier New" pitchFamily="49" charset="0"/>
-              </a:rPr>
-              <a:t>check_btn</a:t>
+                  <a:srgbClr val="00B050"/>
+                </a:solidFill>
+                <a:latin typeface="Courier New" pitchFamily="49" charset="0"/>
+                <a:cs typeface="Courier New" pitchFamily="49" charset="0"/>
+              </a:rPr>
+              <a:t>BtnCounter</a:t>
             </a:r>
             <a:endParaRPr lang="en-US" sz="1400" b="1" dirty="0">
               <a:solidFill>
-                <a:schemeClr val="accent2"/>
-              </a:solidFill>
-              <a:latin typeface="Courier New" pitchFamily="49" charset="0"/>
-              <a:cs typeface="Courier New" pitchFamily="49" charset="0"/>
-            </a:endParaRPr>
-          </a:p>
-          <a:p>
-            <a:pPr marL="0" indent="0">
-              <a:buNone/>
-            </a:pPr>
-            <a:r>
-              <a:rPr lang="en-US" sz="1400" b="1" dirty="0" smtClean="0">
-                <a:solidFill>
-                  <a:schemeClr val="accent2"/>
-                </a:solidFill>
-                <a:latin typeface="Courier New" pitchFamily="49" charset="0"/>
-                <a:cs typeface="Courier New" pitchFamily="49" charset="0"/>
-              </a:rPr>
-              <a:t>                     call   #</a:t>
-            </a:r>
-            <a:r>
-              <a:rPr lang="en-US" sz="1400" b="1" dirty="0" err="1" smtClean="0">
-                <a:solidFill>
-                  <a:schemeClr val="accent2"/>
-                </a:solidFill>
-                <a:latin typeface="Courier New" pitchFamily="49" charset="0"/>
-                <a:cs typeface="Courier New" pitchFamily="49" charset="0"/>
-              </a:rPr>
-              <a:t>software_delay</a:t>
-            </a:r>
-            <a:endParaRPr lang="en-US" sz="1400" b="1" dirty="0" smtClean="0">
-              <a:solidFill>
-                <a:schemeClr val="accent2"/>
-              </a:solidFill>
-              <a:latin typeface="Courier New" pitchFamily="49" charset="0"/>
-              <a:cs typeface="Courier New" pitchFamily="49" charset="0"/>
-            </a:endParaRPr>
-          </a:p>
-          <a:p>
-            <a:pPr marL="0" indent="0">
-              <a:buNone/>
-            </a:pPr>
-            <a:r>
-              <a:rPr lang="en-US" sz="1400" b="1" dirty="0">
-                <a:solidFill>
-                  <a:schemeClr val="accent2"/>
-                </a:solidFill>
-                <a:latin typeface="Courier New" pitchFamily="49" charset="0"/>
-                <a:cs typeface="Courier New" pitchFamily="49" charset="0"/>
-              </a:rPr>
-              <a:t> </a:t>
-            </a:r>
-            <a:r>
-              <a:rPr lang="en-US" sz="1400" b="1" dirty="0" smtClean="0">
-                <a:solidFill>
-                  <a:schemeClr val="accent2"/>
-                </a:solidFill>
-                <a:latin typeface="Courier New" pitchFamily="49" charset="0"/>
-                <a:cs typeface="Courier New" pitchFamily="49" charset="0"/>
-              </a:rPr>
-              <a:t>                    </a:t>
-            </a:r>
-            <a:r>
-              <a:rPr lang="en-US" sz="1400" b="1" dirty="0" err="1" smtClean="0">
-                <a:solidFill>
-                  <a:schemeClr val="accent2"/>
-                </a:solidFill>
-                <a:latin typeface="Courier New" pitchFamily="49" charset="0"/>
-                <a:cs typeface="Courier New" pitchFamily="49" charset="0"/>
-              </a:rPr>
-              <a:t>jmp</a:t>
-            </a:r>
-            <a:r>
-              <a:rPr lang="en-US" sz="1400" b="1" dirty="0" smtClean="0">
-                <a:solidFill>
-                  <a:schemeClr val="accent2"/>
-                </a:solidFill>
-                <a:latin typeface="Courier New" pitchFamily="49" charset="0"/>
-                <a:cs typeface="Courier New" pitchFamily="49" charset="0"/>
-              </a:rPr>
-              <a:t>    </a:t>
-            </a:r>
-            <a:r>
-              <a:rPr lang="en-US" sz="1400" b="1" dirty="0" err="1" smtClean="0">
-                <a:solidFill>
-                  <a:schemeClr val="accent2"/>
-                </a:solidFill>
-                <a:latin typeface="Courier New" pitchFamily="49" charset="0"/>
-                <a:cs typeface="Courier New" pitchFamily="49" charset="0"/>
-              </a:rPr>
-              <a:t>btn_pushed</a:t>
-            </a:r>
-            <a:endParaRPr lang="en-US" sz="1400" b="1" dirty="0" smtClean="0">
-              <a:solidFill>
-                <a:schemeClr val="accent2"/>
+                <a:srgbClr val="00B050"/>
               </a:solidFill>
               <a:latin typeface="Courier New" pitchFamily="49" charset="0"/>
               <a:cs typeface="Courier New" pitchFamily="49" charset="0"/>
@@ -13481,37 +13543,97 @@
               <a:buNone/>
             </a:pPr>
             <a:r>
+              <a:rPr lang="en-US" sz="1400" b="1" dirty="0">
+                <a:solidFill>
+                  <a:srgbClr val="00B050"/>
+                </a:solidFill>
+                <a:latin typeface="Courier New" pitchFamily="49" charset="0"/>
+                <a:cs typeface="Courier New" pitchFamily="49" charset="0"/>
+              </a:rPr>
+              <a:t>; Increment </a:t>
+            </a:r>
+            <a:r>
               <a:rPr lang="en-US" sz="1400" b="1" dirty="0" err="1">
                 <a:solidFill>
-                  <a:schemeClr val="accent2"/>
-                </a:solidFill>
-                <a:latin typeface="Courier New" pitchFamily="49" charset="0"/>
-                <a:cs typeface="Courier New" pitchFamily="49" charset="0"/>
-              </a:rPr>
-              <a:t>btn_pushed</a:t>
+                  <a:srgbClr val="00B050"/>
+                </a:solidFill>
+                <a:latin typeface="Courier New" pitchFamily="49" charset="0"/>
+                <a:cs typeface="Courier New" pitchFamily="49" charset="0"/>
+              </a:rPr>
+              <a:t>Btn</a:t>
             </a:r>
             <a:r>
               <a:rPr lang="en-US" sz="1400" b="1" dirty="0">
                 <a:solidFill>
-                  <a:schemeClr val="accent2"/>
-                </a:solidFill>
-                <a:latin typeface="Courier New" pitchFamily="49" charset="0"/>
-                <a:cs typeface="Courier New" pitchFamily="49" charset="0"/>
-              </a:rPr>
-              <a:t>:   </a:t>
-            </a:r>
-            <a:r>
-              <a:rPr lang="en-US" sz="1400" b="1" dirty="0" smtClean="0">
-                <a:solidFill>
-                  <a:schemeClr val="accent2"/>
-                </a:solidFill>
-                <a:latin typeface="Courier New" pitchFamily="49" charset="0"/>
-                <a:cs typeface="Courier New" pitchFamily="49" charset="0"/>
-              </a:rPr>
-              <a:t>       </a:t>
-            </a:r>
-            <a:r>
-              <a:rPr lang="en-US" sz="1400" b="1" dirty="0" err="1" smtClean="0">
+                  <a:srgbClr val="00B050"/>
+                </a:solidFill>
+                <a:latin typeface="Courier New" pitchFamily="49" charset="0"/>
+                <a:cs typeface="Courier New" pitchFamily="49" charset="0"/>
+              </a:rPr>
+              <a:t> Counter on </a:t>
+            </a:r>
+            <a:r>
+              <a:rPr lang="en-US" sz="1400" b="1" dirty="0" err="1">
+                <a:solidFill>
+                  <a:srgbClr val="00B050"/>
+                </a:solidFill>
+                <a:latin typeface="Courier New" pitchFamily="49" charset="0"/>
+                <a:cs typeface="Courier New" pitchFamily="49" charset="0"/>
+              </a:rPr>
+              <a:t>Btn</a:t>
+            </a:r>
+            <a:r>
+              <a:rPr lang="en-US" sz="1400" b="1" dirty="0">
+                <a:solidFill>
+                  <a:srgbClr val="00B050"/>
+                </a:solidFill>
+                <a:latin typeface="Courier New" pitchFamily="49" charset="0"/>
+                <a:cs typeface="Courier New" pitchFamily="49" charset="0"/>
+              </a:rPr>
+              <a:t> press</a:t>
+            </a:r>
+          </a:p>
+          <a:p>
+            <a:pPr marL="0" indent="0">
+              <a:buNone/>
+            </a:pPr>
+            <a:r>
+              <a:rPr lang="en-US" sz="1400" b="1" dirty="0">
+                <a:solidFill>
+                  <a:srgbClr val="00B050"/>
+                </a:solidFill>
+                <a:latin typeface="Courier New" pitchFamily="49" charset="0"/>
+                <a:cs typeface="Courier New" pitchFamily="49" charset="0"/>
+              </a:rPr>
+              <a:t>; A delay is used immediately after the press and release</a:t>
+            </a:r>
+          </a:p>
+          <a:p>
+            <a:pPr marL="0" indent="0">
+              <a:buNone/>
+            </a:pPr>
+            <a:r>
+              <a:rPr lang="en-US" sz="1400" b="1" dirty="0" err="1">
+                <a:solidFill>
+                  <a:schemeClr val="accent2"/>
+                </a:solidFill>
+                <a:latin typeface="Courier New" pitchFamily="49" charset="0"/>
+                <a:cs typeface="Courier New" pitchFamily="49" charset="0"/>
+              </a:rPr>
+              <a:t>check_btn</a:t>
+            </a:r>
+            <a:r>
+              <a:rPr lang="en-US" sz="1400" b="1" dirty="0">
+                <a:solidFill>
+                  <a:schemeClr val="accent2"/>
+                </a:solidFill>
+                <a:latin typeface="Courier New" pitchFamily="49" charset="0"/>
+                <a:cs typeface="Courier New" pitchFamily="49" charset="0"/>
+              </a:rPr>
+              <a:t>:           </a:t>
+            </a:r>
+            <a:r>
+              <a:rPr lang="en-US" sz="1400" b="1" dirty="0" err="1">
                 <a:solidFill>
                   <a:schemeClr val="accent2"/>
                 </a:solidFill>
@@ -13521,16 +13643,6 @@
               <a:t>bit.b</a:t>
             </a:r>
             <a:r>
-              <a:rPr lang="en-US" sz="1400" b="1" dirty="0" smtClean="0">
-                <a:solidFill>
-                  <a:schemeClr val="accent2"/>
-                </a:solidFill>
-                <a:latin typeface="Courier New" pitchFamily="49" charset="0"/>
-                <a:cs typeface="Courier New" pitchFamily="49" charset="0"/>
-              </a:rPr>
-              <a:t>  </a:t>
-            </a:r>
-            <a:r>
               <a:rPr lang="en-US" sz="1400" b="1" dirty="0">
                 <a:solidFill>
                   <a:schemeClr val="accent2"/>
@@ -13538,7 +13650,7 @@
                 <a:latin typeface="Courier New" pitchFamily="49" charset="0"/>
                 <a:cs typeface="Courier New" pitchFamily="49" charset="0"/>
               </a:rPr>
-              <a:t>#BIT3, &amp;P1IN</a:t>
+              <a:t>  #BIT3, &amp;P1IN</a:t>
             </a:r>
           </a:p>
           <a:p>
@@ -13563,7 +13675,7 @@
                 <a:latin typeface="Courier New" pitchFamily="49" charset="0"/>
                 <a:cs typeface="Courier New" pitchFamily="49" charset="0"/>
               </a:rPr>
-              <a:t>jz</a:t>
+              <a:t>jnz</a:t>
             </a:r>
             <a:r>
               <a:rPr lang="en-US" sz="1400" b="1" dirty="0">
@@ -13573,104 +13685,10 @@
                 <a:latin typeface="Courier New" pitchFamily="49" charset="0"/>
                 <a:cs typeface="Courier New" pitchFamily="49" charset="0"/>
               </a:rPr>
-              <a:t> </a:t>
-            </a:r>
-            <a:r>
-              <a:rPr lang="en-US" sz="1400" b="1" dirty="0" smtClean="0">
-                <a:solidFill>
-                  <a:schemeClr val="accent2"/>
-                </a:solidFill>
-                <a:latin typeface="Courier New" pitchFamily="49" charset="0"/>
-                <a:cs typeface="Courier New" pitchFamily="49" charset="0"/>
-              </a:rPr>
               <a:t>    </a:t>
             </a:r>
             <a:r>
-              <a:rPr lang="en-US" sz="1400" b="1" dirty="0" err="1" smtClean="0">
-                <a:solidFill>
-                  <a:schemeClr val="accent2"/>
-                </a:solidFill>
-                <a:latin typeface="Courier New" pitchFamily="49" charset="0"/>
-                <a:cs typeface="Courier New" pitchFamily="49" charset="0"/>
-              </a:rPr>
-              <a:t>btn_pushed</a:t>
-            </a:r>
-            <a:endParaRPr lang="en-US" sz="1400" b="1" dirty="0">
-              <a:solidFill>
-                <a:schemeClr val="accent2"/>
-              </a:solidFill>
-              <a:latin typeface="Courier New" pitchFamily="49" charset="0"/>
-              <a:cs typeface="Courier New" pitchFamily="49" charset="0"/>
-            </a:endParaRPr>
-          </a:p>
-          <a:p>
-            <a:pPr marL="0" indent="0">
-              <a:buNone/>
-            </a:pPr>
-            <a:r>
-              <a:rPr lang="en-US" sz="1400" b="1" dirty="0">
-                <a:solidFill>
-                  <a:schemeClr val="accent2"/>
-                </a:solidFill>
-                <a:latin typeface="Courier New" pitchFamily="49" charset="0"/>
-                <a:cs typeface="Courier New" pitchFamily="49" charset="0"/>
-              </a:rPr>
-              <a:t>                     call   #</a:t>
-            </a:r>
-            <a:r>
               <a:rPr lang="en-US" sz="1400" b="1" dirty="0" err="1">
-                <a:solidFill>
-                  <a:schemeClr val="accent2"/>
-                </a:solidFill>
-                <a:latin typeface="Courier New" pitchFamily="49" charset="0"/>
-                <a:cs typeface="Courier New" pitchFamily="49" charset="0"/>
-              </a:rPr>
-              <a:t>software_delay</a:t>
-            </a:r>
-            <a:endParaRPr lang="en-US" sz="1400" b="1" dirty="0">
-              <a:solidFill>
-                <a:schemeClr val="accent2"/>
-              </a:solidFill>
-              <a:latin typeface="Courier New" pitchFamily="49" charset="0"/>
-              <a:cs typeface="Courier New" pitchFamily="49" charset="0"/>
-            </a:endParaRPr>
-          </a:p>
-          <a:p>
-            <a:pPr marL="0" indent="0">
-              <a:buNone/>
-            </a:pPr>
-            <a:r>
-              <a:rPr lang="en-US" sz="1400" b="1" dirty="0">
-                <a:solidFill>
-                  <a:schemeClr val="accent2"/>
-                </a:solidFill>
-                <a:latin typeface="Courier New" pitchFamily="49" charset="0"/>
-                <a:cs typeface="Courier New" pitchFamily="49" charset="0"/>
-              </a:rPr>
-              <a:t>                     </a:t>
-            </a:r>
-            <a:r>
-              <a:rPr lang="en-US" sz="1400" b="1" dirty="0" err="1">
-                <a:solidFill>
-                  <a:schemeClr val="accent2"/>
-                </a:solidFill>
-                <a:latin typeface="Courier New" pitchFamily="49" charset="0"/>
-                <a:cs typeface="Courier New" pitchFamily="49" charset="0"/>
-              </a:rPr>
-              <a:t>jmp</a:t>
-            </a:r>
-            <a:r>
-              <a:rPr lang="en-US" sz="1400" b="1" dirty="0">
-                <a:solidFill>
-                  <a:schemeClr val="accent2"/>
-                </a:solidFill>
-                <a:latin typeface="Courier New" pitchFamily="49" charset="0"/>
-                <a:cs typeface="Courier New" pitchFamily="49" charset="0"/>
-              </a:rPr>
-              <a:t>    </a:t>
-            </a:r>
-            <a:r>
-              <a:rPr lang="en-US" sz="1400" b="1" dirty="0" err="1" smtClean="0">
                 <a:solidFill>
                   <a:schemeClr val="accent2"/>
                 </a:solidFill>
@@ -13704,26 +13722,6 @@
               <a:buNone/>
             </a:pPr>
             <a:r>
-              <a:rPr lang="en-US" sz="1400" b="1" dirty="0" err="1" smtClean="0">
-                <a:solidFill>
-                  <a:schemeClr val="accent2"/>
-                </a:solidFill>
-                <a:latin typeface="Courier New" pitchFamily="49" charset="0"/>
-                <a:cs typeface="Courier New" pitchFamily="49" charset="0"/>
-              </a:rPr>
-              <a:t>software_delay</a:t>
-            </a:r>
-            <a:r>
-              <a:rPr lang="en-US" sz="1400" b="1" dirty="0" smtClean="0">
-                <a:solidFill>
-                  <a:schemeClr val="accent2"/>
-                </a:solidFill>
-                <a:latin typeface="Courier New" pitchFamily="49" charset="0"/>
-                <a:cs typeface="Courier New" pitchFamily="49" charset="0"/>
-              </a:rPr>
-              <a:t>:      push   </a:t>
-            </a:r>
-            <a:r>
               <a:rPr lang="en-US" sz="1400" b="1" dirty="0">
                 <a:solidFill>
                   <a:schemeClr val="accent2"/>
@@ -13731,88 +13729,33 @@
                 <a:latin typeface="Courier New" pitchFamily="49" charset="0"/>
                 <a:cs typeface="Courier New" pitchFamily="49" charset="0"/>
               </a:rPr>
-              <a:t>r5</a:t>
+              <a:t>                     </a:t>
+            </a:r>
+            <a:r>
+              <a:rPr lang="en-US" sz="1400" b="1" dirty="0" err="1">
+                <a:solidFill>
+                  <a:schemeClr val="accent2"/>
+                </a:solidFill>
+                <a:latin typeface="Courier New" pitchFamily="49" charset="0"/>
+                <a:cs typeface="Courier New" pitchFamily="49" charset="0"/>
+              </a:rPr>
+              <a:t>inc</a:t>
+            </a:r>
+            <a:r>
+              <a:rPr lang="en-US" sz="1400" b="1" dirty="0">
+                <a:solidFill>
+                  <a:schemeClr val="accent2"/>
+                </a:solidFill>
+                <a:latin typeface="Courier New" pitchFamily="49" charset="0"/>
+                <a:cs typeface="Courier New" pitchFamily="49" charset="0"/>
+              </a:rPr>
+              <a:t> R4</a:t>
             </a:r>
           </a:p>
           <a:p>
             <a:pPr marL="0" indent="0">
               <a:buNone/>
             </a:pPr>
-            <a:r>
-              <a:rPr lang="en-US" sz="1400" b="1" dirty="0">
-                <a:solidFill>
-                  <a:schemeClr val="accent2"/>
-                </a:solidFill>
-                <a:latin typeface="Courier New" pitchFamily="49" charset="0"/>
-                <a:cs typeface="Courier New" pitchFamily="49" charset="0"/>
-              </a:rPr>
-              <a:t>                     </a:t>
-            </a:r>
-            <a:r>
-              <a:rPr lang="en-US" sz="1400" b="1" dirty="0" err="1">
-                <a:solidFill>
-                  <a:schemeClr val="accent2"/>
-                </a:solidFill>
-                <a:latin typeface="Courier New" pitchFamily="49" charset="0"/>
-                <a:cs typeface="Courier New" pitchFamily="49" charset="0"/>
-              </a:rPr>
-              <a:t>mov.w</a:t>
-            </a:r>
-            <a:r>
-              <a:rPr lang="en-US" sz="1400" b="1" dirty="0">
-                <a:solidFill>
-                  <a:schemeClr val="accent2"/>
-                </a:solidFill>
-                <a:latin typeface="Courier New" pitchFamily="49" charset="0"/>
-                <a:cs typeface="Courier New" pitchFamily="49" charset="0"/>
-              </a:rPr>
-              <a:t>  #0xaaaa, r5</a:t>
-            </a:r>
-          </a:p>
-          <a:p>
-            <a:pPr marL="0" indent="0">
-              <a:buNone/>
-            </a:pPr>
-            <a:r>
-              <a:rPr lang="en-US" sz="1400" b="1" dirty="0">
-                <a:solidFill>
-                  <a:schemeClr val="accent2"/>
-                </a:solidFill>
-                <a:latin typeface="Courier New" pitchFamily="49" charset="0"/>
-                <a:cs typeface="Courier New" pitchFamily="49" charset="0"/>
-              </a:rPr>
-              <a:t>delay:               </a:t>
-            </a:r>
-            <a:r>
-              <a:rPr lang="en-US" sz="1400" b="1" dirty="0" err="1">
-                <a:solidFill>
-                  <a:schemeClr val="accent2"/>
-                </a:solidFill>
-                <a:latin typeface="Courier New" pitchFamily="49" charset="0"/>
-                <a:cs typeface="Courier New" pitchFamily="49" charset="0"/>
-              </a:rPr>
-              <a:t>dec</a:t>
-            </a:r>
-            <a:r>
-              <a:rPr lang="en-US" sz="1400" b="1" dirty="0">
-                <a:solidFill>
-                  <a:schemeClr val="accent2"/>
-                </a:solidFill>
-                <a:latin typeface="Courier New" pitchFamily="49" charset="0"/>
-                <a:cs typeface="Courier New" pitchFamily="49" charset="0"/>
-              </a:rPr>
-              <a:t>    </a:t>
-            </a:r>
-            <a:r>
-              <a:rPr lang="en-US" sz="1400" b="1" dirty="0" smtClean="0">
-                <a:solidFill>
-                  <a:schemeClr val="accent2"/>
-                </a:solidFill>
-                <a:latin typeface="Courier New" pitchFamily="49" charset="0"/>
-                <a:cs typeface="Courier New" pitchFamily="49" charset="0"/>
-              </a:rPr>
-              <a:t>r5</a:t>
-            </a:r>
             <a:endParaRPr lang="en-US" sz="1400" b="1" dirty="0">
               <a:solidFill>
                 <a:schemeClr val="accent2"/>
@@ -13833,7 +13776,7 @@
                 <a:latin typeface="Courier New" pitchFamily="49" charset="0"/>
                 <a:cs typeface="Courier New" pitchFamily="49" charset="0"/>
               </a:rPr>
-              <a:t>                     </a:t>
+              <a:t>                     call   #</a:t>
             </a:r>
             <a:r>
               <a:rPr lang="en-US" sz="1400" b="1" dirty="0" err="1">
@@ -13843,27 +13786,7 @@
                 <a:latin typeface="Courier New" pitchFamily="49" charset="0"/>
                 <a:cs typeface="Courier New" pitchFamily="49" charset="0"/>
               </a:rPr>
-              <a:t>jnz</a:t>
-            </a:r>
-            <a:r>
-              <a:rPr lang="en-US" sz="1400" b="1" dirty="0">
-                <a:solidFill>
-                  <a:schemeClr val="accent2"/>
-                </a:solidFill>
-                <a:latin typeface="Courier New" pitchFamily="49" charset="0"/>
-                <a:cs typeface="Courier New" pitchFamily="49" charset="0"/>
-              </a:rPr>
-              <a:t>    </a:t>
-            </a:r>
-            <a:r>
-              <a:rPr lang="en-US" sz="1400" b="1" dirty="0" smtClean="0">
-                <a:solidFill>
-                  <a:schemeClr val="accent2"/>
-                </a:solidFill>
-                <a:latin typeface="Courier New" pitchFamily="49" charset="0"/>
-                <a:cs typeface="Courier New" pitchFamily="49" charset="0"/>
-              </a:rPr>
-              <a:t>delay</a:t>
+              <a:t>software_delay</a:t>
             </a:r>
             <a:endParaRPr lang="en-US" sz="1400" b="1" dirty="0">
               <a:solidFill>
@@ -13885,23 +13808,18 @@
                 <a:latin typeface="Courier New" pitchFamily="49" charset="0"/>
                 <a:cs typeface="Courier New" pitchFamily="49" charset="0"/>
               </a:rPr>
-              <a:t>                     pop    </a:t>
-            </a:r>
-            <a:r>
-              <a:rPr lang="en-US" sz="1400" b="1" dirty="0" smtClean="0">
-                <a:solidFill>
-                  <a:schemeClr val="accent2"/>
-                </a:solidFill>
-                <a:latin typeface="Courier New" pitchFamily="49" charset="0"/>
-                <a:cs typeface="Courier New" pitchFamily="49" charset="0"/>
-              </a:rPr>
-              <a:t>r5</a:t>
-            </a:r>
-          </a:p>
-          <a:p>
-            <a:pPr marL="0" indent="0">
-              <a:buNone/>
-            </a:pPr>
+              <a:t>                     </a:t>
+            </a:r>
+            <a:r>
+              <a:rPr lang="en-US" sz="1400" b="1" dirty="0" err="1">
+                <a:solidFill>
+                  <a:schemeClr val="accent2"/>
+                </a:solidFill>
+                <a:latin typeface="Courier New" pitchFamily="49" charset="0"/>
+                <a:cs typeface="Courier New" pitchFamily="49" charset="0"/>
+              </a:rPr>
+              <a:t>jmp</a:t>
+            </a:r>
             <a:r>
               <a:rPr lang="en-US" sz="1400" b="1" dirty="0">
                 <a:solidFill>
@@ -13910,17 +13828,17 @@
                 <a:latin typeface="Courier New" pitchFamily="49" charset="0"/>
                 <a:cs typeface="Courier New" pitchFamily="49" charset="0"/>
               </a:rPr>
-              <a:t> </a:t>
-            </a:r>
-            <a:r>
-              <a:rPr lang="en-US" sz="1400" b="1" dirty="0" smtClean="0">
-                <a:solidFill>
-                  <a:schemeClr val="accent2"/>
-                </a:solidFill>
-                <a:latin typeface="Courier New" pitchFamily="49" charset="0"/>
-                <a:cs typeface="Courier New" pitchFamily="49" charset="0"/>
-              </a:rPr>
-              <a:t>                    ret</a:t>
+              <a:t>    </a:t>
+            </a:r>
+            <a:r>
+              <a:rPr lang="en-US" sz="1400" b="1" dirty="0" err="1">
+                <a:solidFill>
+                  <a:schemeClr val="accent2"/>
+                </a:solidFill>
+                <a:latin typeface="Courier New" pitchFamily="49" charset="0"/>
+                <a:cs typeface="Courier New" pitchFamily="49" charset="0"/>
+              </a:rPr>
+              <a:t>btn_pushed</a:t>
             </a:r>
             <a:endParaRPr lang="en-US" sz="1400" b="1" dirty="0">
               <a:solidFill>
@@ -13934,6 +13852,28 @@
             <a:pPr marL="0" indent="0">
               <a:buNone/>
             </a:pPr>
+            <a:endParaRPr lang="en-US" sz="1400" b="1" dirty="0">
+              <a:solidFill>
+                <a:schemeClr val="accent2"/>
+              </a:solidFill>
+              <a:latin typeface="Courier New" pitchFamily="49" charset="0"/>
+              <a:cs typeface="Courier New" pitchFamily="49" charset="0"/>
+            </a:endParaRPr>
+          </a:p>
+          <a:p>
+            <a:pPr marL="0" indent="0">
+              <a:buNone/>
+            </a:pPr>
+            <a:r>
+              <a:rPr lang="en-US" sz="1400" b="1" dirty="0" err="1">
+                <a:solidFill>
+                  <a:schemeClr val="accent2"/>
+                </a:solidFill>
+                <a:latin typeface="Courier New" pitchFamily="49" charset="0"/>
+                <a:cs typeface="Courier New" pitchFamily="49" charset="0"/>
+              </a:rPr>
+              <a:t>btn_pushed</a:t>
+            </a:r>
             <a:r>
               <a:rPr lang="en-US" sz="1400" b="1" dirty="0">
                 <a:solidFill>
@@ -13942,11 +13882,726 @@
                 <a:latin typeface="Courier New" pitchFamily="49" charset="0"/>
                 <a:cs typeface="Courier New" pitchFamily="49" charset="0"/>
               </a:rPr>
+              <a:t>:          </a:t>
+            </a:r>
+            <a:r>
+              <a:rPr lang="en-US" sz="1400" b="1" dirty="0" err="1">
+                <a:solidFill>
+                  <a:schemeClr val="accent2"/>
+                </a:solidFill>
+                <a:latin typeface="Courier New" pitchFamily="49" charset="0"/>
+                <a:cs typeface="Courier New" pitchFamily="49" charset="0"/>
+              </a:rPr>
+              <a:t>bit.b</a:t>
+            </a:r>
+            <a:r>
+              <a:rPr lang="en-US" sz="1400" b="1" dirty="0">
+                <a:solidFill>
+                  <a:schemeClr val="accent2"/>
+                </a:solidFill>
+                <a:latin typeface="Courier New" pitchFamily="49" charset="0"/>
+                <a:cs typeface="Courier New" pitchFamily="49" charset="0"/>
+              </a:rPr>
+              <a:t>  #BIT3, &amp;P1IN</a:t>
+            </a:r>
+          </a:p>
+          <a:p>
+            <a:pPr marL="0" indent="0">
+              <a:buNone/>
+            </a:pPr>
+            <a:r>
+              <a:rPr lang="en-US" sz="1400" b="1" dirty="0">
+                <a:solidFill>
+                  <a:schemeClr val="accent2"/>
+                </a:solidFill>
+                <a:latin typeface="Courier New" pitchFamily="49" charset="0"/>
+                <a:cs typeface="Courier New" pitchFamily="49" charset="0"/>
+              </a:rPr>
               <a:t>                     </a:t>
+            </a:r>
+            <a:r>
+              <a:rPr lang="en-US" sz="1400" b="1" dirty="0" err="1">
+                <a:solidFill>
+                  <a:schemeClr val="accent2"/>
+                </a:solidFill>
+                <a:latin typeface="Courier New" pitchFamily="49" charset="0"/>
+                <a:cs typeface="Courier New" pitchFamily="49" charset="0"/>
+              </a:rPr>
+              <a:t>jz</a:t>
+            </a:r>
+            <a:r>
+              <a:rPr lang="en-US" sz="1400" b="1" dirty="0">
+                <a:solidFill>
+                  <a:schemeClr val="accent2"/>
+                </a:solidFill>
+                <a:latin typeface="Courier New" pitchFamily="49" charset="0"/>
+                <a:cs typeface="Courier New" pitchFamily="49" charset="0"/>
+              </a:rPr>
+              <a:t>     </a:t>
+            </a:r>
+            <a:r>
+              <a:rPr lang="en-US" sz="1400" b="1" dirty="0" err="1" smtClean="0">
+                <a:solidFill>
+                  <a:schemeClr val="accent2"/>
+                </a:solidFill>
+                <a:latin typeface="Courier New" pitchFamily="49" charset="0"/>
+                <a:cs typeface="Courier New" pitchFamily="49" charset="0"/>
+              </a:rPr>
+              <a:t>btn_pushed</a:t>
             </a:r>
             <a:endParaRPr lang="en-US" sz="1400" b="1" dirty="0" smtClean="0">
               <a:solidFill>
                 <a:schemeClr val="accent2"/>
+              </a:solidFill>
+              <a:latin typeface="Courier New" pitchFamily="49" charset="0"/>
+              <a:cs typeface="Courier New" pitchFamily="49" charset="0"/>
+            </a:endParaRPr>
+          </a:p>
+          <a:p>
+            <a:pPr marL="0" indent="0">
+              <a:buNone/>
+            </a:pPr>
+            <a:r>
+              <a:rPr lang="en-US" sz="1400" b="1" dirty="0">
+                <a:solidFill>
+                  <a:schemeClr val="accent2"/>
+                </a:solidFill>
+                <a:latin typeface="Courier New" pitchFamily="49" charset="0"/>
+                <a:cs typeface="Courier New" pitchFamily="49" charset="0"/>
+              </a:rPr>
+              <a:t>	</a:t>
+            </a:r>
+            <a:r>
+              <a:rPr lang="en-US" sz="1400" b="1" dirty="0" smtClean="0">
+                <a:solidFill>
+                  <a:schemeClr val="accent2"/>
+                </a:solidFill>
+                <a:latin typeface="Courier New" pitchFamily="49" charset="0"/>
+                <a:cs typeface="Courier New" pitchFamily="49" charset="0"/>
+              </a:rPr>
+              <a:t>	    </a:t>
+            </a:r>
+          </a:p>
+          <a:p>
+            <a:pPr marL="0" indent="0">
+              <a:buNone/>
+            </a:pPr>
+            <a:r>
+              <a:rPr lang="en-US" sz="1400" b="1" dirty="0">
+                <a:solidFill>
+                  <a:schemeClr val="accent2"/>
+                </a:solidFill>
+                <a:latin typeface="Courier New" pitchFamily="49" charset="0"/>
+                <a:cs typeface="Courier New" pitchFamily="49" charset="0"/>
+              </a:rPr>
+              <a:t>	</a:t>
+            </a:r>
+            <a:r>
+              <a:rPr lang="en-US" sz="1400" b="1" dirty="0" smtClean="0">
+                <a:solidFill>
+                  <a:schemeClr val="accent2"/>
+                </a:solidFill>
+                <a:latin typeface="Courier New" pitchFamily="49" charset="0"/>
+                <a:cs typeface="Courier New" pitchFamily="49" charset="0"/>
+              </a:rPr>
+              <a:t>	    </a:t>
+            </a:r>
+            <a:r>
+              <a:rPr lang="en-US" sz="1400" b="1" dirty="0" smtClean="0">
+                <a:solidFill>
+                  <a:srgbClr val="00B050"/>
+                </a:solidFill>
+                <a:latin typeface="Courier New" pitchFamily="49" charset="0"/>
+                <a:cs typeface="Courier New" pitchFamily="49" charset="0"/>
+              </a:rPr>
+              <a:t>; </a:t>
+            </a:r>
+            <a:r>
+              <a:rPr lang="en-US" sz="1400" b="1" dirty="0" err="1">
+                <a:solidFill>
+                  <a:srgbClr val="00B050"/>
+                </a:solidFill>
+                <a:latin typeface="Courier New" pitchFamily="49" charset="0"/>
+                <a:cs typeface="Courier New" pitchFamily="49" charset="0"/>
+              </a:rPr>
+              <a:t>Btn</a:t>
+            </a:r>
+            <a:r>
+              <a:rPr lang="en-US" sz="1400" b="1" dirty="0">
+                <a:solidFill>
+                  <a:srgbClr val="00B050"/>
+                </a:solidFill>
+                <a:latin typeface="Courier New" pitchFamily="49" charset="0"/>
+                <a:cs typeface="Courier New" pitchFamily="49" charset="0"/>
+              </a:rPr>
+              <a:t> released</a:t>
+            </a:r>
+          </a:p>
+          <a:p>
+            <a:pPr marL="0" indent="0">
+              <a:buNone/>
+            </a:pPr>
+            <a:r>
+              <a:rPr lang="en-US" sz="1400" b="1" dirty="0">
+                <a:solidFill>
+                  <a:schemeClr val="accent2"/>
+                </a:solidFill>
+                <a:latin typeface="Courier New" pitchFamily="49" charset="0"/>
+                <a:cs typeface="Courier New" pitchFamily="49" charset="0"/>
+              </a:rPr>
+              <a:t>                     call   #</a:t>
+            </a:r>
+            <a:r>
+              <a:rPr lang="en-US" sz="1400" b="1" dirty="0" err="1">
+                <a:solidFill>
+                  <a:schemeClr val="accent2"/>
+                </a:solidFill>
+                <a:latin typeface="Courier New" pitchFamily="49" charset="0"/>
+                <a:cs typeface="Courier New" pitchFamily="49" charset="0"/>
+              </a:rPr>
+              <a:t>software_delay</a:t>
+            </a:r>
+            <a:endParaRPr lang="en-US" sz="1400" b="1" dirty="0">
+              <a:solidFill>
+                <a:schemeClr val="accent2"/>
+              </a:solidFill>
+              <a:latin typeface="Courier New" pitchFamily="49" charset="0"/>
+              <a:cs typeface="Courier New" pitchFamily="49" charset="0"/>
+            </a:endParaRPr>
+          </a:p>
+          <a:p>
+            <a:pPr marL="0" indent="0">
+              <a:buNone/>
+            </a:pPr>
+            <a:r>
+              <a:rPr lang="en-US" sz="1400" b="1" dirty="0">
+                <a:solidFill>
+                  <a:schemeClr val="accent2"/>
+                </a:solidFill>
+                <a:latin typeface="Courier New" pitchFamily="49" charset="0"/>
+                <a:cs typeface="Courier New" pitchFamily="49" charset="0"/>
+              </a:rPr>
+              <a:t>                     </a:t>
+            </a:r>
+            <a:r>
+              <a:rPr lang="en-US" sz="1400" b="1" dirty="0" err="1">
+                <a:solidFill>
+                  <a:schemeClr val="accent2"/>
+                </a:solidFill>
+                <a:latin typeface="Courier New" pitchFamily="49" charset="0"/>
+                <a:cs typeface="Courier New" pitchFamily="49" charset="0"/>
+              </a:rPr>
+              <a:t>jmp</a:t>
+            </a:r>
+            <a:r>
+              <a:rPr lang="en-US" sz="1400" b="1" dirty="0">
+                <a:solidFill>
+                  <a:schemeClr val="accent2"/>
+                </a:solidFill>
+                <a:latin typeface="Courier New" pitchFamily="49" charset="0"/>
+                <a:cs typeface="Courier New" pitchFamily="49" charset="0"/>
+              </a:rPr>
+              <a:t>    </a:t>
+            </a:r>
+            <a:r>
+              <a:rPr lang="en-US" sz="1400" b="1" dirty="0" err="1">
+                <a:solidFill>
+                  <a:schemeClr val="accent2"/>
+                </a:solidFill>
+                <a:latin typeface="Courier New" pitchFamily="49" charset="0"/>
+                <a:cs typeface="Courier New" pitchFamily="49" charset="0"/>
+              </a:rPr>
+              <a:t>check_btn</a:t>
+            </a:r>
+            <a:endParaRPr lang="en-US" sz="1400" b="1" dirty="0" smtClean="0">
+              <a:solidFill>
+                <a:schemeClr val="accent2"/>
+              </a:solidFill>
+              <a:latin typeface="Courier New" pitchFamily="49" charset="0"/>
+              <a:cs typeface="Courier New" pitchFamily="49" charset="0"/>
+            </a:endParaRPr>
+          </a:p>
+        </p:txBody>
+      </p:sp>
+    </p:spTree>
+    <p:extLst>
+      <p:ext uri="{BB962C8B-B14F-4D97-AF65-F5344CB8AC3E}">
+        <p14:creationId xmlns:p14="http://schemas.microsoft.com/office/powerpoint/2010/main" val="3978755383"/>
+      </p:ext>
+    </p:extLst>
+  </p:cSld>
+  <p:clrMapOvr>
+    <a:masterClrMapping/>
+  </p:clrMapOvr>
+  <p:timing>
+    <p:tnLst>
+      <p:par>
+        <p:cTn id="1" dur="indefinite" restart="never" nodeType="tmRoot"/>
+      </p:par>
+    </p:tnLst>
+  </p:timing>
+</p:sld>
+</file>
+
+<file path=ppt/slides/slide23.xml><?xml version="1.0" encoding="utf-8"?>
+<p:sld xmlns:a="http://schemas.openxmlformats.org/drawingml/2006/main" xmlns:r="http://schemas.openxmlformats.org/officeDocument/2006/relationships" xmlns:p="http://schemas.openxmlformats.org/presentationml/2006/main">
+  <p:cSld>
+    <p:spTree>
+      <p:nvGrpSpPr>
+        <p:cNvPr id="1" name=""/>
+        <p:cNvGrpSpPr/>
+        <p:nvPr/>
+      </p:nvGrpSpPr>
+      <p:grpSpPr>
+        <a:xfrm>
+          <a:off x="0" y="0"/>
+          <a:ext cx="0" cy="0"/>
+          <a:chOff x="0" y="0"/>
+          <a:chExt cx="0" cy="0"/>
+        </a:xfrm>
+      </p:grpSpPr>
+      <p:sp>
+        <p:nvSpPr>
+          <p:cNvPr id="2" name="Title 1"/>
+          <p:cNvSpPr>
+            <a:spLocks noGrp="1"/>
+          </p:cNvSpPr>
+          <p:nvPr>
+            <p:ph type="title"/>
+          </p:nvPr>
+        </p:nvSpPr>
+        <p:spPr/>
+        <p:txBody>
+          <a:bodyPr/>
+          <a:lstStyle/>
+          <a:p>
+            <a:r>
+              <a:rPr lang="en-US" dirty="0" err="1" smtClean="0"/>
+              <a:t>Debounced</a:t>
+            </a:r>
+            <a:r>
+              <a:rPr lang="en-US" dirty="0" smtClean="0"/>
+              <a:t> code with SW delay</a:t>
+            </a:r>
+            <a:endParaRPr lang="en-US" dirty="0"/>
+          </a:p>
+        </p:txBody>
+      </p:sp>
+      <p:sp>
+        <p:nvSpPr>
+          <p:cNvPr id="3" name="Content Placeholder 2"/>
+          <p:cNvSpPr>
+            <a:spLocks noGrp="1"/>
+          </p:cNvSpPr>
+          <p:nvPr>
+            <p:ph idx="1"/>
+          </p:nvPr>
+        </p:nvSpPr>
+        <p:spPr>
+          <a:xfrm>
+            <a:off x="637248" y="699961"/>
+            <a:ext cx="7772400" cy="4724400"/>
+          </a:xfrm>
+        </p:spPr>
+        <p:txBody>
+          <a:bodyPr/>
+          <a:lstStyle/>
+          <a:p>
+            <a:pPr marL="0" indent="0">
+              <a:buNone/>
+            </a:pPr>
+            <a:r>
+              <a:rPr lang="en-US" sz="1400" b="1" dirty="0">
+                <a:solidFill>
+                  <a:srgbClr val="00B050"/>
+                </a:solidFill>
+                <a:latin typeface="Courier New" pitchFamily="49" charset="0"/>
+                <a:cs typeface="Courier New" pitchFamily="49" charset="0"/>
+              </a:rPr>
+              <a:t>; -------------------------------------------</a:t>
+            </a:r>
+          </a:p>
+          <a:p>
+            <a:pPr marL="0" indent="0">
+              <a:buNone/>
+            </a:pPr>
+            <a:r>
+              <a:rPr lang="en-US" sz="1400" b="1" dirty="0">
+                <a:solidFill>
+                  <a:srgbClr val="00B050"/>
+                </a:solidFill>
+                <a:latin typeface="Courier New" pitchFamily="49" charset="0"/>
+                <a:cs typeface="Courier New" pitchFamily="49" charset="0"/>
+              </a:rPr>
+              <a:t>; Software delay</a:t>
+            </a:r>
+          </a:p>
+          <a:p>
+            <a:pPr marL="0" indent="0">
+              <a:buNone/>
+            </a:pPr>
+            <a:r>
+              <a:rPr lang="en-US" sz="1400" b="1" dirty="0">
+                <a:solidFill>
+                  <a:srgbClr val="00B050"/>
+                </a:solidFill>
+                <a:latin typeface="Courier New" pitchFamily="49" charset="0"/>
+                <a:cs typeface="Courier New" pitchFamily="49" charset="0"/>
+              </a:rPr>
+              <a:t>; Purpose:  Delays code based on value of R5</a:t>
+            </a:r>
+          </a:p>
+          <a:p>
+            <a:pPr marL="0" indent="0">
+              <a:buNone/>
+            </a:pPr>
+            <a:r>
+              <a:rPr lang="en-US" sz="1400" b="1" dirty="0">
+                <a:solidFill>
+                  <a:srgbClr val="00B050"/>
+                </a:solidFill>
+                <a:latin typeface="Courier New" pitchFamily="49" charset="0"/>
+                <a:cs typeface="Courier New" pitchFamily="49" charset="0"/>
+              </a:rPr>
+              <a:t>;	</a:t>
+            </a:r>
+            <a:r>
+              <a:rPr lang="en-US" sz="1400" b="1" dirty="0" smtClean="0">
+                <a:solidFill>
+                  <a:srgbClr val="00B050"/>
+                </a:solidFill>
+                <a:latin typeface="Courier New" pitchFamily="49" charset="0"/>
+                <a:cs typeface="Courier New" pitchFamily="49" charset="0"/>
+              </a:rPr>
+              <a:t>   R5 </a:t>
+            </a:r>
+            <a:r>
+              <a:rPr lang="en-US" sz="1400" b="1" dirty="0">
+                <a:solidFill>
+                  <a:srgbClr val="00B050"/>
+                </a:solidFill>
+                <a:latin typeface="Courier New" pitchFamily="49" charset="0"/>
+                <a:cs typeface="Courier New" pitchFamily="49" charset="0"/>
+              </a:rPr>
+              <a:t>is currently hard coded as 0xAAAA</a:t>
+            </a:r>
+          </a:p>
+          <a:p>
+            <a:pPr marL="0" indent="0">
+              <a:buNone/>
+            </a:pPr>
+            <a:r>
+              <a:rPr lang="en-US" sz="1400" b="1" dirty="0">
+                <a:solidFill>
+                  <a:srgbClr val="00B050"/>
+                </a:solidFill>
+                <a:latin typeface="Courier New" pitchFamily="49" charset="0"/>
+                <a:cs typeface="Courier New" pitchFamily="49" charset="0"/>
+              </a:rPr>
+              <a:t>; -------------------------------------------</a:t>
+            </a:r>
+          </a:p>
+          <a:p>
+            <a:pPr marL="0" indent="0">
+              <a:buNone/>
+            </a:pPr>
+            <a:r>
+              <a:rPr lang="en-US" sz="1400" b="1" dirty="0" err="1">
+                <a:solidFill>
+                  <a:schemeClr val="accent2"/>
+                </a:solidFill>
+                <a:latin typeface="Courier New" pitchFamily="49" charset="0"/>
+                <a:cs typeface="Courier New" pitchFamily="49" charset="0"/>
+              </a:rPr>
+              <a:t>software_delay</a:t>
+            </a:r>
+            <a:r>
+              <a:rPr lang="en-US" sz="1400" b="1" dirty="0">
+                <a:solidFill>
+                  <a:schemeClr val="accent2"/>
+                </a:solidFill>
+                <a:latin typeface="Courier New" pitchFamily="49" charset="0"/>
+                <a:cs typeface="Courier New" pitchFamily="49" charset="0"/>
+              </a:rPr>
+              <a:t>:</a:t>
+            </a:r>
+          </a:p>
+          <a:p>
+            <a:pPr marL="0" indent="0">
+              <a:buNone/>
+            </a:pPr>
+            <a:r>
+              <a:rPr lang="en-US" sz="1400" b="1" dirty="0">
+                <a:solidFill>
+                  <a:schemeClr val="accent2"/>
+                </a:solidFill>
+                <a:latin typeface="Courier New" pitchFamily="49" charset="0"/>
+                <a:cs typeface="Courier New" pitchFamily="49" charset="0"/>
+              </a:rPr>
+              <a:t>		</a:t>
+            </a:r>
+            <a:r>
+              <a:rPr lang="en-US" sz="1400" b="1" dirty="0" smtClean="0">
+                <a:solidFill>
+                  <a:schemeClr val="accent2"/>
+                </a:solidFill>
+                <a:latin typeface="Courier New" pitchFamily="49" charset="0"/>
+                <a:cs typeface="Courier New" pitchFamily="49" charset="0"/>
+              </a:rPr>
+              <a:t>push </a:t>
+            </a:r>
+            <a:r>
+              <a:rPr lang="en-US" sz="1400" b="1" dirty="0">
+                <a:solidFill>
+                  <a:schemeClr val="accent2"/>
+                </a:solidFill>
+                <a:latin typeface="Courier New" pitchFamily="49" charset="0"/>
+                <a:cs typeface="Courier New" pitchFamily="49" charset="0"/>
+              </a:rPr>
+              <a:t>r5</a:t>
+            </a:r>
+          </a:p>
+          <a:p>
+            <a:pPr marL="0" indent="0">
+              <a:buNone/>
+            </a:pPr>
+            <a:r>
+              <a:rPr lang="en-US" sz="1400" b="1" dirty="0">
+                <a:solidFill>
+                  <a:schemeClr val="accent2"/>
+                </a:solidFill>
+                <a:latin typeface="Courier New" pitchFamily="49" charset="0"/>
+                <a:cs typeface="Courier New" pitchFamily="49" charset="0"/>
+              </a:rPr>
+              <a:t>		</a:t>
+            </a:r>
+            <a:r>
+              <a:rPr lang="en-US" sz="1400" b="1" dirty="0" err="1" smtClean="0">
+                <a:solidFill>
+                  <a:schemeClr val="accent2"/>
+                </a:solidFill>
+                <a:latin typeface="Courier New" pitchFamily="49" charset="0"/>
+                <a:cs typeface="Courier New" pitchFamily="49" charset="0"/>
+              </a:rPr>
+              <a:t>mov.w</a:t>
+            </a:r>
+            <a:r>
+              <a:rPr lang="en-US" sz="1400" b="1" dirty="0" smtClean="0">
+                <a:solidFill>
+                  <a:schemeClr val="accent2"/>
+                </a:solidFill>
+                <a:latin typeface="Courier New" pitchFamily="49" charset="0"/>
+                <a:cs typeface="Courier New" pitchFamily="49" charset="0"/>
+              </a:rPr>
+              <a:t> </a:t>
+            </a:r>
+            <a:r>
+              <a:rPr lang="en-US" sz="1400" b="1" dirty="0">
+                <a:solidFill>
+                  <a:schemeClr val="accent2"/>
+                </a:solidFill>
+                <a:latin typeface="Courier New" pitchFamily="49" charset="0"/>
+                <a:cs typeface="Courier New" pitchFamily="49" charset="0"/>
+              </a:rPr>
+              <a:t>#0xaaaa, r5</a:t>
+            </a:r>
+          </a:p>
+          <a:p>
+            <a:pPr marL="0" indent="0">
+              <a:buNone/>
+            </a:pPr>
+            <a:endParaRPr lang="en-US" sz="1400" b="1" dirty="0">
+              <a:solidFill>
+                <a:schemeClr val="accent2"/>
+              </a:solidFill>
+              <a:latin typeface="Courier New" pitchFamily="49" charset="0"/>
+              <a:cs typeface="Courier New" pitchFamily="49" charset="0"/>
+            </a:endParaRPr>
+          </a:p>
+          <a:p>
+            <a:pPr marL="0" indent="0">
+              <a:buNone/>
+            </a:pPr>
+            <a:r>
+              <a:rPr lang="en-US" sz="1400" b="1" dirty="0">
+                <a:solidFill>
+                  <a:schemeClr val="accent2"/>
+                </a:solidFill>
+                <a:latin typeface="Courier New" pitchFamily="49" charset="0"/>
+                <a:cs typeface="Courier New" pitchFamily="49" charset="0"/>
+              </a:rPr>
+              <a:t>delay:		</a:t>
+            </a:r>
+            <a:r>
+              <a:rPr lang="en-US" sz="1400" b="1" dirty="0" err="1" smtClean="0">
+                <a:solidFill>
+                  <a:schemeClr val="accent2"/>
+                </a:solidFill>
+                <a:latin typeface="Courier New" pitchFamily="49" charset="0"/>
+                <a:cs typeface="Courier New" pitchFamily="49" charset="0"/>
+              </a:rPr>
+              <a:t>dec</a:t>
+            </a:r>
+            <a:r>
+              <a:rPr lang="en-US" sz="1400" b="1" dirty="0" smtClean="0">
+                <a:solidFill>
+                  <a:schemeClr val="accent2"/>
+                </a:solidFill>
+                <a:latin typeface="Courier New" pitchFamily="49" charset="0"/>
+                <a:cs typeface="Courier New" pitchFamily="49" charset="0"/>
+              </a:rPr>
+              <a:t> </a:t>
+            </a:r>
+            <a:r>
+              <a:rPr lang="en-US" sz="1400" b="1" dirty="0">
+                <a:solidFill>
+                  <a:schemeClr val="accent2"/>
+                </a:solidFill>
+                <a:latin typeface="Courier New" pitchFamily="49" charset="0"/>
+                <a:cs typeface="Courier New" pitchFamily="49" charset="0"/>
+              </a:rPr>
+              <a:t>r5</a:t>
+            </a:r>
+          </a:p>
+          <a:p>
+            <a:pPr marL="0" indent="0">
+              <a:buNone/>
+            </a:pPr>
+            <a:r>
+              <a:rPr lang="en-US" sz="1400" b="1" dirty="0">
+                <a:solidFill>
+                  <a:schemeClr val="accent2"/>
+                </a:solidFill>
+                <a:latin typeface="Courier New" pitchFamily="49" charset="0"/>
+                <a:cs typeface="Courier New" pitchFamily="49" charset="0"/>
+              </a:rPr>
+              <a:t>		</a:t>
+            </a:r>
+            <a:r>
+              <a:rPr lang="en-US" sz="1400" b="1" dirty="0" err="1" smtClean="0">
+                <a:solidFill>
+                  <a:schemeClr val="accent2"/>
+                </a:solidFill>
+                <a:latin typeface="Courier New" pitchFamily="49" charset="0"/>
+                <a:cs typeface="Courier New" pitchFamily="49" charset="0"/>
+              </a:rPr>
+              <a:t>jnz</a:t>
+            </a:r>
+            <a:r>
+              <a:rPr lang="en-US" sz="1400" b="1" dirty="0" smtClean="0">
+                <a:solidFill>
+                  <a:schemeClr val="accent2"/>
+                </a:solidFill>
+                <a:latin typeface="Courier New" pitchFamily="49" charset="0"/>
+                <a:cs typeface="Courier New" pitchFamily="49" charset="0"/>
+              </a:rPr>
+              <a:t> </a:t>
+            </a:r>
+            <a:r>
+              <a:rPr lang="en-US" sz="1400" b="1" dirty="0">
+                <a:solidFill>
+                  <a:schemeClr val="accent2"/>
+                </a:solidFill>
+                <a:latin typeface="Courier New" pitchFamily="49" charset="0"/>
+                <a:cs typeface="Courier New" pitchFamily="49" charset="0"/>
+              </a:rPr>
+              <a:t>delay</a:t>
+            </a:r>
+          </a:p>
+          <a:p>
+            <a:pPr marL="0" indent="0">
+              <a:buNone/>
+            </a:pPr>
+            <a:r>
+              <a:rPr lang="en-US" sz="1400" b="1" dirty="0">
+                <a:solidFill>
+                  <a:schemeClr val="accent2"/>
+                </a:solidFill>
+                <a:latin typeface="Courier New" pitchFamily="49" charset="0"/>
+                <a:cs typeface="Courier New" pitchFamily="49" charset="0"/>
+              </a:rPr>
+              <a:t>		</a:t>
+            </a:r>
+            <a:r>
+              <a:rPr lang="en-US" sz="1400" b="1" dirty="0" smtClean="0">
+                <a:solidFill>
+                  <a:schemeClr val="accent2"/>
+                </a:solidFill>
+                <a:latin typeface="Courier New" pitchFamily="49" charset="0"/>
+                <a:cs typeface="Courier New" pitchFamily="49" charset="0"/>
+              </a:rPr>
+              <a:t>pop </a:t>
+            </a:r>
+            <a:r>
+              <a:rPr lang="en-US" sz="1400" b="1" dirty="0">
+                <a:solidFill>
+                  <a:schemeClr val="accent2"/>
+                </a:solidFill>
+                <a:latin typeface="Courier New" pitchFamily="49" charset="0"/>
+                <a:cs typeface="Courier New" pitchFamily="49" charset="0"/>
+              </a:rPr>
+              <a:t>r5</a:t>
+            </a:r>
+          </a:p>
+          <a:p>
+            <a:pPr marL="0" indent="0">
+              <a:buNone/>
+            </a:pPr>
+            <a:r>
+              <a:rPr lang="en-US" sz="1400" b="1" dirty="0">
+                <a:solidFill>
+                  <a:schemeClr val="accent2"/>
+                </a:solidFill>
+                <a:latin typeface="Courier New" pitchFamily="49" charset="0"/>
+                <a:cs typeface="Courier New" pitchFamily="49" charset="0"/>
+              </a:rPr>
+              <a:t>	</a:t>
+            </a:r>
+            <a:r>
+              <a:rPr lang="en-US" sz="1400" b="1">
+                <a:solidFill>
+                  <a:schemeClr val="accent2"/>
+                </a:solidFill>
+                <a:latin typeface="Courier New" pitchFamily="49" charset="0"/>
+                <a:cs typeface="Courier New" pitchFamily="49" charset="0"/>
+              </a:rPr>
+              <a:t>	</a:t>
+            </a:r>
+            <a:r>
+              <a:rPr lang="en-US" sz="1400" b="1" smtClean="0">
+                <a:solidFill>
+                  <a:schemeClr val="accent2"/>
+                </a:solidFill>
+                <a:latin typeface="Courier New" pitchFamily="49" charset="0"/>
+                <a:cs typeface="Courier New" pitchFamily="49" charset="0"/>
+              </a:rPr>
+              <a:t>ret</a:t>
+            </a:r>
+            <a:endParaRPr lang="en-US" sz="1400" b="1" dirty="0">
+              <a:solidFill>
+                <a:schemeClr val="accent2"/>
+              </a:solidFill>
+              <a:latin typeface="Courier New" pitchFamily="49" charset="0"/>
+              <a:cs typeface="Courier New" pitchFamily="49" charset="0"/>
+            </a:endParaRPr>
+          </a:p>
+          <a:p>
+            <a:pPr marL="0" indent="0">
+              <a:buNone/>
+            </a:pPr>
+            <a:r>
+              <a:rPr lang="en-US" sz="1400" b="1" dirty="0">
+                <a:solidFill>
+                  <a:srgbClr val="00B050"/>
+                </a:solidFill>
+                <a:latin typeface="Courier New" pitchFamily="49" charset="0"/>
+                <a:cs typeface="Courier New" pitchFamily="49" charset="0"/>
+              </a:rPr>
+              <a:t>; End Software delay ---------------------------</a:t>
+            </a:r>
+            <a:endParaRPr lang="en-US" sz="1400" b="1" dirty="0" smtClean="0">
+              <a:solidFill>
+                <a:srgbClr val="00B050"/>
               </a:solidFill>
               <a:latin typeface="Courier New" pitchFamily="49" charset="0"/>
               <a:cs typeface="Courier New" pitchFamily="49" charset="0"/>
@@ -14008,7 +14663,7 @@
           <a:p>
             <a:r>
               <a:rPr lang="en-US" b="1" dirty="0" smtClean="0"/>
-              <a:t>Pitfall !!!</a:t>
+              <a:t>Multiplexing</a:t>
             </a:r>
             <a:endParaRPr lang="en-US" dirty="0"/>
           </a:p>
@@ -14034,6 +14689,30 @@
           <a:bodyPr/>
           <a:lstStyle/>
           <a:p>
+            <a:r>
+              <a:rPr lang="en-US" sz="2000" dirty="0" smtClean="0">
+                <a:solidFill>
+                  <a:schemeClr val="accent2"/>
+                </a:solidFill>
+              </a:rPr>
+              <a:t>Only 20 Pins !!! But want access to many more signals</a:t>
+            </a:r>
+          </a:p>
+          <a:p>
+            <a:pPr lvl="1"/>
+            <a:r>
+              <a:rPr lang="en-US" sz="1600" dirty="0" smtClean="0"/>
+              <a:t>Therefore, each pin shares several signals </a:t>
+            </a:r>
+            <a:r>
+              <a:rPr lang="en-US" sz="1600" dirty="0" smtClean="0">
+                <a:sym typeface="Wingdings" pitchFamily="2" charset="2"/>
+              </a:rPr>
+              <a:t> multiplexing</a:t>
+            </a:r>
+            <a:endParaRPr lang="en-US" sz="1600" dirty="0" smtClean="0"/>
+          </a:p>
+          <a:p>
             <a:endParaRPr lang="en-US" sz="2000" dirty="0" smtClean="0">
               <a:solidFill>
                 <a:schemeClr val="accent2"/>
@@ -14041,6 +14720,13 @@
             </a:endParaRPr>
           </a:p>
           <a:p>
+            <a:endParaRPr lang="en-US" sz="2000" dirty="0">
+              <a:solidFill>
+                <a:schemeClr val="accent2"/>
+              </a:solidFill>
+            </a:endParaRPr>
+          </a:p>
+          <a:p>
             <a:endParaRPr lang="en-US" sz="2000" dirty="0" smtClean="0">
               <a:solidFill>
                 <a:schemeClr val="accent2"/>
@@ -14048,14 +14734,11 @@
             </a:endParaRPr>
           </a:p>
           <a:p>
-            <a:r>
-              <a:rPr lang="en-US" sz="2000" dirty="0" smtClean="0">
-                <a:solidFill>
-                  <a:schemeClr val="accent2"/>
-                </a:solidFill>
-              </a:rPr>
-              <a:t>Anything wrong with this?</a:t>
-            </a:r>
+            <a:endParaRPr lang="en-US" sz="2000" dirty="0">
+              <a:solidFill>
+                <a:schemeClr val="accent2"/>
+              </a:solidFill>
+            </a:endParaRPr>
           </a:p>
           <a:p>
             <a:endParaRPr lang="en-US" sz="2000" dirty="0" smtClean="0">
@@ -14065,24 +14748,6 @@
             </a:endParaRPr>
           </a:p>
           <a:p>
-            <a:pPr lvl="1"/>
-            <a:r>
-              <a:rPr lang="en-US" sz="1600" dirty="0" err="1" smtClean="0">
-                <a:latin typeface="Courier New" pitchFamily="49" charset="0"/>
-                <a:cs typeface="Courier New" pitchFamily="49" charset="0"/>
-              </a:rPr>
-              <a:t>mov.b</a:t>
-            </a:r>
-            <a:r>
-              <a:rPr lang="en-US" sz="1600" dirty="0" smtClean="0">
-                <a:latin typeface="Courier New" pitchFamily="49" charset="0"/>
-                <a:cs typeface="Courier New" pitchFamily="49" charset="0"/>
-              </a:rPr>
-              <a:t>  #0xff, P1DIR</a:t>
-            </a:r>
-            <a:endParaRPr lang="en-US" sz="1600" dirty="0"/>
-          </a:p>
-          <a:p>
             <a:endParaRPr lang="en-US" sz="2000" dirty="0" smtClean="0">
               <a:solidFill>
                 <a:schemeClr val="accent2"/>
@@ -14090,14 +14755,6 @@
             </a:endParaRPr>
           </a:p>
           <a:p>
-            <a:r>
-              <a:rPr lang="en-US" sz="2000" dirty="0" smtClean="0">
-                <a:solidFill>
-                  <a:schemeClr val="accent2"/>
-                </a:solidFill>
-              </a:rPr>
-              <a:t>What do these commands do?</a:t>
-            </a:r>
             <a:endParaRPr lang="en-US" sz="2000" dirty="0">
               <a:solidFill>
                 <a:schemeClr val="accent2"/>
@@ -14105,157 +14762,134 @@
             </a:endParaRPr>
           </a:p>
           <a:p>
+            <a:r>
+              <a:rPr lang="en-US" sz="2000" dirty="0" smtClean="0">
+                <a:solidFill>
+                  <a:schemeClr val="accent2"/>
+                </a:solidFill>
+              </a:rPr>
+              <a:t>Use PxSEL1 and PxSEL2 to select signal for each pin</a:t>
+            </a:r>
+          </a:p>
+          <a:p>
             <a:pPr lvl="1"/>
             <a:r>
-              <a:rPr lang="en-US" sz="1600" dirty="0" err="1" smtClean="0">
-                <a:latin typeface="Courier New" pitchFamily="49" charset="0"/>
-                <a:cs typeface="Courier New" pitchFamily="49" charset="0"/>
-              </a:rPr>
-              <a:t>mov.b</a:t>
-            </a:r>
-            <a:r>
-              <a:rPr lang="en-US" sz="1600" dirty="0" smtClean="0">
-                <a:latin typeface="Courier New" pitchFamily="49" charset="0"/>
-                <a:cs typeface="Courier New" pitchFamily="49" charset="0"/>
-              </a:rPr>
-              <a:t>  </a:t>
-            </a:r>
-            <a:r>
-              <a:rPr lang="en-US" sz="1600" dirty="0">
-                <a:latin typeface="Courier New" pitchFamily="49" charset="0"/>
-                <a:cs typeface="Courier New" pitchFamily="49" charset="0"/>
-              </a:rPr>
-              <a:t>#</a:t>
-            </a:r>
-            <a:r>
-              <a:rPr lang="en-US" sz="1600" dirty="0" smtClean="0">
-                <a:latin typeface="Courier New" pitchFamily="49" charset="0"/>
-                <a:cs typeface="Courier New" pitchFamily="49" charset="0"/>
-              </a:rPr>
-              <a:t>0b00001111, &amp;P1DIR</a:t>
-            </a:r>
-          </a:p>
-          <a:p>
-            <a:pPr lvl="1"/>
-            <a:r>
-              <a:rPr lang="en-US" sz="1600" dirty="0" err="1" smtClean="0">
-                <a:latin typeface="Courier New" pitchFamily="49" charset="0"/>
-                <a:cs typeface="Courier New" pitchFamily="49" charset="0"/>
-              </a:rPr>
-              <a:t>bis.b</a:t>
-            </a:r>
-            <a:r>
-              <a:rPr lang="en-US" sz="1600" dirty="0" smtClean="0">
-                <a:latin typeface="Courier New" pitchFamily="49" charset="0"/>
-                <a:cs typeface="Courier New" pitchFamily="49" charset="0"/>
-              </a:rPr>
-              <a:t>  </a:t>
-            </a:r>
-            <a:r>
-              <a:rPr lang="en-US" sz="1600" dirty="0">
-                <a:latin typeface="Courier New" pitchFamily="49" charset="0"/>
-                <a:cs typeface="Courier New" pitchFamily="49" charset="0"/>
-              </a:rPr>
-              <a:t>#0b00001111, &amp;</a:t>
-            </a:r>
-            <a:r>
-              <a:rPr lang="en-US" sz="1600" dirty="0" smtClean="0">
-                <a:latin typeface="Courier New" pitchFamily="49" charset="0"/>
-                <a:cs typeface="Courier New" pitchFamily="49" charset="0"/>
-              </a:rPr>
-              <a:t>P1OUT</a:t>
-            </a:r>
-          </a:p>
-          <a:p>
-            <a:pPr lvl="1"/>
-            <a:r>
-              <a:rPr lang="en-US" sz="1600" dirty="0" err="1" smtClean="0">
-                <a:latin typeface="Courier New" pitchFamily="49" charset="0"/>
-                <a:cs typeface="Courier New" pitchFamily="49" charset="0"/>
-              </a:rPr>
-              <a:t>mov.b</a:t>
-            </a:r>
-            <a:r>
-              <a:rPr lang="en-US" sz="1600" dirty="0" smtClean="0">
-                <a:latin typeface="Courier New" pitchFamily="49" charset="0"/>
-                <a:cs typeface="Courier New" pitchFamily="49" charset="0"/>
-              </a:rPr>
-              <a:t>  #0xff, </a:t>
-            </a:r>
-            <a:r>
-              <a:rPr lang="en-US" sz="1600" dirty="0">
-                <a:latin typeface="Courier New" pitchFamily="49" charset="0"/>
-                <a:cs typeface="Courier New" pitchFamily="49" charset="0"/>
-              </a:rPr>
-              <a:t>&amp;</a:t>
-            </a:r>
-            <a:r>
-              <a:rPr lang="en-US" sz="1600" dirty="0" smtClean="0">
-                <a:latin typeface="Courier New" pitchFamily="49" charset="0"/>
-                <a:cs typeface="Courier New" pitchFamily="49" charset="0"/>
-              </a:rPr>
-              <a:t>P1OUT</a:t>
-            </a:r>
-          </a:p>
-          <a:p>
-            <a:pPr lvl="1"/>
-            <a:r>
-              <a:rPr lang="en-US" sz="1600" dirty="0" err="1" smtClean="0">
-                <a:latin typeface="Courier New" pitchFamily="49" charset="0"/>
-                <a:cs typeface="Courier New" pitchFamily="49" charset="0"/>
-              </a:rPr>
-              <a:t>mov.b</a:t>
-            </a:r>
-            <a:r>
-              <a:rPr lang="en-US" sz="1600" dirty="0" smtClean="0">
-                <a:latin typeface="Courier New" pitchFamily="49" charset="0"/>
-                <a:cs typeface="Courier New" pitchFamily="49" charset="0"/>
-              </a:rPr>
-              <a:t>  &amp;P1IN, r5 </a:t>
-            </a:r>
-            <a:endParaRPr lang="en-US" sz="1600" dirty="0">
-              <a:latin typeface="Courier New" pitchFamily="49" charset="0"/>
-              <a:cs typeface="Courier New" pitchFamily="49" charset="0"/>
-            </a:endParaRPr>
-          </a:p>
-          <a:p>
-            <a:pPr lvl="1"/>
+              <a:rPr lang="en-US" sz="2000" dirty="0"/>
+              <a:t>The details are in the </a:t>
+            </a:r>
+            <a:r>
+              <a:rPr lang="en-US" sz="2000" dirty="0">
+                <a:hlinkClick r:id="rId2"/>
+              </a:rPr>
+              <a:t>MSP430G2x53 2x13 Mixed Signal MCU Datasheet</a:t>
+            </a:r>
+            <a:r>
+              <a:rPr lang="en-US" sz="2000" dirty="0"/>
+              <a:t>.</a:t>
+            </a:r>
             <a:endParaRPr lang="en-US" sz="1600" dirty="0"/>
           </a:p>
-          <a:p>
-            <a:endParaRPr lang="en-US" sz="2000" dirty="0">
-              <a:solidFill>
-                <a:schemeClr val="accent2"/>
-              </a:solidFill>
-            </a:endParaRPr>
-          </a:p>
-          <a:p>
-            <a:pPr lvl="1"/>
-            <a:endParaRPr lang="en-US" sz="2000" dirty="0" smtClean="0"/>
-          </a:p>
-          <a:p>
-            <a:endParaRPr lang="en-US" sz="2000" dirty="0">
-              <a:solidFill>
-                <a:schemeClr val="accent2"/>
-              </a:solidFill>
-            </a:endParaRPr>
-          </a:p>
-          <a:p>
-            <a:endParaRPr lang="en-US" sz="2000" dirty="0" smtClean="0">
-              <a:solidFill>
-                <a:schemeClr val="accent2"/>
-              </a:solidFill>
-            </a:endParaRPr>
-          </a:p>
-          <a:p>
-            <a:endParaRPr lang="en-US" sz="2000" dirty="0"/>
+        </p:txBody>
+      </p:sp>
+      <p:pic>
+        <p:nvPicPr>
+          <p:cNvPr id="4" name="Picture 2" descr="MSP430G2553 Pinout"/>
+          <p:cNvPicPr>
+            <a:picLocks noChangeAspect="1" noChangeArrowheads="1"/>
+          </p:cNvPicPr>
+          <p:nvPr/>
+        </p:nvPicPr>
+        <p:blipFill>
+          <a:blip r:embed="rId3">
+            <a:extLst>
+              <a:ext uri="{28A0092B-C50C-407E-A947-70E740481C1C}">
+                <a14:useLocalDpi xmlns:a14="http://schemas.microsoft.com/office/drawing/2010/main" val="0"/>
+              </a:ext>
+            </a:extLst>
+          </a:blip>
+          <a:srcRect/>
+          <a:stretch>
+            <a:fillRect/>
+          </a:stretch>
+        </p:blipFill>
+        <p:spPr bwMode="auto">
+          <a:xfrm>
+            <a:off x="1121224" y="1334418"/>
+            <a:ext cx="6543675" cy="2381250"/>
+          </a:xfrm>
+          <a:prstGeom prst="rect">
+            <a:avLst/>
+          </a:prstGeom>
+          <a:noFill/>
+          <a:extLst>
+            <a:ext uri="{909E8E84-426E-40DD-AFC4-6F175D3DCCD1}">
+              <a14:hiddenFill xmlns:a14="http://schemas.microsoft.com/office/drawing/2010/main">
+                <a:solidFill>
+                  <a:srgbClr val="FFFFFF"/>
+                </a:solidFill>
+              </a14:hiddenFill>
+            </a:ext>
+          </a:extLst>
+        </p:spPr>
+      </p:pic>
+      <p:sp>
+        <p:nvSpPr>
+          <p:cNvPr id="5" name="TextBox 4"/>
+          <p:cNvSpPr txBox="1"/>
+          <p:nvPr/>
+        </p:nvSpPr>
+        <p:spPr>
+          <a:xfrm>
+            <a:off x="1350934" y="4855336"/>
+            <a:ext cx="6892313" cy="1569660"/>
+          </a:xfrm>
+          <a:prstGeom prst="rect">
+            <a:avLst/>
+          </a:prstGeom>
+          <a:noFill/>
+        </p:spPr>
+        <p:txBody>
+          <a:bodyPr wrap="square" rtlCol="0">
+            <a:spAutoFit/>
+          </a:bodyPr>
+          <a:lstStyle/>
+          <a:p>
+            <a:r>
+              <a:rPr lang="en-US" dirty="0" smtClean="0"/>
+              <a:t>Reference:</a:t>
+            </a:r>
+          </a:p>
+          <a:p>
+            <a:r>
+              <a:rPr lang="en-US" dirty="0" smtClean="0"/>
+              <a:t>Page 43 of Device </a:t>
+            </a:r>
+            <a:r>
+              <a:rPr lang="en-US" dirty="0"/>
+              <a:t>Specific (BB pp </a:t>
+            </a:r>
+            <a:r>
+              <a:rPr lang="en-US" dirty="0" smtClean="0"/>
+              <a:t>124)</a:t>
+            </a:r>
+          </a:p>
+          <a:p>
+            <a:r>
+              <a:rPr lang="en-US" dirty="0" err="1" smtClean="0"/>
+              <a:t>And/Or</a:t>
+            </a:r>
+            <a:r>
+              <a:rPr lang="en-US" dirty="0" smtClean="0"/>
+              <a:t> Page 333 of Family User Guide (BB pp 41)</a:t>
+            </a:r>
+            <a:endParaRPr lang="en-US" dirty="0"/>
           </a:p>
         </p:txBody>
       </p:sp>
     </p:spTree>
     <p:extLst>
       <p:ext uri="{BB962C8B-B14F-4D97-AF65-F5344CB8AC3E}">
-        <p14:creationId xmlns:p14="http://schemas.microsoft.com/office/powerpoint/2010/main" val="45763967"/>
+        <p14:creationId xmlns:p14="http://schemas.microsoft.com/office/powerpoint/2010/main" val="3207840792"/>
       </p:ext>
     </p:extLst>
   </p:cSld>
@@ -14265,9 +14899,80 @@
   <p:timing>
     <p:tnLst>
       <p:par>
-        <p:cTn id="1" dur="indefinite" restart="never" nodeType="tmRoot"/>
+        <p:cTn id="1" dur="indefinite" restart="never" nodeType="tmRoot">
+          <p:childTnLst>
+            <p:seq concurrent="1" nextAc="seek">
+              <p:cTn id="2" dur="indefinite" nodeType="mainSeq">
+                <p:childTnLst>
+                  <p:par>
+                    <p:cTn id="3" fill="hold">
+                      <p:stCondLst>
+                        <p:cond delay="indefinite"/>
+                      </p:stCondLst>
+                      <p:childTnLst>
+                        <p:par>
+                          <p:cTn id="4" fill="hold">
+                            <p:stCondLst>
+                              <p:cond delay="0"/>
+                            </p:stCondLst>
+                            <p:childTnLst>
+                              <p:par>
+                                <p:cTn id="5" presetID="1" presetClass="entr" presetSubtype="0" fill="hold" grpId="0" nodeType="clickEffect">
+                                  <p:stCondLst>
+                                    <p:cond delay="0"/>
+                                  </p:stCondLst>
+                                  <p:childTnLst>
+                                    <p:set>
+                                      <p:cBhvr>
+                                        <p:cTn id="6" dur="1" fill="hold">
+                                          <p:stCondLst>
+                                            <p:cond delay="0"/>
+                                          </p:stCondLst>
+                                        </p:cTn>
+                                        <p:tgtEl>
+                                          <p:spTgt spid="5"/>
+                                        </p:tgtEl>
+                                        <p:attrNameLst>
+                                          <p:attrName>style.visibility</p:attrName>
+                                        </p:attrNameLst>
+                                      </p:cBhvr>
+                                      <p:to>
+                                        <p:strVal val="visible"/>
+                                      </p:to>
+                                    </p:set>
+                                  </p:childTnLst>
+                                </p:cTn>
+                              </p:par>
+                            </p:childTnLst>
+                          </p:cTn>
+                        </p:par>
+                      </p:childTnLst>
+                    </p:cTn>
+                  </p:par>
+                </p:childTnLst>
+              </p:cTn>
+              <p:prevCondLst>
+                <p:cond evt="onPrev" delay="0">
+                  <p:tgtEl>
+                    <p:sldTgt/>
+                  </p:tgtEl>
+                </p:cond>
+              </p:prevCondLst>
+              <p:nextCondLst>
+                <p:cond evt="onNext" delay="0">
+                  <p:tgtEl>
+                    <p:sldTgt/>
+                  </p:tgtEl>
+                </p:cond>
+              </p:nextCondLst>
+            </p:seq>
+          </p:childTnLst>
+        </p:cTn>
       </p:par>
     </p:tnLst>
+    <p:bldLst>
+      <p:bldP spid="5" grpId="0"/>
+    </p:bldLst>
   </p:timing>
 </p:sld>
 </file>
@@ -14306,7 +15011,7 @@
           <a:p>
             <a:r>
               <a:rPr lang="en-US" b="1" dirty="0" smtClean="0"/>
-              <a:t>Multiplexing</a:t>
+              <a:t>Pitfall !!!</a:t>
             </a:r>
             <a:endParaRPr lang="en-US" dirty="0"/>
           </a:p>
@@ -14332,30 +15037,6 @@
           <a:bodyPr/>
           <a:lstStyle/>
           <a:p>
-            <a:r>
-              <a:rPr lang="en-US" sz="2000" dirty="0" smtClean="0">
-                <a:solidFill>
-                  <a:schemeClr val="accent2"/>
-                </a:solidFill>
-              </a:rPr>
-              <a:t>Only 20 Pins !!! But want access to many more signals</a:t>
-            </a:r>
-          </a:p>
-          <a:p>
-            <a:pPr lvl="1"/>
-            <a:r>
-              <a:rPr lang="en-US" sz="1600" dirty="0" smtClean="0"/>
-              <a:t>Therefore, each pin shares several signals </a:t>
-            </a:r>
-            <a:r>
-              <a:rPr lang="en-US" sz="1600" dirty="0" smtClean="0">
-                <a:sym typeface="Wingdings" pitchFamily="2" charset="2"/>
-              </a:rPr>
-              <a:t> multiplexing</a:t>
-            </a:r>
-            <a:endParaRPr lang="en-US" sz="1600" dirty="0" smtClean="0"/>
-          </a:p>
-          <a:p>
             <a:endParaRPr lang="en-US" sz="2000" dirty="0" smtClean="0">
               <a:solidFill>
                 <a:schemeClr val="accent2"/>
@@ -14391,6 +15072,13 @@
             </a:endParaRPr>
           </a:p>
           <a:p>
+            <a:endParaRPr lang="en-US" sz="2000" dirty="0">
+              <a:solidFill>
+                <a:schemeClr val="accent2"/>
+              </a:solidFill>
+            </a:endParaRPr>
+          </a:p>
+          <a:p>
             <a:endParaRPr lang="en-US" sz="2000" dirty="0" smtClean="0">
               <a:solidFill>
                 <a:schemeClr val="accent2"/>
@@ -14398,6 +15086,27 @@
             </a:endParaRPr>
           </a:p>
           <a:p>
+            <a:endParaRPr lang="en-US" sz="2000" dirty="0" smtClean="0">
+              <a:solidFill>
+                <a:schemeClr val="accent2"/>
+              </a:solidFill>
+            </a:endParaRPr>
+          </a:p>
+          <a:p>
+            <a:endParaRPr lang="en-US" sz="2000" dirty="0" smtClean="0">
+              <a:solidFill>
+                <a:schemeClr val="accent2"/>
+              </a:solidFill>
+            </a:endParaRPr>
+          </a:p>
+          <a:p>
+            <a:endParaRPr lang="en-US" sz="2000" dirty="0" smtClean="0">
+              <a:solidFill>
+                <a:schemeClr val="accent2"/>
+              </a:solidFill>
+            </a:endParaRPr>
+          </a:p>
+          <a:p>
             <a:endParaRPr lang="en-US" sz="2000" dirty="0">
               <a:solidFill>
                 <a:schemeClr val="accent2"/>
@@ -14405,45 +15114,138 @@
             </a:endParaRPr>
           </a:p>
           <a:p>
-            <a:r>
-              <a:rPr lang="en-US" sz="2000" dirty="0" smtClean="0">
-                <a:solidFill>
-                  <a:schemeClr val="accent2"/>
-                </a:solidFill>
-              </a:rPr>
-              <a:t>Use PxSEL1 and PxSEL2 to select signal for each pin</a:t>
+            <a:endParaRPr lang="en-US" sz="2000" dirty="0" smtClean="0">
+              <a:solidFill>
+                <a:schemeClr val="accent2"/>
+              </a:solidFill>
+            </a:endParaRPr>
+          </a:p>
+          <a:p>
+            <a:pPr marL="0" indent="0">
+              <a:buNone/>
+            </a:pPr>
+            <a:r>
+              <a:rPr lang="en-US" sz="1800" dirty="0" smtClean="0"/>
+              <a:t>Let's </a:t>
+            </a:r>
+            <a:r>
+              <a:rPr lang="en-US" sz="1800" dirty="0"/>
+              <a:t>say I wanted to make the UCA0SOMI function available on </a:t>
+            </a:r>
+            <a:r>
+              <a:rPr lang="en-US" sz="1800" dirty="0" smtClean="0"/>
+              <a:t>P1.1:</a:t>
             </a:r>
           </a:p>
           <a:p>
             <a:pPr lvl="1"/>
             <a:r>
-              <a:rPr lang="en-US" sz="2000" dirty="0"/>
-              <a:t>The details are in the </a:t>
-            </a:r>
-            <a:r>
-              <a:rPr lang="en-US" sz="2000" dirty="0">
-                <a:hlinkClick r:id="rId2"/>
-              </a:rPr>
-              <a:t>MSP430G2x53 2x13 Mixed Signal MCU Datasheet</a:t>
-            </a:r>
-            <a:r>
-              <a:rPr lang="en-US" sz="2000" dirty="0"/>
-              <a:t>.</a:t>
+              <a:rPr lang="en-US" sz="1200" dirty="0">
+                <a:solidFill>
+                  <a:srgbClr val="00B050"/>
+                </a:solidFill>
+                <a:latin typeface="Courier New" pitchFamily="49" charset="0"/>
+                <a:cs typeface="Courier New" pitchFamily="49" charset="0"/>
+              </a:rPr>
+              <a:t>; 'from USCI' means this bit is set automatically by the USCI when enabled</a:t>
+            </a:r>
+          </a:p>
+          <a:p>
+            <a:pPr lvl="1"/>
+            <a:r>
+              <a:rPr lang="en-US" sz="1200" dirty="0">
+                <a:latin typeface="Courier New" pitchFamily="49" charset="0"/>
+                <a:cs typeface="Courier New" pitchFamily="49" charset="0"/>
+              </a:rPr>
+              <a:t>    </a:t>
+            </a:r>
+            <a:r>
+              <a:rPr lang="en-US" sz="1200" dirty="0" err="1">
+                <a:latin typeface="Courier New" pitchFamily="49" charset="0"/>
+                <a:cs typeface="Courier New" pitchFamily="49" charset="0"/>
+              </a:rPr>
+              <a:t>bis.b</a:t>
+            </a:r>
+            <a:r>
+              <a:rPr lang="en-US" sz="1200" dirty="0">
+                <a:latin typeface="Courier New" pitchFamily="49" charset="0"/>
+                <a:cs typeface="Courier New" pitchFamily="49" charset="0"/>
+              </a:rPr>
+              <a:t>   #BIT1, P1SEL   </a:t>
+            </a:r>
+          </a:p>
+          <a:p>
+            <a:pPr lvl="1"/>
+            <a:r>
+              <a:rPr lang="en-US" sz="1200" dirty="0">
+                <a:latin typeface="Courier New" pitchFamily="49" charset="0"/>
+                <a:cs typeface="Courier New" pitchFamily="49" charset="0"/>
+              </a:rPr>
+              <a:t>    </a:t>
+            </a:r>
+            <a:r>
+              <a:rPr lang="en-US" sz="1200" dirty="0" err="1">
+                <a:latin typeface="Courier New" pitchFamily="49" charset="0"/>
+                <a:cs typeface="Courier New" pitchFamily="49" charset="0"/>
+              </a:rPr>
+              <a:t>bis.b</a:t>
+            </a:r>
+            <a:r>
+              <a:rPr lang="en-US" sz="1200" dirty="0">
+                <a:latin typeface="Courier New" pitchFamily="49" charset="0"/>
+                <a:cs typeface="Courier New" pitchFamily="49" charset="0"/>
+              </a:rPr>
+              <a:t>   #BIT1, </a:t>
+            </a:r>
+            <a:r>
+              <a:rPr lang="en-US" sz="1200" dirty="0" smtClean="0">
+                <a:latin typeface="Courier New" pitchFamily="49" charset="0"/>
+                <a:cs typeface="Courier New" pitchFamily="49" charset="0"/>
+              </a:rPr>
+              <a:t>P1SEL2</a:t>
             </a:r>
             <a:endParaRPr lang="en-US" sz="1600" dirty="0"/>
+          </a:p>
+          <a:p>
+            <a:endParaRPr lang="en-US" sz="2000" dirty="0">
+              <a:solidFill>
+                <a:schemeClr val="accent2"/>
+              </a:solidFill>
+            </a:endParaRPr>
+          </a:p>
+          <a:p>
+            <a:pPr lvl="1"/>
+            <a:endParaRPr lang="en-US" sz="2000" dirty="0" smtClean="0"/>
+          </a:p>
+          <a:p>
+            <a:endParaRPr lang="en-US" sz="2000" dirty="0">
+              <a:solidFill>
+                <a:schemeClr val="accent2"/>
+              </a:solidFill>
+            </a:endParaRPr>
+          </a:p>
+          <a:p>
+            <a:endParaRPr lang="en-US" sz="2000" dirty="0" smtClean="0">
+              <a:solidFill>
+                <a:schemeClr val="accent2"/>
+              </a:solidFill>
+            </a:endParaRPr>
+          </a:p>
+          <a:p>
+            <a:endParaRPr lang="en-US" sz="2000" dirty="0"/>
           </a:p>
         </p:txBody>
       </p:sp>
       <p:pic>
         <p:nvPicPr>
-          <p:cNvPr id="4" name="Picture 2" descr="MSP430G2553 Pinout"/>
+          <p:cNvPr id="3074" name="Picture 2" descr="P1.0-2 Multiplexing Control Bits / Signals"/>
           <p:cNvPicPr>
             <a:picLocks noChangeAspect="1" noChangeArrowheads="1"/>
           </p:cNvPicPr>
           <p:nvPr/>
         </p:nvPicPr>
         <p:blipFill>
-          <a:blip r:embed="rId3">
+          <a:blip r:embed="rId2">
             <a:extLst>
               <a:ext uri="{28A0092B-C50C-407E-A947-70E740481C1C}">
                 <a14:useLocalDpi xmlns:a14="http://schemas.microsoft.com/office/drawing/2010/main" val="0"/>
@@ -14457,8 +15259,8 @@
         </p:blipFill>
         <p:spPr bwMode="auto">
           <a:xfrm>
-            <a:off x="1121224" y="1334418"/>
-            <a:ext cx="6543675" cy="2381250"/>
+            <a:off x="1183264" y="119695"/>
+            <a:ext cx="6753225" cy="4848225"/>
           </a:xfrm>
           <a:prstGeom prst="rect">
             <a:avLst/>
@@ -14483,8 +15285,8 @@
         </p:nvSpPr>
         <p:spPr>
           <a:xfrm>
-            <a:off x="1350934" y="4855336"/>
-            <a:ext cx="6892313" cy="1569660"/>
+            <a:off x="3168201" y="4646934"/>
+            <a:ext cx="5061399" cy="461665"/>
           </a:xfrm>
           <a:prstGeom prst="rect">
             <a:avLst/>
@@ -14499,40 +15301,15 @@
           <a:p>
             <a:r>
               <a:rPr lang="en-US" dirty="0" smtClean="0"/>
-              <a:t>Reference:</a:t>
-            </a:r>
-          </a:p>
-          <a:p>
-            <a:r>
-              <a:rPr lang="en-US" dirty="0" smtClean="0"/>
-              <a:t>Page 43 of Device </a:t>
-            </a:r>
-            <a:r>
-              <a:rPr lang="en-US" dirty="0"/>
-              <a:t>Specific (BB pp </a:t>
-            </a:r>
-            <a:r>
-              <a:rPr lang="en-US" dirty="0" smtClean="0"/>
-              <a:t>124)</a:t>
-            </a:r>
-          </a:p>
-          <a:p>
-            <a:r>
-              <a:rPr lang="en-US" dirty="0" err="1" smtClean="0"/>
-              <a:t>And/Or</a:t>
-            </a:r>
-            <a:r>
-              <a:rPr lang="en-US" dirty="0" smtClean="0"/>
-              <a:t> Page 333 of Family User Guide (BB pp 41)</a:t>
-            </a:r>
-            <a:endParaRPr lang="en-US" dirty="0"/>
+              <a:t>Reference:  Page 43 of Device Specific</a:t>
+            </a:r>
           </a:p>
         </p:txBody>
       </p:sp>
     </p:spTree>
     <p:extLst>
       <p:ext uri="{BB962C8B-B14F-4D97-AF65-F5344CB8AC3E}">
-        <p14:creationId xmlns:p14="http://schemas.microsoft.com/office/powerpoint/2010/main" val="3207840792"/>
+        <p14:creationId xmlns:p14="http://schemas.microsoft.com/office/powerpoint/2010/main" val="307478788"/>
       </p:ext>
     </p:extLst>
   </p:cSld>
@@ -14687,6 +15464,63 @@
             </a:endParaRPr>
           </a:p>
           <a:p>
+            <a:endParaRPr lang="en-US" sz="2000" dirty="0" smtClean="0">
+              <a:solidFill>
+                <a:schemeClr val="accent2"/>
+              </a:solidFill>
+            </a:endParaRPr>
+          </a:p>
+          <a:p>
+            <a:r>
+              <a:rPr lang="en-US" sz="2000" dirty="0" smtClean="0">
+                <a:solidFill>
+                  <a:schemeClr val="accent2"/>
+                </a:solidFill>
+              </a:rPr>
+              <a:t>Anything wrong with this?</a:t>
+            </a:r>
+          </a:p>
+          <a:p>
+            <a:endParaRPr lang="en-US" sz="2000" dirty="0" smtClean="0">
+              <a:solidFill>
+                <a:schemeClr val="accent2"/>
+              </a:solidFill>
+            </a:endParaRPr>
+          </a:p>
+          <a:p>
+            <a:pPr lvl="1"/>
+            <a:r>
+              <a:rPr lang="en-US" sz="1600" dirty="0" err="1" smtClean="0">
+                <a:latin typeface="Courier New" pitchFamily="49" charset="0"/>
+                <a:cs typeface="Courier New" pitchFamily="49" charset="0"/>
+              </a:rPr>
+              <a:t>mov.b</a:t>
+            </a:r>
+            <a:r>
+              <a:rPr lang="en-US" sz="1600" dirty="0" smtClean="0">
+                <a:latin typeface="Courier New" pitchFamily="49" charset="0"/>
+                <a:cs typeface="Courier New" pitchFamily="49" charset="0"/>
+              </a:rPr>
+              <a:t>  #0xff, P1DIR</a:t>
+            </a:r>
+            <a:endParaRPr lang="en-US" sz="1600" dirty="0"/>
+          </a:p>
+          <a:p>
+            <a:endParaRPr lang="en-US" sz="2000" dirty="0" smtClean="0">
+              <a:solidFill>
+                <a:schemeClr val="accent2"/>
+              </a:solidFill>
+            </a:endParaRPr>
+          </a:p>
+          <a:p>
+            <a:r>
+              <a:rPr lang="en-US" sz="2000" dirty="0" smtClean="0">
+                <a:solidFill>
+                  <a:schemeClr val="accent2"/>
+                </a:solidFill>
+              </a:rPr>
+              <a:t>What do these commands do?</a:t>
+            </a:r>
             <a:endParaRPr lang="en-US" sz="2000" dirty="0">
               <a:solidFill>
                 <a:schemeClr val="accent2"/>
@@ -14694,6 +15528,142 @@
             </a:endParaRPr>
           </a:p>
           <a:p>
+            <a:pPr lvl="1"/>
+            <a:r>
+              <a:rPr lang="en-US" sz="1600" dirty="0" err="1" smtClean="0">
+                <a:latin typeface="Courier New" pitchFamily="49" charset="0"/>
+                <a:cs typeface="Courier New" pitchFamily="49" charset="0"/>
+              </a:rPr>
+              <a:t>mov.b</a:t>
+            </a:r>
+            <a:r>
+              <a:rPr lang="en-US" sz="1600" dirty="0" smtClean="0">
+                <a:latin typeface="Courier New" pitchFamily="49" charset="0"/>
+                <a:cs typeface="Courier New" pitchFamily="49" charset="0"/>
+              </a:rPr>
+              <a:t>  </a:t>
+            </a:r>
+            <a:r>
+              <a:rPr lang="en-US" sz="1600" dirty="0">
+                <a:latin typeface="Courier New" pitchFamily="49" charset="0"/>
+                <a:cs typeface="Courier New" pitchFamily="49" charset="0"/>
+              </a:rPr>
+              <a:t>#</a:t>
+            </a:r>
+            <a:r>
+              <a:rPr lang="en-US" sz="1600" dirty="0" smtClean="0">
+                <a:latin typeface="Courier New" pitchFamily="49" charset="0"/>
+                <a:cs typeface="Courier New" pitchFamily="49" charset="0"/>
+              </a:rPr>
+              <a:t>0b00001111, &amp;P1DIR</a:t>
+            </a:r>
+          </a:p>
+          <a:p>
+            <a:pPr lvl="1"/>
+            <a:r>
+              <a:rPr lang="en-US" sz="1600" dirty="0" err="1" smtClean="0">
+                <a:latin typeface="Courier New" pitchFamily="49" charset="0"/>
+                <a:cs typeface="Courier New" pitchFamily="49" charset="0"/>
+              </a:rPr>
+              <a:t>bis.b</a:t>
+            </a:r>
+            <a:r>
+              <a:rPr lang="en-US" sz="1600" dirty="0" smtClean="0">
+                <a:latin typeface="Courier New" pitchFamily="49" charset="0"/>
+                <a:cs typeface="Courier New" pitchFamily="49" charset="0"/>
+              </a:rPr>
+              <a:t>  </a:t>
+            </a:r>
+            <a:r>
+              <a:rPr lang="en-US" sz="1600" dirty="0">
+                <a:latin typeface="Courier New" pitchFamily="49" charset="0"/>
+                <a:cs typeface="Courier New" pitchFamily="49" charset="0"/>
+              </a:rPr>
+              <a:t>#0b00001111, &amp;</a:t>
+            </a:r>
+            <a:r>
+              <a:rPr lang="en-US" sz="1600" dirty="0" smtClean="0">
+                <a:latin typeface="Courier New" pitchFamily="49" charset="0"/>
+                <a:cs typeface="Courier New" pitchFamily="49" charset="0"/>
+              </a:rPr>
+              <a:t>P1OUT</a:t>
+            </a:r>
+          </a:p>
+          <a:p>
+            <a:pPr lvl="1"/>
+            <a:r>
+              <a:rPr lang="en-US" sz="1600" dirty="0" err="1" smtClean="0">
+                <a:latin typeface="Courier New" pitchFamily="49" charset="0"/>
+                <a:cs typeface="Courier New" pitchFamily="49" charset="0"/>
+              </a:rPr>
+              <a:t>mov.b</a:t>
+            </a:r>
+            <a:r>
+              <a:rPr lang="en-US" sz="1600" dirty="0" smtClean="0">
+                <a:latin typeface="Courier New" pitchFamily="49" charset="0"/>
+                <a:cs typeface="Courier New" pitchFamily="49" charset="0"/>
+              </a:rPr>
+              <a:t>  #0xff, </a:t>
+            </a:r>
+            <a:r>
+              <a:rPr lang="en-US" sz="1600" dirty="0">
+                <a:latin typeface="Courier New" pitchFamily="49" charset="0"/>
+                <a:cs typeface="Courier New" pitchFamily="49" charset="0"/>
+              </a:rPr>
+              <a:t>&amp;</a:t>
+            </a:r>
+            <a:r>
+              <a:rPr lang="en-US" sz="1600" dirty="0" smtClean="0">
+                <a:latin typeface="Courier New" pitchFamily="49" charset="0"/>
+                <a:cs typeface="Courier New" pitchFamily="49" charset="0"/>
+              </a:rPr>
+              <a:t>P1OUT</a:t>
+            </a:r>
+          </a:p>
+          <a:p>
+            <a:pPr lvl="1"/>
+            <a:r>
+              <a:rPr lang="en-US" sz="1600" dirty="0" err="1" smtClean="0">
+                <a:latin typeface="Courier New" pitchFamily="49" charset="0"/>
+                <a:cs typeface="Courier New" pitchFamily="49" charset="0"/>
+              </a:rPr>
+              <a:t>mov.b</a:t>
+            </a:r>
+            <a:r>
+              <a:rPr lang="en-US" sz="1600" dirty="0" smtClean="0">
+                <a:latin typeface="Courier New" pitchFamily="49" charset="0"/>
+                <a:cs typeface="Courier New" pitchFamily="49" charset="0"/>
+              </a:rPr>
+              <a:t>  &amp;P1IN, r5 </a:t>
+            </a:r>
+            <a:endParaRPr lang="en-US" sz="1600" dirty="0">
+              <a:latin typeface="Courier New" pitchFamily="49" charset="0"/>
+              <a:cs typeface="Courier New" pitchFamily="49" charset="0"/>
+            </a:endParaRPr>
+          </a:p>
+          <a:p>
+            <a:pPr lvl="1"/>
+            <a:endParaRPr lang="en-US" sz="1600" dirty="0"/>
+          </a:p>
+          <a:p>
+            <a:endParaRPr lang="en-US" sz="2000" dirty="0">
+              <a:solidFill>
+                <a:schemeClr val="accent2"/>
+              </a:solidFill>
+            </a:endParaRPr>
+          </a:p>
+          <a:p>
+            <a:pPr lvl="1"/>
+            <a:endParaRPr lang="en-US" sz="2000" dirty="0" smtClean="0"/>
+          </a:p>
+          <a:p>
+            <a:endParaRPr lang="en-US" sz="2000" dirty="0">
+              <a:solidFill>
+                <a:schemeClr val="accent2"/>
+              </a:solidFill>
+            </a:endParaRPr>
+          </a:p>
+          <a:p>
             <a:endParaRPr lang="en-US" sz="2000" dirty="0" smtClean="0">
               <a:solidFill>
                 <a:schemeClr val="accent2"/>
@@ -14701,258 +15671,14 @@
             </a:endParaRPr>
           </a:p>
           <a:p>
-            <a:endParaRPr lang="en-US" sz="2000" dirty="0">
-              <a:solidFill>
-                <a:schemeClr val="accent2"/>
-              </a:solidFill>
-            </a:endParaRPr>
-          </a:p>
-          <a:p>
-            <a:endParaRPr lang="en-US" sz="2000" dirty="0" smtClean="0">
-              <a:solidFill>
-                <a:schemeClr val="accent2"/>
-              </a:solidFill>
-            </a:endParaRPr>
-          </a:p>
-          <a:p>
-            <a:endParaRPr lang="en-US" sz="2000" dirty="0">
-              <a:solidFill>
-                <a:schemeClr val="accent2"/>
-              </a:solidFill>
-            </a:endParaRPr>
-          </a:p>
-          <a:p>
-            <a:endParaRPr lang="en-US" sz="2000" dirty="0" smtClean="0">
-              <a:solidFill>
-                <a:schemeClr val="accent2"/>
-              </a:solidFill>
-            </a:endParaRPr>
-          </a:p>
-          <a:p>
-            <a:endParaRPr lang="en-US" sz="2000" dirty="0" smtClean="0">
-              <a:solidFill>
-                <a:schemeClr val="accent2"/>
-              </a:solidFill>
-            </a:endParaRPr>
-          </a:p>
-          <a:p>
-            <a:endParaRPr lang="en-US" sz="2000" dirty="0" smtClean="0">
-              <a:solidFill>
-                <a:schemeClr val="accent2"/>
-              </a:solidFill>
-            </a:endParaRPr>
-          </a:p>
-          <a:p>
-            <a:endParaRPr lang="en-US" sz="2000" dirty="0" smtClean="0">
-              <a:solidFill>
-                <a:schemeClr val="accent2"/>
-              </a:solidFill>
-            </a:endParaRPr>
-          </a:p>
-          <a:p>
-            <a:endParaRPr lang="en-US" sz="2000" dirty="0">
-              <a:solidFill>
-                <a:schemeClr val="accent2"/>
-              </a:solidFill>
-            </a:endParaRPr>
-          </a:p>
-          <a:p>
-            <a:endParaRPr lang="en-US" sz="2000" dirty="0" smtClean="0">
-              <a:solidFill>
-                <a:schemeClr val="accent2"/>
-              </a:solidFill>
-            </a:endParaRPr>
-          </a:p>
-          <a:p>
-            <a:pPr marL="0" indent="0">
-              <a:buNone/>
-            </a:pPr>
-            <a:r>
-              <a:rPr lang="en-US" sz="1800" dirty="0" smtClean="0"/>
-              <a:t>Let's </a:t>
-            </a:r>
-            <a:r>
-              <a:rPr lang="en-US" sz="1800" dirty="0"/>
-              <a:t>say I wanted to make the UCA0SOMI function available on </a:t>
-            </a:r>
-            <a:r>
-              <a:rPr lang="en-US" sz="1800" dirty="0" smtClean="0"/>
-              <a:t>P1.1:</a:t>
-            </a:r>
-          </a:p>
-          <a:p>
-            <a:pPr lvl="1"/>
-            <a:r>
-              <a:rPr lang="en-US" sz="1200" dirty="0">
-                <a:solidFill>
-                  <a:srgbClr val="00B050"/>
-                </a:solidFill>
-                <a:latin typeface="Courier New" pitchFamily="49" charset="0"/>
-                <a:cs typeface="Courier New" pitchFamily="49" charset="0"/>
-              </a:rPr>
-              <a:t>; 'from USCI' means this bit is set automatically by the USCI when enabled</a:t>
-            </a:r>
-          </a:p>
-          <a:p>
-            <a:pPr lvl="1"/>
-            <a:r>
-              <a:rPr lang="en-US" sz="1200" dirty="0">
-                <a:latin typeface="Courier New" pitchFamily="49" charset="0"/>
-                <a:cs typeface="Courier New" pitchFamily="49" charset="0"/>
-              </a:rPr>
-              <a:t>    </a:t>
-            </a:r>
-            <a:r>
-              <a:rPr lang="en-US" sz="1200" dirty="0" err="1">
-                <a:latin typeface="Courier New" pitchFamily="49" charset="0"/>
-                <a:cs typeface="Courier New" pitchFamily="49" charset="0"/>
-              </a:rPr>
-              <a:t>bis.b</a:t>
-            </a:r>
-            <a:r>
-              <a:rPr lang="en-US" sz="1200" dirty="0">
-                <a:latin typeface="Courier New" pitchFamily="49" charset="0"/>
-                <a:cs typeface="Courier New" pitchFamily="49" charset="0"/>
-              </a:rPr>
-              <a:t>   #BIT1, P1SEL   </a:t>
-            </a:r>
-          </a:p>
-          <a:p>
-            <a:pPr lvl="1"/>
-            <a:r>
-              <a:rPr lang="en-US" sz="1200" dirty="0">
-                <a:latin typeface="Courier New" pitchFamily="49" charset="0"/>
-                <a:cs typeface="Courier New" pitchFamily="49" charset="0"/>
-              </a:rPr>
-              <a:t>    </a:t>
-            </a:r>
-            <a:r>
-              <a:rPr lang="en-US" sz="1200" dirty="0" err="1">
-                <a:latin typeface="Courier New" pitchFamily="49" charset="0"/>
-                <a:cs typeface="Courier New" pitchFamily="49" charset="0"/>
-              </a:rPr>
-              <a:t>bis.b</a:t>
-            </a:r>
-            <a:r>
-              <a:rPr lang="en-US" sz="1200" dirty="0">
-                <a:latin typeface="Courier New" pitchFamily="49" charset="0"/>
-                <a:cs typeface="Courier New" pitchFamily="49" charset="0"/>
-              </a:rPr>
-              <a:t>   #BIT1, </a:t>
-            </a:r>
-            <a:r>
-              <a:rPr lang="en-US" sz="1200" dirty="0" smtClean="0">
-                <a:latin typeface="Courier New" pitchFamily="49" charset="0"/>
-                <a:cs typeface="Courier New" pitchFamily="49" charset="0"/>
-              </a:rPr>
-              <a:t>P1SEL2</a:t>
-            </a:r>
-            <a:endParaRPr lang="en-US" sz="1600" dirty="0"/>
-          </a:p>
-          <a:p>
-            <a:endParaRPr lang="en-US" sz="2000" dirty="0">
-              <a:solidFill>
-                <a:schemeClr val="accent2"/>
-              </a:solidFill>
-            </a:endParaRPr>
-          </a:p>
-          <a:p>
-            <a:pPr lvl="1"/>
-            <a:endParaRPr lang="en-US" sz="2000" dirty="0" smtClean="0"/>
-          </a:p>
-          <a:p>
-            <a:endParaRPr lang="en-US" sz="2000" dirty="0">
-              <a:solidFill>
-                <a:schemeClr val="accent2"/>
-              </a:solidFill>
-            </a:endParaRPr>
-          </a:p>
-          <a:p>
-            <a:endParaRPr lang="en-US" sz="2000" dirty="0" smtClean="0">
-              <a:solidFill>
-                <a:schemeClr val="accent2"/>
-              </a:solidFill>
-            </a:endParaRPr>
-          </a:p>
-          <a:p>
             <a:endParaRPr lang="en-US" sz="2000" dirty="0"/>
-          </a:p>
-        </p:txBody>
-      </p:sp>
-      <p:pic>
-        <p:nvPicPr>
-          <p:cNvPr id="3074" name="Picture 2" descr="P1.0-2 Multiplexing Control Bits / Signals"/>
-          <p:cNvPicPr>
-            <a:picLocks noChangeAspect="1" noChangeArrowheads="1"/>
-          </p:cNvPicPr>
-          <p:nvPr/>
-        </p:nvPicPr>
-        <p:blipFill>
-          <a:blip r:embed="rId2">
-            <a:extLst>
-              <a:ext uri="{28A0092B-C50C-407E-A947-70E740481C1C}">
-                <a14:useLocalDpi xmlns:a14="http://schemas.microsoft.com/office/drawing/2010/main" val="0"/>
-              </a:ext>
-            </a:extLst>
-          </a:blip>
-          <a:srcRect/>
-          <a:stretch>
-            <a:fillRect/>
-          </a:stretch>
-        </p:blipFill>
-        <p:spPr bwMode="auto">
-          <a:xfrm>
-            <a:off x="1183264" y="119695"/>
-            <a:ext cx="6753225" cy="4848225"/>
-          </a:xfrm>
-          <a:prstGeom prst="rect">
-            <a:avLst/>
-          </a:prstGeom>
-          <a:noFill/>
-          <a:extLst>
-            <a:ext uri="{909E8E84-426E-40DD-AFC4-6F175D3DCCD1}">
-              <a14:hiddenFill xmlns:a14="http://schemas.microsoft.com/office/drawing/2010/main">
-                <a:solidFill>
-                  <a:srgbClr val="FFFFFF"/>
-                </a:solidFill>
-              </a14:hiddenFill>
-            </a:ext>
-          </a:extLst>
-        </p:spPr>
-      </p:pic>
-      <p:sp>
-        <p:nvSpPr>
-          <p:cNvPr id="5" name="TextBox 4"/>
-          <p:cNvSpPr txBox="1"/>
-          <p:nvPr/>
-        </p:nvSpPr>
-        <p:spPr>
-          <a:xfrm>
-            <a:off x="3168201" y="4646934"/>
-            <a:ext cx="5061399" cy="461665"/>
-          </a:xfrm>
-          <a:prstGeom prst="rect">
-            <a:avLst/>
-          </a:prstGeom>
-          <a:noFill/>
-        </p:spPr>
-        <p:txBody>
-          <a:bodyPr wrap="square" rtlCol="0">
-            <a:spAutoFit/>
-          </a:bodyPr>
-          <a:lstStyle/>
-          <a:p>
-            <a:r>
-              <a:rPr lang="en-US" dirty="0" smtClean="0"/>
-              <a:t>Reference:  Page 43 of Device Specific</a:t>
-            </a:r>
           </a:p>
         </p:txBody>
       </p:sp>
     </p:spTree>
     <p:extLst>
       <p:ext uri="{BB962C8B-B14F-4D97-AF65-F5344CB8AC3E}">
-        <p14:creationId xmlns:p14="http://schemas.microsoft.com/office/powerpoint/2010/main" val="307478788"/>
+        <p14:creationId xmlns:p14="http://schemas.microsoft.com/office/powerpoint/2010/main" val="45763967"/>
       </p:ext>
     </p:extLst>
   </p:cSld>
@@ -14962,80 +15688,9 @@
   <p:timing>
     <p:tnLst>
       <p:par>
-        <p:cTn id="1" dur="indefinite" restart="never" nodeType="tmRoot">
-          <p:childTnLst>
-            <p:seq concurrent="1" nextAc="seek">
-              <p:cTn id="2" dur="indefinite" nodeType="mainSeq">
-                <p:childTnLst>
-                  <p:par>
-                    <p:cTn id="3" fill="hold">
-                      <p:stCondLst>
-                        <p:cond delay="indefinite"/>
-                      </p:stCondLst>
-                      <p:childTnLst>
-                        <p:par>
-                          <p:cTn id="4" fill="hold">
-                            <p:stCondLst>
-                              <p:cond delay="0"/>
-                            </p:stCondLst>
-                            <p:childTnLst>
-                              <p:par>
-                                <p:cTn id="5" presetID="1" presetClass="entr" presetSubtype="0" fill="hold" grpId="0" nodeType="clickEffect">
-                                  <p:stCondLst>
-                                    <p:cond delay="0"/>
-                                  </p:stCondLst>
-                                  <p:childTnLst>
-                                    <p:set>
-                                      <p:cBhvr>
-                                        <p:cTn id="6" dur="1" fill="hold">
-                                          <p:stCondLst>
-                                            <p:cond delay="0"/>
-                                          </p:stCondLst>
-                                        </p:cTn>
-                                        <p:tgtEl>
-                                          <p:spTgt spid="5"/>
-                                        </p:tgtEl>
-                                        <p:attrNameLst>
-                                          <p:attrName>style.visibility</p:attrName>
-                                        </p:attrNameLst>
-                                      </p:cBhvr>
-                                      <p:to>
-                                        <p:strVal val="visible"/>
-                                      </p:to>
-                                    </p:set>
-                                  </p:childTnLst>
-                                </p:cTn>
-                              </p:par>
-                            </p:childTnLst>
-                          </p:cTn>
-                        </p:par>
-                      </p:childTnLst>
-                    </p:cTn>
-                  </p:par>
-                </p:childTnLst>
-              </p:cTn>
-              <p:prevCondLst>
-                <p:cond evt="onPrev" delay="0">
-                  <p:tgtEl>
-                    <p:sldTgt/>
-                  </p:tgtEl>
-                </p:cond>
-              </p:prevCondLst>
-              <p:nextCondLst>
-                <p:cond evt="onNext" delay="0">
-                  <p:tgtEl>
-                    <p:sldTgt/>
-                  </p:tgtEl>
-                </p:cond>
-              </p:nextCondLst>
-            </p:seq>
-          </p:childTnLst>
-        </p:cTn>
+        <p:cTn id="1" dur="indefinite" restart="never" nodeType="tmRoot"/>
       </p:par>
     </p:tnLst>
-    <p:bldLst>
-      <p:bldP spid="5" grpId="0"/>
-    </p:bldLst>
   </p:timing>
 </p:sld>
 </file>
@@ -15391,6 +16046,40 @@
             <a:endParaRPr lang="en-US" sz="1400" b="1" dirty="0" smtClean="0">
               <a:solidFill>
                 <a:schemeClr val="accent2"/>
+              </a:solidFill>
+              <a:latin typeface="Courier New" pitchFamily="49" charset="0"/>
+              <a:cs typeface="Courier New" pitchFamily="49" charset="0"/>
+            </a:endParaRPr>
+          </a:p>
+          <a:p>
+            <a:pPr marL="0" indent="0">
+              <a:buNone/>
+            </a:pPr>
+            <a:endParaRPr lang="en-US" sz="1400" b="1" dirty="0" smtClean="0">
+              <a:solidFill>
+                <a:schemeClr val="accent2"/>
+              </a:solidFill>
+              <a:latin typeface="Courier New" pitchFamily="49" charset="0"/>
+              <a:cs typeface="Courier New" pitchFamily="49" charset="0"/>
+            </a:endParaRPr>
+          </a:p>
+          <a:p>
+            <a:pPr marL="0" indent="0">
+              <a:buNone/>
+            </a:pPr>
+            <a:r>
+              <a:rPr lang="en-US" sz="1400" b="1" dirty="0" smtClean="0">
+                <a:solidFill>
+                  <a:srgbClr val="00B050"/>
+                </a:solidFill>
+                <a:latin typeface="Courier New" pitchFamily="49" charset="0"/>
+                <a:cs typeface="Courier New" pitchFamily="49" charset="0"/>
+              </a:rPr>
+              <a:t>	      ; Do useful stuff after button press</a:t>
+            </a:r>
+            <a:endParaRPr lang="en-US" sz="1400" b="1" dirty="0">
+              <a:solidFill>
+                <a:srgbClr val="00B050"/>
               </a:solidFill>
               <a:latin typeface="Courier New" pitchFamily="49" charset="0"/>
               <a:cs typeface="Courier New" pitchFamily="49" charset="0"/>

</xml_diff>